<commit_message>
cht: add Area chart types to Chart.chart_type
</commit_message>
<xml_diff>
--- a/features/steps/test_files/cht-chart-type.pptx
+++ b/features/steps/test_files/cht-chart-type.pptx
@@ -1070,14 +1070,14 @@
           <p:nvPr>
             <p:extLst>
               <p:ext uri="{D42A27DB-BD31-4B8C-83A1-F6EECF244321}">
-                <p14:modId xmlns:p14="http://schemas.microsoft.com/office/powerpoint/2010/main" val="312509982"/>
+                <p14:modId xmlns:p14="http://schemas.microsoft.com/office/powerpoint/2010/main" val="953952575"/>
               </p:ext>
             </p:extLst>
           </p:nvPr>
         </p:nvGraphicFramePr>
         <p:xfrm>
-          <a:off x="179512" y="188640"/>
-          <a:ext cx="2808312" cy="2808312"/>
+          <a:off x="228600" y="228600"/>
+          <a:ext cx="2759224" cy="2768352"/>
         </p:xfrm>
         <a:graphic>
           <a:graphicData uri="http://schemas.openxmlformats.org/drawingml/2006/chart">
@@ -1092,14 +1092,14 @@
           <p:nvPr>
             <p:extLst>
               <p:ext uri="{D42A27DB-BD31-4B8C-83A1-F6EECF244321}">
-                <p14:modId xmlns:p14="http://schemas.microsoft.com/office/powerpoint/2010/main" val="3186758161"/>
+                <p14:modId xmlns:p14="http://schemas.microsoft.com/office/powerpoint/2010/main" val="2609752795"/>
               </p:ext>
             </p:extLst>
           </p:nvPr>
         </p:nvGraphicFramePr>
         <p:xfrm>
-          <a:off x="3131840" y="188640"/>
-          <a:ext cx="2808312" cy="2808312"/>
+          <a:off x="3200400" y="228600"/>
+          <a:ext cx="2739752" cy="2768352"/>
         </p:xfrm>
         <a:graphic>
           <a:graphicData uri="http://schemas.openxmlformats.org/drawingml/2006/chart">
@@ -1114,14 +1114,14 @@
           <p:nvPr>
             <p:extLst>
               <p:ext uri="{D42A27DB-BD31-4B8C-83A1-F6EECF244321}">
-                <p14:modId xmlns:p14="http://schemas.microsoft.com/office/powerpoint/2010/main" val="3904651913"/>
+                <p14:modId xmlns:p14="http://schemas.microsoft.com/office/powerpoint/2010/main" val="2582243173"/>
               </p:ext>
             </p:extLst>
           </p:nvPr>
         </p:nvGraphicFramePr>
         <p:xfrm>
-          <a:off x="6156176" y="188640"/>
-          <a:ext cx="2880320" cy="2808312"/>
+          <a:off x="6172200" y="228600"/>
+          <a:ext cx="2720280" cy="2768352"/>
         </p:xfrm>
         <a:graphic>
           <a:graphicData uri="http://schemas.openxmlformats.org/drawingml/2006/chart">

</xml_diff>

<commit_message>
acpt: add scenarios for 3-D Area chart types
</commit_message>
<xml_diff>
--- a/features/steps/test_files/cht-chart-type.pptx
+++ b/features/steps/test_files/cht-chart-type.pptx
@@ -716,6 +716,700 @@
         <c:minorTickMark val="none"/>
         <c:tickLblPos val="nextTo"/>
         <c:crossAx val="-2067187720"/>
+        <c:crosses val="autoZero"/>
+        <c:crossBetween val="midCat"/>
+      </c:valAx>
+    </c:plotArea>
+    <c:plotVisOnly val="1"/>
+    <c:dispBlanksAs val="zero"/>
+    <c:showDLblsOverMax val="0"/>
+  </c:chart>
+  <c:txPr>
+    <a:bodyPr/>
+    <a:lstStyle/>
+    <a:p>
+      <a:pPr>
+        <a:defRPr sz="1800"/>
+      </a:pPr>
+      <a:endParaRPr lang="en-US"/>
+    </a:p>
+  </c:txPr>
+  <c:externalData r:id="rId1">
+    <c:autoUpdate val="0"/>
+  </c:externalData>
+</c:chartSpace>
+</file>
+
+<file path=ppt/charts/chart4.xml><?xml version="1.0" encoding="utf-8"?>
+<c:chartSpace xmlns:c="http://schemas.openxmlformats.org/drawingml/2006/chart" xmlns:a="http://schemas.openxmlformats.org/drawingml/2006/main" xmlns:r="http://schemas.openxmlformats.org/officeDocument/2006/relationships">
+  <c:date1904 val="0"/>
+  <c:lang val="en-US"/>
+  <c:roundedCorners val="0"/>
+  <mc:AlternateContent xmlns:mc="http://schemas.openxmlformats.org/markup-compatibility/2006">
+    <mc:Choice xmlns:c14="http://schemas.microsoft.com/office/drawing/2007/8/2/chart" Requires="c14">
+      <c14:style val="118"/>
+    </mc:Choice>
+    <mc:Fallback>
+      <c:style val="18"/>
+    </mc:Fallback>
+  </mc:AlternateContent>
+  <c:chart>
+    <c:autoTitleDeleted val="0"/>
+    <c:view3D>
+      <c:rotX val="15"/>
+      <c:rotY val="20"/>
+      <c:rAngAx val="0"/>
+      <c:perspective val="30"/>
+    </c:view3D>
+    <c:floor>
+      <c:thickness val="0"/>
+    </c:floor>
+    <c:sideWall>
+      <c:thickness val="0"/>
+    </c:sideWall>
+    <c:backWall>
+      <c:thickness val="0"/>
+    </c:backWall>
+    <c:plotArea>
+      <c:layout/>
+      <c:area3DChart>
+        <c:grouping val="standard"/>
+        <c:varyColors val="0"/>
+        <c:ser>
+          <c:idx val="0"/>
+          <c:order val="0"/>
+          <c:tx>
+            <c:strRef>
+              <c:f>Sheet1!$B$1</c:f>
+              <c:strCache>
+                <c:ptCount val="1"/>
+                <c:pt idx="0">
+                  <c:v>Series 1</c:v>
+                </c:pt>
+              </c:strCache>
+            </c:strRef>
+          </c:tx>
+          <c:cat>
+            <c:numRef>
+              <c:f>Sheet1!$A$2:$A$6</c:f>
+              <c:numCache>
+                <c:formatCode>m/d/yy</c:formatCode>
+                <c:ptCount val="5"/>
+                <c:pt idx="0">
+                  <c:v>37261.0</c:v>
+                </c:pt>
+                <c:pt idx="1">
+                  <c:v>37262.0</c:v>
+                </c:pt>
+                <c:pt idx="2">
+                  <c:v>37263.0</c:v>
+                </c:pt>
+                <c:pt idx="3">
+                  <c:v>37264.0</c:v>
+                </c:pt>
+                <c:pt idx="4">
+                  <c:v>37265.0</c:v>
+                </c:pt>
+              </c:numCache>
+            </c:numRef>
+          </c:cat>
+          <c:val>
+            <c:numRef>
+              <c:f>Sheet1!$B$2:$B$6</c:f>
+              <c:numCache>
+                <c:formatCode>General</c:formatCode>
+                <c:ptCount val="5"/>
+                <c:pt idx="0">
+                  <c:v>32.0</c:v>
+                </c:pt>
+                <c:pt idx="1">
+                  <c:v>32.0</c:v>
+                </c:pt>
+                <c:pt idx="2">
+                  <c:v>28.0</c:v>
+                </c:pt>
+                <c:pt idx="3">
+                  <c:v>12.0</c:v>
+                </c:pt>
+                <c:pt idx="4">
+                  <c:v>15.0</c:v>
+                </c:pt>
+              </c:numCache>
+            </c:numRef>
+          </c:val>
+        </c:ser>
+        <c:ser>
+          <c:idx val="1"/>
+          <c:order val="1"/>
+          <c:tx>
+            <c:strRef>
+              <c:f>Sheet1!$C$1</c:f>
+              <c:strCache>
+                <c:ptCount val="1"/>
+                <c:pt idx="0">
+                  <c:v>Series 2</c:v>
+                </c:pt>
+              </c:strCache>
+            </c:strRef>
+          </c:tx>
+          <c:cat>
+            <c:numRef>
+              <c:f>Sheet1!$A$2:$A$6</c:f>
+              <c:numCache>
+                <c:formatCode>m/d/yy</c:formatCode>
+                <c:ptCount val="5"/>
+                <c:pt idx="0">
+                  <c:v>37261.0</c:v>
+                </c:pt>
+                <c:pt idx="1">
+                  <c:v>37262.0</c:v>
+                </c:pt>
+                <c:pt idx="2">
+                  <c:v>37263.0</c:v>
+                </c:pt>
+                <c:pt idx="3">
+                  <c:v>37264.0</c:v>
+                </c:pt>
+                <c:pt idx="4">
+                  <c:v>37265.0</c:v>
+                </c:pt>
+              </c:numCache>
+            </c:numRef>
+          </c:cat>
+          <c:val>
+            <c:numRef>
+              <c:f>Sheet1!$C$2:$C$6</c:f>
+              <c:numCache>
+                <c:formatCode>General</c:formatCode>
+                <c:ptCount val="5"/>
+                <c:pt idx="0">
+                  <c:v>12.0</c:v>
+                </c:pt>
+                <c:pt idx="1">
+                  <c:v>12.0</c:v>
+                </c:pt>
+                <c:pt idx="2">
+                  <c:v>12.0</c:v>
+                </c:pt>
+                <c:pt idx="3">
+                  <c:v>21.0</c:v>
+                </c:pt>
+                <c:pt idx="4">
+                  <c:v>28.0</c:v>
+                </c:pt>
+              </c:numCache>
+            </c:numRef>
+          </c:val>
+        </c:ser>
+        <c:dLbls>
+          <c:showLegendKey val="0"/>
+          <c:showVal val="0"/>
+          <c:showCatName val="0"/>
+          <c:showSerName val="0"/>
+          <c:showPercent val="0"/>
+          <c:showBubbleSize val="0"/>
+        </c:dLbls>
+        <c:axId val="-2066953880"/>
+        <c:axId val="-2064266120"/>
+        <c:axId val="-2054488456"/>
+      </c:area3DChart>
+      <c:dateAx>
+        <c:axId val="-2066953880"/>
+        <c:scaling>
+          <c:orientation val="minMax"/>
+        </c:scaling>
+        <c:delete val="0"/>
+        <c:axPos val="b"/>
+        <c:numFmt formatCode="m/d/yy" sourceLinked="1"/>
+        <c:majorTickMark val="none"/>
+        <c:minorTickMark val="none"/>
+        <c:tickLblPos val="none"/>
+        <c:crossAx val="-2064266120"/>
+        <c:crosses val="autoZero"/>
+        <c:auto val="1"/>
+        <c:lblOffset val="100"/>
+        <c:baseTimeUnit val="days"/>
+      </c:dateAx>
+      <c:valAx>
+        <c:axId val="-2064266120"/>
+        <c:scaling>
+          <c:orientation val="minMax"/>
+        </c:scaling>
+        <c:delete val="0"/>
+        <c:axPos val="l"/>
+        <c:majorGridlines/>
+        <c:numFmt formatCode="General" sourceLinked="1"/>
+        <c:majorTickMark val="out"/>
+        <c:minorTickMark val="none"/>
+        <c:tickLblPos val="nextTo"/>
+        <c:crossAx val="-2066953880"/>
+        <c:crosses val="autoZero"/>
+        <c:crossBetween val="midCat"/>
+      </c:valAx>
+      <c:serAx>
+        <c:axId val="-2054488456"/>
+        <c:scaling>
+          <c:orientation val="minMax"/>
+        </c:scaling>
+        <c:delete val="0"/>
+        <c:axPos val="b"/>
+        <c:majorTickMark val="none"/>
+        <c:minorTickMark val="none"/>
+        <c:tickLblPos val="none"/>
+        <c:crossAx val="-2064266120"/>
+        <c:crosses val="autoZero"/>
+      </c:serAx>
+    </c:plotArea>
+    <c:plotVisOnly val="1"/>
+    <c:dispBlanksAs val="zero"/>
+    <c:showDLblsOverMax val="0"/>
+  </c:chart>
+  <c:txPr>
+    <a:bodyPr/>
+    <a:lstStyle/>
+    <a:p>
+      <a:pPr>
+        <a:defRPr sz="1800"/>
+      </a:pPr>
+      <a:endParaRPr lang="en-US"/>
+    </a:p>
+  </c:txPr>
+  <c:externalData r:id="rId1">
+    <c:autoUpdate val="0"/>
+  </c:externalData>
+</c:chartSpace>
+</file>
+
+<file path=ppt/charts/chart5.xml><?xml version="1.0" encoding="utf-8"?>
+<c:chartSpace xmlns:c="http://schemas.openxmlformats.org/drawingml/2006/chart" xmlns:a="http://schemas.openxmlformats.org/drawingml/2006/main" xmlns:r="http://schemas.openxmlformats.org/officeDocument/2006/relationships">
+  <c:date1904 val="0"/>
+  <c:lang val="en-US"/>
+  <c:roundedCorners val="0"/>
+  <mc:AlternateContent xmlns:mc="http://schemas.openxmlformats.org/markup-compatibility/2006">
+    <mc:Choice xmlns:c14="http://schemas.microsoft.com/office/drawing/2007/8/2/chart" Requires="c14">
+      <c14:style val="118"/>
+    </mc:Choice>
+    <mc:Fallback>
+      <c:style val="18"/>
+    </mc:Fallback>
+  </mc:AlternateContent>
+  <c:chart>
+    <c:autoTitleDeleted val="0"/>
+    <c:view3D>
+      <c:rotX val="15"/>
+      <c:rotY val="20"/>
+      <c:rAngAx val="0"/>
+      <c:perspective val="30"/>
+    </c:view3D>
+    <c:floor>
+      <c:thickness val="0"/>
+    </c:floor>
+    <c:sideWall>
+      <c:thickness val="0"/>
+    </c:sideWall>
+    <c:backWall>
+      <c:thickness val="0"/>
+    </c:backWall>
+    <c:plotArea>
+      <c:layout/>
+      <c:area3DChart>
+        <c:grouping val="stacked"/>
+        <c:varyColors val="0"/>
+        <c:ser>
+          <c:idx val="0"/>
+          <c:order val="0"/>
+          <c:tx>
+            <c:strRef>
+              <c:f>Sheet1!$B$1</c:f>
+              <c:strCache>
+                <c:ptCount val="1"/>
+                <c:pt idx="0">
+                  <c:v>Series 1</c:v>
+                </c:pt>
+              </c:strCache>
+            </c:strRef>
+          </c:tx>
+          <c:cat>
+            <c:numRef>
+              <c:f>Sheet1!$A$2:$A$6</c:f>
+              <c:numCache>
+                <c:formatCode>m/d/yy</c:formatCode>
+                <c:ptCount val="5"/>
+                <c:pt idx="0">
+                  <c:v>37261.0</c:v>
+                </c:pt>
+                <c:pt idx="1">
+                  <c:v>37262.0</c:v>
+                </c:pt>
+                <c:pt idx="2">
+                  <c:v>37263.0</c:v>
+                </c:pt>
+                <c:pt idx="3">
+                  <c:v>37264.0</c:v>
+                </c:pt>
+                <c:pt idx="4">
+                  <c:v>37265.0</c:v>
+                </c:pt>
+              </c:numCache>
+            </c:numRef>
+          </c:cat>
+          <c:val>
+            <c:numRef>
+              <c:f>Sheet1!$B$2:$B$6</c:f>
+              <c:numCache>
+                <c:formatCode>General</c:formatCode>
+                <c:ptCount val="5"/>
+                <c:pt idx="0">
+                  <c:v>32.0</c:v>
+                </c:pt>
+                <c:pt idx="1">
+                  <c:v>32.0</c:v>
+                </c:pt>
+                <c:pt idx="2">
+                  <c:v>28.0</c:v>
+                </c:pt>
+                <c:pt idx="3">
+                  <c:v>12.0</c:v>
+                </c:pt>
+                <c:pt idx="4">
+                  <c:v>15.0</c:v>
+                </c:pt>
+              </c:numCache>
+            </c:numRef>
+          </c:val>
+        </c:ser>
+        <c:ser>
+          <c:idx val="1"/>
+          <c:order val="1"/>
+          <c:tx>
+            <c:strRef>
+              <c:f>Sheet1!$C$1</c:f>
+              <c:strCache>
+                <c:ptCount val="1"/>
+                <c:pt idx="0">
+                  <c:v>Series 2</c:v>
+                </c:pt>
+              </c:strCache>
+            </c:strRef>
+          </c:tx>
+          <c:cat>
+            <c:numRef>
+              <c:f>Sheet1!$A$2:$A$6</c:f>
+              <c:numCache>
+                <c:formatCode>m/d/yy</c:formatCode>
+                <c:ptCount val="5"/>
+                <c:pt idx="0">
+                  <c:v>37261.0</c:v>
+                </c:pt>
+                <c:pt idx="1">
+                  <c:v>37262.0</c:v>
+                </c:pt>
+                <c:pt idx="2">
+                  <c:v>37263.0</c:v>
+                </c:pt>
+                <c:pt idx="3">
+                  <c:v>37264.0</c:v>
+                </c:pt>
+                <c:pt idx="4">
+                  <c:v>37265.0</c:v>
+                </c:pt>
+              </c:numCache>
+            </c:numRef>
+          </c:cat>
+          <c:val>
+            <c:numRef>
+              <c:f>Sheet1!$C$2:$C$6</c:f>
+              <c:numCache>
+                <c:formatCode>General</c:formatCode>
+                <c:ptCount val="5"/>
+                <c:pt idx="0">
+                  <c:v>12.0</c:v>
+                </c:pt>
+                <c:pt idx="1">
+                  <c:v>12.0</c:v>
+                </c:pt>
+                <c:pt idx="2">
+                  <c:v>12.0</c:v>
+                </c:pt>
+                <c:pt idx="3">
+                  <c:v>21.0</c:v>
+                </c:pt>
+                <c:pt idx="4">
+                  <c:v>28.0</c:v>
+                </c:pt>
+              </c:numCache>
+            </c:numRef>
+          </c:val>
+        </c:ser>
+        <c:dLbls>
+          <c:showLegendKey val="0"/>
+          <c:showVal val="0"/>
+          <c:showCatName val="0"/>
+          <c:showSerName val="0"/>
+          <c:showPercent val="0"/>
+          <c:showBubbleSize val="0"/>
+        </c:dLbls>
+        <c:axId val="-2071976248"/>
+        <c:axId val="-2068114376"/>
+        <c:axId val="0"/>
+      </c:area3DChart>
+      <c:dateAx>
+        <c:axId val="-2071976248"/>
+        <c:scaling>
+          <c:orientation val="minMax"/>
+        </c:scaling>
+        <c:delete val="0"/>
+        <c:axPos val="b"/>
+        <c:numFmt formatCode="m/d/yy" sourceLinked="1"/>
+        <c:majorTickMark val="none"/>
+        <c:minorTickMark val="none"/>
+        <c:tickLblPos val="none"/>
+        <c:crossAx val="-2068114376"/>
+        <c:crosses val="autoZero"/>
+        <c:auto val="1"/>
+        <c:lblOffset val="100"/>
+        <c:baseTimeUnit val="days"/>
+      </c:dateAx>
+      <c:valAx>
+        <c:axId val="-2068114376"/>
+        <c:scaling>
+          <c:orientation val="minMax"/>
+        </c:scaling>
+        <c:delete val="0"/>
+        <c:axPos val="l"/>
+        <c:majorGridlines/>
+        <c:numFmt formatCode="General" sourceLinked="1"/>
+        <c:majorTickMark val="out"/>
+        <c:minorTickMark val="none"/>
+        <c:tickLblPos val="nextTo"/>
+        <c:crossAx val="-2071976248"/>
+        <c:crosses val="autoZero"/>
+        <c:crossBetween val="midCat"/>
+      </c:valAx>
+    </c:plotArea>
+    <c:plotVisOnly val="1"/>
+    <c:dispBlanksAs val="zero"/>
+    <c:showDLblsOverMax val="0"/>
+  </c:chart>
+  <c:txPr>
+    <a:bodyPr/>
+    <a:lstStyle/>
+    <a:p>
+      <a:pPr>
+        <a:defRPr sz="1800"/>
+      </a:pPr>
+      <a:endParaRPr lang="en-US"/>
+    </a:p>
+  </c:txPr>
+  <c:externalData r:id="rId1">
+    <c:autoUpdate val="0"/>
+  </c:externalData>
+</c:chartSpace>
+</file>
+
+<file path=ppt/charts/chart6.xml><?xml version="1.0" encoding="utf-8"?>
+<c:chartSpace xmlns:c="http://schemas.openxmlformats.org/drawingml/2006/chart" xmlns:a="http://schemas.openxmlformats.org/drawingml/2006/main" xmlns:r="http://schemas.openxmlformats.org/officeDocument/2006/relationships">
+  <c:date1904 val="0"/>
+  <c:lang val="en-US"/>
+  <c:roundedCorners val="0"/>
+  <mc:AlternateContent xmlns:mc="http://schemas.openxmlformats.org/markup-compatibility/2006">
+    <mc:Choice xmlns:c14="http://schemas.microsoft.com/office/drawing/2007/8/2/chart" Requires="c14">
+      <c14:style val="118"/>
+    </mc:Choice>
+    <mc:Fallback>
+      <c:style val="18"/>
+    </mc:Fallback>
+  </mc:AlternateContent>
+  <c:chart>
+    <c:autoTitleDeleted val="0"/>
+    <c:view3D>
+      <c:rotX val="15"/>
+      <c:rotY val="20"/>
+      <c:rAngAx val="0"/>
+      <c:perspective val="30"/>
+    </c:view3D>
+    <c:floor>
+      <c:thickness val="0"/>
+    </c:floor>
+    <c:sideWall>
+      <c:thickness val="0"/>
+    </c:sideWall>
+    <c:backWall>
+      <c:thickness val="0"/>
+    </c:backWall>
+    <c:plotArea>
+      <c:layout/>
+      <c:area3DChart>
+        <c:grouping val="percentStacked"/>
+        <c:varyColors val="0"/>
+        <c:ser>
+          <c:idx val="0"/>
+          <c:order val="0"/>
+          <c:tx>
+            <c:strRef>
+              <c:f>Sheet1!$B$1</c:f>
+              <c:strCache>
+                <c:ptCount val="1"/>
+                <c:pt idx="0">
+                  <c:v>Series 1</c:v>
+                </c:pt>
+              </c:strCache>
+            </c:strRef>
+          </c:tx>
+          <c:cat>
+            <c:numRef>
+              <c:f>Sheet1!$A$2:$A$6</c:f>
+              <c:numCache>
+                <c:formatCode>m/d/yy</c:formatCode>
+                <c:ptCount val="5"/>
+                <c:pt idx="0">
+                  <c:v>37261.0</c:v>
+                </c:pt>
+                <c:pt idx="1">
+                  <c:v>37262.0</c:v>
+                </c:pt>
+                <c:pt idx="2">
+                  <c:v>37263.0</c:v>
+                </c:pt>
+                <c:pt idx="3">
+                  <c:v>37264.0</c:v>
+                </c:pt>
+                <c:pt idx="4">
+                  <c:v>37265.0</c:v>
+                </c:pt>
+              </c:numCache>
+            </c:numRef>
+          </c:cat>
+          <c:val>
+            <c:numRef>
+              <c:f>Sheet1!$B$2:$B$6</c:f>
+              <c:numCache>
+                <c:formatCode>General</c:formatCode>
+                <c:ptCount val="5"/>
+                <c:pt idx="0">
+                  <c:v>32.0</c:v>
+                </c:pt>
+                <c:pt idx="1">
+                  <c:v>32.0</c:v>
+                </c:pt>
+                <c:pt idx="2">
+                  <c:v>28.0</c:v>
+                </c:pt>
+                <c:pt idx="3">
+                  <c:v>12.0</c:v>
+                </c:pt>
+                <c:pt idx="4">
+                  <c:v>15.0</c:v>
+                </c:pt>
+              </c:numCache>
+            </c:numRef>
+          </c:val>
+        </c:ser>
+        <c:ser>
+          <c:idx val="1"/>
+          <c:order val="1"/>
+          <c:tx>
+            <c:strRef>
+              <c:f>Sheet1!$C$1</c:f>
+              <c:strCache>
+                <c:ptCount val="1"/>
+                <c:pt idx="0">
+                  <c:v>Series 2</c:v>
+                </c:pt>
+              </c:strCache>
+            </c:strRef>
+          </c:tx>
+          <c:cat>
+            <c:numRef>
+              <c:f>Sheet1!$A$2:$A$6</c:f>
+              <c:numCache>
+                <c:formatCode>m/d/yy</c:formatCode>
+                <c:ptCount val="5"/>
+                <c:pt idx="0">
+                  <c:v>37261.0</c:v>
+                </c:pt>
+                <c:pt idx="1">
+                  <c:v>37262.0</c:v>
+                </c:pt>
+                <c:pt idx="2">
+                  <c:v>37263.0</c:v>
+                </c:pt>
+                <c:pt idx="3">
+                  <c:v>37264.0</c:v>
+                </c:pt>
+                <c:pt idx="4">
+                  <c:v>37265.0</c:v>
+                </c:pt>
+              </c:numCache>
+            </c:numRef>
+          </c:cat>
+          <c:val>
+            <c:numRef>
+              <c:f>Sheet1!$C$2:$C$6</c:f>
+              <c:numCache>
+                <c:formatCode>General</c:formatCode>
+                <c:ptCount val="5"/>
+                <c:pt idx="0">
+                  <c:v>12.0</c:v>
+                </c:pt>
+                <c:pt idx="1">
+                  <c:v>12.0</c:v>
+                </c:pt>
+                <c:pt idx="2">
+                  <c:v>12.0</c:v>
+                </c:pt>
+                <c:pt idx="3">
+                  <c:v>21.0</c:v>
+                </c:pt>
+                <c:pt idx="4">
+                  <c:v>28.0</c:v>
+                </c:pt>
+              </c:numCache>
+            </c:numRef>
+          </c:val>
+        </c:ser>
+        <c:dLbls>
+          <c:showLegendKey val="0"/>
+          <c:showVal val="0"/>
+          <c:showCatName val="0"/>
+          <c:showSerName val="0"/>
+          <c:showPercent val="0"/>
+          <c:showBubbleSize val="0"/>
+        </c:dLbls>
+        <c:axId val="-2144026952"/>
+        <c:axId val="-2069932152"/>
+        <c:axId val="0"/>
+      </c:area3DChart>
+      <c:dateAx>
+        <c:axId val="-2144026952"/>
+        <c:scaling>
+          <c:orientation val="minMax"/>
+        </c:scaling>
+        <c:delete val="0"/>
+        <c:axPos val="b"/>
+        <c:numFmt formatCode="m/d/yy" sourceLinked="1"/>
+        <c:majorTickMark val="none"/>
+        <c:minorTickMark val="none"/>
+        <c:tickLblPos val="none"/>
+        <c:crossAx val="-2069932152"/>
+        <c:crosses val="autoZero"/>
+        <c:auto val="1"/>
+        <c:lblOffset val="100"/>
+        <c:baseTimeUnit val="days"/>
+      </c:dateAx>
+      <c:valAx>
+        <c:axId val="-2069932152"/>
+        <c:scaling>
+          <c:orientation val="minMax"/>
+        </c:scaling>
+        <c:delete val="0"/>
+        <c:axPos val="l"/>
+        <c:majorGridlines/>
+        <c:numFmt formatCode="0%" sourceLinked="1"/>
+        <c:majorTickMark val="out"/>
+        <c:minorTickMark val="none"/>
+        <c:tickLblPos val="nextTo"/>
+        <c:crossAx val="-2144026952"/>
         <c:crosses val="autoZero"/>
         <c:crossBetween val="midCat"/>
       </c:valAx>
@@ -1129,6 +1823,72 @@
           </a:graphicData>
         </a:graphic>
       </p:graphicFrame>
+      <p:graphicFrame>
+        <p:nvGraphicFramePr>
+          <p:cNvPr id="5" name="Chart 4"/>
+          <p:cNvGraphicFramePr/>
+          <p:nvPr>
+            <p:extLst>
+              <p:ext uri="{D42A27DB-BD31-4B8C-83A1-F6EECF244321}">
+                <p14:modId xmlns:p14="http://schemas.microsoft.com/office/powerpoint/2010/main" val="1748830933"/>
+              </p:ext>
+            </p:extLst>
+          </p:nvPr>
+        </p:nvGraphicFramePr>
+        <p:xfrm>
+          <a:off x="228600" y="3657600"/>
+          <a:ext cx="2759224" cy="2752080"/>
+        </p:xfrm>
+        <a:graphic>
+          <a:graphicData uri="http://schemas.openxmlformats.org/drawingml/2006/chart">
+            <c:chart xmlns:c="http://schemas.openxmlformats.org/drawingml/2006/chart" xmlns:r="http://schemas.openxmlformats.org/officeDocument/2006/relationships" r:id="rId5"/>
+          </a:graphicData>
+        </a:graphic>
+      </p:graphicFrame>
+      <p:graphicFrame>
+        <p:nvGraphicFramePr>
+          <p:cNvPr id="6" name="Chart 5"/>
+          <p:cNvGraphicFramePr/>
+          <p:nvPr>
+            <p:extLst>
+              <p:ext uri="{D42A27DB-BD31-4B8C-83A1-F6EECF244321}">
+                <p14:modId xmlns:p14="http://schemas.microsoft.com/office/powerpoint/2010/main" val="2141120195"/>
+              </p:ext>
+            </p:extLst>
+          </p:nvPr>
+        </p:nvGraphicFramePr>
+        <p:xfrm>
+          <a:off x="3203848" y="3657600"/>
+          <a:ext cx="2736304" cy="2752080"/>
+        </p:xfrm>
+        <a:graphic>
+          <a:graphicData uri="http://schemas.openxmlformats.org/drawingml/2006/chart">
+            <c:chart xmlns:c="http://schemas.openxmlformats.org/drawingml/2006/chart" xmlns:r="http://schemas.openxmlformats.org/officeDocument/2006/relationships" r:id="rId6"/>
+          </a:graphicData>
+        </a:graphic>
+      </p:graphicFrame>
+      <p:graphicFrame>
+        <p:nvGraphicFramePr>
+          <p:cNvPr id="7" name="Chart 6"/>
+          <p:cNvGraphicFramePr/>
+          <p:nvPr>
+            <p:extLst>
+              <p:ext uri="{D42A27DB-BD31-4B8C-83A1-F6EECF244321}">
+                <p14:modId xmlns:p14="http://schemas.microsoft.com/office/powerpoint/2010/main" val="2149821212"/>
+              </p:ext>
+            </p:extLst>
+          </p:nvPr>
+        </p:nvGraphicFramePr>
+        <p:xfrm>
+          <a:off x="6156176" y="3657600"/>
+          <a:ext cx="2759968" cy="2752080"/>
+        </p:xfrm>
+        <a:graphic>
+          <a:graphicData uri="http://schemas.openxmlformats.org/drawingml/2006/chart">
+            <c:chart xmlns:c="http://schemas.openxmlformats.org/drawingml/2006/chart" xmlns:r="http://schemas.openxmlformats.org/officeDocument/2006/relationships" r:id="rId7"/>
+          </a:graphicData>
+        </a:graphic>
+      </p:graphicFrame>
     </p:spTree>
     <p:extLst>
       <p:ext uri="{BB962C8B-B14F-4D97-AF65-F5344CB8AC3E}">

</xml_diff>

<commit_message>
acpt: add scenarios for Bar and Column chart types
</commit_message>
<xml_diff>
--- a/features/steps/test_files/cht-chart-type.pptx
+++ b/features/steps/test_files/cht-chart-type.pptx
@@ -6,6 +6,7 @@
   </p:sldMasterIdLst>
   <p:sldIdLst>
     <p:sldId id="256" r:id="rId2"/>
+    <p:sldId id="257" r:id="rId3"/>
   </p:sldIdLst>
   <p:sldSz cx="9144000" cy="6858000" type="screen4x3"/>
   <p:notesSz cx="6858000" cy="9144000"/>
@@ -318,6 +319,782 @@
 </c:chartSpace>
 </file>
 
+<file path=ppt/charts/chart10.xml><?xml version="1.0" encoding="utf-8"?>
+<c:chartSpace xmlns:c="http://schemas.openxmlformats.org/drawingml/2006/chart" xmlns:a="http://schemas.openxmlformats.org/drawingml/2006/main" xmlns:r="http://schemas.openxmlformats.org/officeDocument/2006/relationships">
+  <c:date1904 val="0"/>
+  <c:lang val="en-US"/>
+  <c:roundedCorners val="0"/>
+  <mc:AlternateContent xmlns:mc="http://schemas.openxmlformats.org/markup-compatibility/2006">
+    <mc:Choice xmlns:c14="http://schemas.microsoft.com/office/drawing/2007/8/2/chart" Requires="c14">
+      <c14:style val="118"/>
+    </mc:Choice>
+    <mc:Fallback>
+      <c:style val="18"/>
+    </mc:Fallback>
+  </mc:AlternateContent>
+  <c:chart>
+    <c:autoTitleDeleted val="0"/>
+    <c:plotArea>
+      <c:layout/>
+      <c:barChart>
+        <c:barDir val="col"/>
+        <c:grouping val="clustered"/>
+        <c:varyColors val="0"/>
+        <c:ser>
+          <c:idx val="0"/>
+          <c:order val="0"/>
+          <c:tx>
+            <c:strRef>
+              <c:f>Sheet1!$B$1</c:f>
+              <c:strCache>
+                <c:ptCount val="1"/>
+                <c:pt idx="0">
+                  <c:v>Series 1</c:v>
+                </c:pt>
+              </c:strCache>
+            </c:strRef>
+          </c:tx>
+          <c:invertIfNegative val="0"/>
+          <c:cat>
+            <c:strRef>
+              <c:f>Sheet1!$A$2:$A$5</c:f>
+              <c:strCache>
+                <c:ptCount val="4"/>
+                <c:pt idx="0">
+                  <c:v>Category 1</c:v>
+                </c:pt>
+                <c:pt idx="1">
+                  <c:v>Category 2</c:v>
+                </c:pt>
+                <c:pt idx="2">
+                  <c:v>Category 3</c:v>
+                </c:pt>
+                <c:pt idx="3">
+                  <c:v>Category 4</c:v>
+                </c:pt>
+              </c:strCache>
+            </c:strRef>
+          </c:cat>
+          <c:val>
+            <c:numRef>
+              <c:f>Sheet1!$B$2:$B$5</c:f>
+              <c:numCache>
+                <c:formatCode>General</c:formatCode>
+                <c:ptCount val="4"/>
+                <c:pt idx="0">
+                  <c:v>4.3</c:v>
+                </c:pt>
+                <c:pt idx="1">
+                  <c:v>2.5</c:v>
+                </c:pt>
+                <c:pt idx="2">
+                  <c:v>3.5</c:v>
+                </c:pt>
+                <c:pt idx="3">
+                  <c:v>4.5</c:v>
+                </c:pt>
+              </c:numCache>
+            </c:numRef>
+          </c:val>
+        </c:ser>
+        <c:ser>
+          <c:idx val="1"/>
+          <c:order val="1"/>
+          <c:tx>
+            <c:strRef>
+              <c:f>Sheet1!$C$1</c:f>
+              <c:strCache>
+                <c:ptCount val="1"/>
+                <c:pt idx="0">
+                  <c:v>Series 2</c:v>
+                </c:pt>
+              </c:strCache>
+            </c:strRef>
+          </c:tx>
+          <c:invertIfNegative val="0"/>
+          <c:cat>
+            <c:strRef>
+              <c:f>Sheet1!$A$2:$A$5</c:f>
+              <c:strCache>
+                <c:ptCount val="4"/>
+                <c:pt idx="0">
+                  <c:v>Category 1</c:v>
+                </c:pt>
+                <c:pt idx="1">
+                  <c:v>Category 2</c:v>
+                </c:pt>
+                <c:pt idx="2">
+                  <c:v>Category 3</c:v>
+                </c:pt>
+                <c:pt idx="3">
+                  <c:v>Category 4</c:v>
+                </c:pt>
+              </c:strCache>
+            </c:strRef>
+          </c:cat>
+          <c:val>
+            <c:numRef>
+              <c:f>Sheet1!$C$2:$C$5</c:f>
+              <c:numCache>
+                <c:formatCode>General</c:formatCode>
+                <c:ptCount val="4"/>
+                <c:pt idx="0">
+                  <c:v>2.4</c:v>
+                </c:pt>
+                <c:pt idx="1">
+                  <c:v>4.4</c:v>
+                </c:pt>
+                <c:pt idx="2">
+                  <c:v>1.8</c:v>
+                </c:pt>
+                <c:pt idx="3">
+                  <c:v>2.8</c:v>
+                </c:pt>
+              </c:numCache>
+            </c:numRef>
+          </c:val>
+        </c:ser>
+        <c:ser>
+          <c:idx val="2"/>
+          <c:order val="2"/>
+          <c:tx>
+            <c:strRef>
+              <c:f>Sheet1!$D$1</c:f>
+              <c:strCache>
+                <c:ptCount val="1"/>
+                <c:pt idx="0">
+                  <c:v>Series 3</c:v>
+                </c:pt>
+              </c:strCache>
+            </c:strRef>
+          </c:tx>
+          <c:invertIfNegative val="0"/>
+          <c:cat>
+            <c:strRef>
+              <c:f>Sheet1!$A$2:$A$5</c:f>
+              <c:strCache>
+                <c:ptCount val="4"/>
+                <c:pt idx="0">
+                  <c:v>Category 1</c:v>
+                </c:pt>
+                <c:pt idx="1">
+                  <c:v>Category 2</c:v>
+                </c:pt>
+                <c:pt idx="2">
+                  <c:v>Category 3</c:v>
+                </c:pt>
+                <c:pt idx="3">
+                  <c:v>Category 4</c:v>
+                </c:pt>
+              </c:strCache>
+            </c:strRef>
+          </c:cat>
+          <c:val>
+            <c:numRef>
+              <c:f>Sheet1!$D$2:$D$5</c:f>
+              <c:numCache>
+                <c:formatCode>General</c:formatCode>
+                <c:ptCount val="4"/>
+                <c:pt idx="0">
+                  <c:v>2.0</c:v>
+                </c:pt>
+                <c:pt idx="1">
+                  <c:v>2.0</c:v>
+                </c:pt>
+                <c:pt idx="2">
+                  <c:v>3.0</c:v>
+                </c:pt>
+                <c:pt idx="3">
+                  <c:v>5.0</c:v>
+                </c:pt>
+              </c:numCache>
+            </c:numRef>
+          </c:val>
+        </c:ser>
+        <c:dLbls>
+          <c:showLegendKey val="0"/>
+          <c:showVal val="0"/>
+          <c:showCatName val="0"/>
+          <c:showSerName val="0"/>
+          <c:showPercent val="0"/>
+          <c:showBubbleSize val="0"/>
+        </c:dLbls>
+        <c:gapWidth val="150"/>
+        <c:axId val="-2063973096"/>
+        <c:axId val="-2067022744"/>
+      </c:barChart>
+      <c:catAx>
+        <c:axId val="-2063973096"/>
+        <c:scaling>
+          <c:orientation val="minMax"/>
+        </c:scaling>
+        <c:delete val="0"/>
+        <c:axPos val="b"/>
+        <c:majorTickMark val="none"/>
+        <c:minorTickMark val="none"/>
+        <c:tickLblPos val="none"/>
+        <c:crossAx val="-2067022744"/>
+        <c:crosses val="autoZero"/>
+        <c:auto val="1"/>
+        <c:lblAlgn val="ctr"/>
+        <c:lblOffset val="100"/>
+        <c:noMultiLvlLbl val="0"/>
+      </c:catAx>
+      <c:valAx>
+        <c:axId val="-2067022744"/>
+        <c:scaling>
+          <c:orientation val="minMax"/>
+        </c:scaling>
+        <c:delete val="0"/>
+        <c:axPos val="l"/>
+        <c:majorGridlines/>
+        <c:numFmt formatCode="General" sourceLinked="1"/>
+        <c:majorTickMark val="out"/>
+        <c:minorTickMark val="none"/>
+        <c:tickLblPos val="nextTo"/>
+        <c:crossAx val="-2063973096"/>
+        <c:crosses val="autoZero"/>
+        <c:crossBetween val="between"/>
+      </c:valAx>
+    </c:plotArea>
+    <c:plotVisOnly val="1"/>
+    <c:dispBlanksAs val="gap"/>
+    <c:showDLblsOverMax val="0"/>
+  </c:chart>
+  <c:txPr>
+    <a:bodyPr/>
+    <a:lstStyle/>
+    <a:p>
+      <a:pPr>
+        <a:defRPr sz="1800"/>
+      </a:pPr>
+      <a:endParaRPr lang="en-US"/>
+    </a:p>
+  </c:txPr>
+  <c:externalData r:id="rId1">
+    <c:autoUpdate val="0"/>
+  </c:externalData>
+</c:chartSpace>
+</file>
+
+<file path=ppt/charts/chart11.xml><?xml version="1.0" encoding="utf-8"?>
+<c:chartSpace xmlns:c="http://schemas.openxmlformats.org/drawingml/2006/chart" xmlns:a="http://schemas.openxmlformats.org/drawingml/2006/main" xmlns:r="http://schemas.openxmlformats.org/officeDocument/2006/relationships">
+  <c:date1904 val="0"/>
+  <c:lang val="en-US"/>
+  <c:roundedCorners val="0"/>
+  <mc:AlternateContent xmlns:mc="http://schemas.openxmlformats.org/markup-compatibility/2006">
+    <mc:Choice xmlns:c14="http://schemas.microsoft.com/office/drawing/2007/8/2/chart" Requires="c14">
+      <c14:style val="118"/>
+    </mc:Choice>
+    <mc:Fallback>
+      <c:style val="18"/>
+    </mc:Fallback>
+  </mc:AlternateContent>
+  <c:chart>
+    <c:autoTitleDeleted val="0"/>
+    <c:plotArea>
+      <c:layout/>
+      <c:barChart>
+        <c:barDir val="col"/>
+        <c:grouping val="stacked"/>
+        <c:varyColors val="0"/>
+        <c:ser>
+          <c:idx val="0"/>
+          <c:order val="0"/>
+          <c:tx>
+            <c:strRef>
+              <c:f>Sheet1!$B$1</c:f>
+              <c:strCache>
+                <c:ptCount val="1"/>
+                <c:pt idx="0">
+                  <c:v>Series 1</c:v>
+                </c:pt>
+              </c:strCache>
+            </c:strRef>
+          </c:tx>
+          <c:invertIfNegative val="0"/>
+          <c:cat>
+            <c:strRef>
+              <c:f>Sheet1!$A$2:$A$5</c:f>
+              <c:strCache>
+                <c:ptCount val="4"/>
+                <c:pt idx="0">
+                  <c:v>Category 1</c:v>
+                </c:pt>
+                <c:pt idx="1">
+                  <c:v>Category 2</c:v>
+                </c:pt>
+                <c:pt idx="2">
+                  <c:v>Category 3</c:v>
+                </c:pt>
+                <c:pt idx="3">
+                  <c:v>Category 4</c:v>
+                </c:pt>
+              </c:strCache>
+            </c:strRef>
+          </c:cat>
+          <c:val>
+            <c:numRef>
+              <c:f>Sheet1!$B$2:$B$5</c:f>
+              <c:numCache>
+                <c:formatCode>General</c:formatCode>
+                <c:ptCount val="4"/>
+                <c:pt idx="0">
+                  <c:v>4.3</c:v>
+                </c:pt>
+                <c:pt idx="1">
+                  <c:v>2.5</c:v>
+                </c:pt>
+                <c:pt idx="2">
+                  <c:v>3.5</c:v>
+                </c:pt>
+                <c:pt idx="3">
+                  <c:v>4.5</c:v>
+                </c:pt>
+              </c:numCache>
+            </c:numRef>
+          </c:val>
+        </c:ser>
+        <c:ser>
+          <c:idx val="1"/>
+          <c:order val="1"/>
+          <c:tx>
+            <c:strRef>
+              <c:f>Sheet1!$C$1</c:f>
+              <c:strCache>
+                <c:ptCount val="1"/>
+                <c:pt idx="0">
+                  <c:v>Series 2</c:v>
+                </c:pt>
+              </c:strCache>
+            </c:strRef>
+          </c:tx>
+          <c:invertIfNegative val="0"/>
+          <c:cat>
+            <c:strRef>
+              <c:f>Sheet1!$A$2:$A$5</c:f>
+              <c:strCache>
+                <c:ptCount val="4"/>
+                <c:pt idx="0">
+                  <c:v>Category 1</c:v>
+                </c:pt>
+                <c:pt idx="1">
+                  <c:v>Category 2</c:v>
+                </c:pt>
+                <c:pt idx="2">
+                  <c:v>Category 3</c:v>
+                </c:pt>
+                <c:pt idx="3">
+                  <c:v>Category 4</c:v>
+                </c:pt>
+              </c:strCache>
+            </c:strRef>
+          </c:cat>
+          <c:val>
+            <c:numRef>
+              <c:f>Sheet1!$C$2:$C$5</c:f>
+              <c:numCache>
+                <c:formatCode>General</c:formatCode>
+                <c:ptCount val="4"/>
+                <c:pt idx="0">
+                  <c:v>2.4</c:v>
+                </c:pt>
+                <c:pt idx="1">
+                  <c:v>4.4</c:v>
+                </c:pt>
+                <c:pt idx="2">
+                  <c:v>1.8</c:v>
+                </c:pt>
+                <c:pt idx="3">
+                  <c:v>2.8</c:v>
+                </c:pt>
+              </c:numCache>
+            </c:numRef>
+          </c:val>
+        </c:ser>
+        <c:ser>
+          <c:idx val="2"/>
+          <c:order val="2"/>
+          <c:tx>
+            <c:strRef>
+              <c:f>Sheet1!$D$1</c:f>
+              <c:strCache>
+                <c:ptCount val="1"/>
+                <c:pt idx="0">
+                  <c:v>Series 3</c:v>
+                </c:pt>
+              </c:strCache>
+            </c:strRef>
+          </c:tx>
+          <c:invertIfNegative val="0"/>
+          <c:cat>
+            <c:strRef>
+              <c:f>Sheet1!$A$2:$A$5</c:f>
+              <c:strCache>
+                <c:ptCount val="4"/>
+                <c:pt idx="0">
+                  <c:v>Category 1</c:v>
+                </c:pt>
+                <c:pt idx="1">
+                  <c:v>Category 2</c:v>
+                </c:pt>
+                <c:pt idx="2">
+                  <c:v>Category 3</c:v>
+                </c:pt>
+                <c:pt idx="3">
+                  <c:v>Category 4</c:v>
+                </c:pt>
+              </c:strCache>
+            </c:strRef>
+          </c:cat>
+          <c:val>
+            <c:numRef>
+              <c:f>Sheet1!$D$2:$D$5</c:f>
+              <c:numCache>
+                <c:formatCode>General</c:formatCode>
+                <c:ptCount val="4"/>
+                <c:pt idx="0">
+                  <c:v>2.0</c:v>
+                </c:pt>
+                <c:pt idx="1">
+                  <c:v>2.0</c:v>
+                </c:pt>
+                <c:pt idx="2">
+                  <c:v>3.0</c:v>
+                </c:pt>
+                <c:pt idx="3">
+                  <c:v>5.0</c:v>
+                </c:pt>
+              </c:numCache>
+            </c:numRef>
+          </c:val>
+        </c:ser>
+        <c:dLbls>
+          <c:showLegendKey val="0"/>
+          <c:showVal val="0"/>
+          <c:showCatName val="0"/>
+          <c:showSerName val="0"/>
+          <c:showPercent val="0"/>
+          <c:showBubbleSize val="0"/>
+        </c:dLbls>
+        <c:gapWidth val="150"/>
+        <c:overlap val="100"/>
+        <c:axId val="-2052883832"/>
+        <c:axId val="-2052512376"/>
+      </c:barChart>
+      <c:catAx>
+        <c:axId val="-2052883832"/>
+        <c:scaling>
+          <c:orientation val="minMax"/>
+        </c:scaling>
+        <c:delete val="0"/>
+        <c:axPos val="b"/>
+        <c:majorTickMark val="none"/>
+        <c:minorTickMark val="none"/>
+        <c:tickLblPos val="none"/>
+        <c:crossAx val="-2052512376"/>
+        <c:crosses val="autoZero"/>
+        <c:auto val="1"/>
+        <c:lblAlgn val="ctr"/>
+        <c:lblOffset val="100"/>
+        <c:noMultiLvlLbl val="0"/>
+      </c:catAx>
+      <c:valAx>
+        <c:axId val="-2052512376"/>
+        <c:scaling>
+          <c:orientation val="minMax"/>
+        </c:scaling>
+        <c:delete val="0"/>
+        <c:axPos val="l"/>
+        <c:majorGridlines/>
+        <c:numFmt formatCode="General" sourceLinked="1"/>
+        <c:majorTickMark val="out"/>
+        <c:minorTickMark val="none"/>
+        <c:tickLblPos val="nextTo"/>
+        <c:crossAx val="-2052883832"/>
+        <c:crosses val="autoZero"/>
+        <c:crossBetween val="between"/>
+      </c:valAx>
+    </c:plotArea>
+    <c:plotVisOnly val="1"/>
+    <c:dispBlanksAs val="gap"/>
+    <c:showDLblsOverMax val="0"/>
+  </c:chart>
+  <c:txPr>
+    <a:bodyPr/>
+    <a:lstStyle/>
+    <a:p>
+      <a:pPr>
+        <a:defRPr sz="1800"/>
+      </a:pPr>
+      <a:endParaRPr lang="en-US"/>
+    </a:p>
+  </c:txPr>
+  <c:externalData r:id="rId1">
+    <c:autoUpdate val="0"/>
+  </c:externalData>
+</c:chartSpace>
+</file>
+
+<file path=ppt/charts/chart12.xml><?xml version="1.0" encoding="utf-8"?>
+<c:chartSpace xmlns:c="http://schemas.openxmlformats.org/drawingml/2006/chart" xmlns:a="http://schemas.openxmlformats.org/drawingml/2006/main" xmlns:r="http://schemas.openxmlformats.org/officeDocument/2006/relationships">
+  <c:date1904 val="0"/>
+  <c:lang val="en-US"/>
+  <c:roundedCorners val="0"/>
+  <mc:AlternateContent xmlns:mc="http://schemas.openxmlformats.org/markup-compatibility/2006">
+    <mc:Choice xmlns:c14="http://schemas.microsoft.com/office/drawing/2007/8/2/chart" Requires="c14">
+      <c14:style val="118"/>
+    </mc:Choice>
+    <mc:Fallback>
+      <c:style val="18"/>
+    </mc:Fallback>
+  </mc:AlternateContent>
+  <c:chart>
+    <c:autoTitleDeleted val="0"/>
+    <c:plotArea>
+      <c:layout/>
+      <c:barChart>
+        <c:barDir val="col"/>
+        <c:grouping val="percentStacked"/>
+        <c:varyColors val="0"/>
+        <c:ser>
+          <c:idx val="0"/>
+          <c:order val="0"/>
+          <c:tx>
+            <c:strRef>
+              <c:f>Sheet1!$B$1</c:f>
+              <c:strCache>
+                <c:ptCount val="1"/>
+                <c:pt idx="0">
+                  <c:v>Series 1</c:v>
+                </c:pt>
+              </c:strCache>
+            </c:strRef>
+          </c:tx>
+          <c:invertIfNegative val="0"/>
+          <c:cat>
+            <c:strRef>
+              <c:f>Sheet1!$A$2:$A$5</c:f>
+              <c:strCache>
+                <c:ptCount val="4"/>
+                <c:pt idx="0">
+                  <c:v>Category 1</c:v>
+                </c:pt>
+                <c:pt idx="1">
+                  <c:v>Category 2</c:v>
+                </c:pt>
+                <c:pt idx="2">
+                  <c:v>Category 3</c:v>
+                </c:pt>
+                <c:pt idx="3">
+                  <c:v>Category 4</c:v>
+                </c:pt>
+              </c:strCache>
+            </c:strRef>
+          </c:cat>
+          <c:val>
+            <c:numRef>
+              <c:f>Sheet1!$B$2:$B$5</c:f>
+              <c:numCache>
+                <c:formatCode>General</c:formatCode>
+                <c:ptCount val="4"/>
+                <c:pt idx="0">
+                  <c:v>4.3</c:v>
+                </c:pt>
+                <c:pt idx="1">
+                  <c:v>2.5</c:v>
+                </c:pt>
+                <c:pt idx="2">
+                  <c:v>3.5</c:v>
+                </c:pt>
+                <c:pt idx="3">
+                  <c:v>4.5</c:v>
+                </c:pt>
+              </c:numCache>
+            </c:numRef>
+          </c:val>
+        </c:ser>
+        <c:ser>
+          <c:idx val="1"/>
+          <c:order val="1"/>
+          <c:tx>
+            <c:strRef>
+              <c:f>Sheet1!$C$1</c:f>
+              <c:strCache>
+                <c:ptCount val="1"/>
+                <c:pt idx="0">
+                  <c:v>Series 2</c:v>
+                </c:pt>
+              </c:strCache>
+            </c:strRef>
+          </c:tx>
+          <c:invertIfNegative val="0"/>
+          <c:cat>
+            <c:strRef>
+              <c:f>Sheet1!$A$2:$A$5</c:f>
+              <c:strCache>
+                <c:ptCount val="4"/>
+                <c:pt idx="0">
+                  <c:v>Category 1</c:v>
+                </c:pt>
+                <c:pt idx="1">
+                  <c:v>Category 2</c:v>
+                </c:pt>
+                <c:pt idx="2">
+                  <c:v>Category 3</c:v>
+                </c:pt>
+                <c:pt idx="3">
+                  <c:v>Category 4</c:v>
+                </c:pt>
+              </c:strCache>
+            </c:strRef>
+          </c:cat>
+          <c:val>
+            <c:numRef>
+              <c:f>Sheet1!$C$2:$C$5</c:f>
+              <c:numCache>
+                <c:formatCode>General</c:formatCode>
+                <c:ptCount val="4"/>
+                <c:pt idx="0">
+                  <c:v>2.4</c:v>
+                </c:pt>
+                <c:pt idx="1">
+                  <c:v>4.4</c:v>
+                </c:pt>
+                <c:pt idx="2">
+                  <c:v>1.8</c:v>
+                </c:pt>
+                <c:pt idx="3">
+                  <c:v>2.8</c:v>
+                </c:pt>
+              </c:numCache>
+            </c:numRef>
+          </c:val>
+        </c:ser>
+        <c:ser>
+          <c:idx val="2"/>
+          <c:order val="2"/>
+          <c:tx>
+            <c:strRef>
+              <c:f>Sheet1!$D$1</c:f>
+              <c:strCache>
+                <c:ptCount val="1"/>
+                <c:pt idx="0">
+                  <c:v>Series 3</c:v>
+                </c:pt>
+              </c:strCache>
+            </c:strRef>
+          </c:tx>
+          <c:invertIfNegative val="0"/>
+          <c:cat>
+            <c:strRef>
+              <c:f>Sheet1!$A$2:$A$5</c:f>
+              <c:strCache>
+                <c:ptCount val="4"/>
+                <c:pt idx="0">
+                  <c:v>Category 1</c:v>
+                </c:pt>
+                <c:pt idx="1">
+                  <c:v>Category 2</c:v>
+                </c:pt>
+                <c:pt idx="2">
+                  <c:v>Category 3</c:v>
+                </c:pt>
+                <c:pt idx="3">
+                  <c:v>Category 4</c:v>
+                </c:pt>
+              </c:strCache>
+            </c:strRef>
+          </c:cat>
+          <c:val>
+            <c:numRef>
+              <c:f>Sheet1!$D$2:$D$5</c:f>
+              <c:numCache>
+                <c:formatCode>General</c:formatCode>
+                <c:ptCount val="4"/>
+                <c:pt idx="0">
+                  <c:v>2.0</c:v>
+                </c:pt>
+                <c:pt idx="1">
+                  <c:v>2.0</c:v>
+                </c:pt>
+                <c:pt idx="2">
+                  <c:v>3.0</c:v>
+                </c:pt>
+                <c:pt idx="3">
+                  <c:v>5.0</c:v>
+                </c:pt>
+              </c:numCache>
+            </c:numRef>
+          </c:val>
+        </c:ser>
+        <c:dLbls>
+          <c:showLegendKey val="0"/>
+          <c:showVal val="0"/>
+          <c:showCatName val="0"/>
+          <c:showSerName val="0"/>
+          <c:showPercent val="0"/>
+          <c:showBubbleSize val="0"/>
+        </c:dLbls>
+        <c:gapWidth val="150"/>
+        <c:overlap val="100"/>
+        <c:axId val="-2063978104"/>
+        <c:axId val="-2130175976"/>
+      </c:barChart>
+      <c:catAx>
+        <c:axId val="-2063978104"/>
+        <c:scaling>
+          <c:orientation val="minMax"/>
+        </c:scaling>
+        <c:delete val="0"/>
+        <c:axPos val="b"/>
+        <c:majorTickMark val="none"/>
+        <c:minorTickMark val="none"/>
+        <c:tickLblPos val="none"/>
+        <c:crossAx val="-2130175976"/>
+        <c:crosses val="autoZero"/>
+        <c:auto val="1"/>
+        <c:lblAlgn val="ctr"/>
+        <c:lblOffset val="100"/>
+        <c:noMultiLvlLbl val="0"/>
+      </c:catAx>
+      <c:valAx>
+        <c:axId val="-2130175976"/>
+        <c:scaling>
+          <c:orientation val="minMax"/>
+        </c:scaling>
+        <c:delete val="0"/>
+        <c:axPos val="l"/>
+        <c:majorGridlines/>
+        <c:numFmt formatCode="0%" sourceLinked="1"/>
+        <c:majorTickMark val="out"/>
+        <c:minorTickMark val="none"/>
+        <c:tickLblPos val="nextTo"/>
+        <c:crossAx val="-2063978104"/>
+        <c:crosses val="autoZero"/>
+        <c:crossBetween val="between"/>
+      </c:valAx>
+    </c:plotArea>
+    <c:plotVisOnly val="1"/>
+    <c:dispBlanksAs val="gap"/>
+    <c:showDLblsOverMax val="0"/>
+  </c:chart>
+  <c:txPr>
+    <a:bodyPr/>
+    <a:lstStyle/>
+    <a:p>
+      <a:pPr>
+        <a:defRPr sz="1800"/>
+      </a:pPr>
+      <a:endParaRPr lang="en-US"/>
+    </a:p>
+  </c:txPr>
+  <c:externalData r:id="rId1">
+    <c:autoUpdate val="0"/>
+  </c:externalData>
+</c:chartSpace>
+</file>
+
 <file path=ppt/charts/chart2.xml><?xml version="1.0" encoding="utf-8"?>
 <c:chartSpace xmlns:c="http://schemas.openxmlformats.org/drawingml/2006/chart" xmlns:a="http://schemas.openxmlformats.org/drawingml/2006/main" xmlns:r="http://schemas.openxmlformats.org/officeDocument/2006/relationships">
   <c:date1904 val="0"/>
@@ -1416,6 +2193,782 @@
     </c:plotArea>
     <c:plotVisOnly val="1"/>
     <c:dispBlanksAs val="zero"/>
+    <c:showDLblsOverMax val="0"/>
+  </c:chart>
+  <c:txPr>
+    <a:bodyPr/>
+    <a:lstStyle/>
+    <a:p>
+      <a:pPr>
+        <a:defRPr sz="1800"/>
+      </a:pPr>
+      <a:endParaRPr lang="en-US"/>
+    </a:p>
+  </c:txPr>
+  <c:externalData r:id="rId1">
+    <c:autoUpdate val="0"/>
+  </c:externalData>
+</c:chartSpace>
+</file>
+
+<file path=ppt/charts/chart7.xml><?xml version="1.0" encoding="utf-8"?>
+<c:chartSpace xmlns:c="http://schemas.openxmlformats.org/drawingml/2006/chart" xmlns:a="http://schemas.openxmlformats.org/drawingml/2006/main" xmlns:r="http://schemas.openxmlformats.org/officeDocument/2006/relationships">
+  <c:date1904 val="0"/>
+  <c:lang val="en-US"/>
+  <c:roundedCorners val="0"/>
+  <mc:AlternateContent xmlns:mc="http://schemas.openxmlformats.org/markup-compatibility/2006">
+    <mc:Choice xmlns:c14="http://schemas.microsoft.com/office/drawing/2007/8/2/chart" Requires="c14">
+      <c14:style val="118"/>
+    </mc:Choice>
+    <mc:Fallback>
+      <c:style val="18"/>
+    </mc:Fallback>
+  </mc:AlternateContent>
+  <c:chart>
+    <c:autoTitleDeleted val="0"/>
+    <c:plotArea>
+      <c:layout/>
+      <c:barChart>
+        <c:barDir val="bar"/>
+        <c:grouping val="clustered"/>
+        <c:varyColors val="0"/>
+        <c:ser>
+          <c:idx val="0"/>
+          <c:order val="0"/>
+          <c:tx>
+            <c:strRef>
+              <c:f>Sheet1!$B$1</c:f>
+              <c:strCache>
+                <c:ptCount val="1"/>
+                <c:pt idx="0">
+                  <c:v>Series 1</c:v>
+                </c:pt>
+              </c:strCache>
+            </c:strRef>
+          </c:tx>
+          <c:invertIfNegative val="0"/>
+          <c:cat>
+            <c:strRef>
+              <c:f>Sheet1!$A$2:$A$5</c:f>
+              <c:strCache>
+                <c:ptCount val="4"/>
+                <c:pt idx="0">
+                  <c:v>Category 1</c:v>
+                </c:pt>
+                <c:pt idx="1">
+                  <c:v>Category 2</c:v>
+                </c:pt>
+                <c:pt idx="2">
+                  <c:v>Category 3</c:v>
+                </c:pt>
+                <c:pt idx="3">
+                  <c:v>Category 4</c:v>
+                </c:pt>
+              </c:strCache>
+            </c:strRef>
+          </c:cat>
+          <c:val>
+            <c:numRef>
+              <c:f>Sheet1!$B$2:$B$5</c:f>
+              <c:numCache>
+                <c:formatCode>General</c:formatCode>
+                <c:ptCount val="4"/>
+                <c:pt idx="0">
+                  <c:v>4.3</c:v>
+                </c:pt>
+                <c:pt idx="1">
+                  <c:v>2.5</c:v>
+                </c:pt>
+                <c:pt idx="2">
+                  <c:v>3.5</c:v>
+                </c:pt>
+                <c:pt idx="3">
+                  <c:v>4.5</c:v>
+                </c:pt>
+              </c:numCache>
+            </c:numRef>
+          </c:val>
+        </c:ser>
+        <c:ser>
+          <c:idx val="1"/>
+          <c:order val="1"/>
+          <c:tx>
+            <c:strRef>
+              <c:f>Sheet1!$C$1</c:f>
+              <c:strCache>
+                <c:ptCount val="1"/>
+                <c:pt idx="0">
+                  <c:v>Series 2</c:v>
+                </c:pt>
+              </c:strCache>
+            </c:strRef>
+          </c:tx>
+          <c:invertIfNegative val="0"/>
+          <c:cat>
+            <c:strRef>
+              <c:f>Sheet1!$A$2:$A$5</c:f>
+              <c:strCache>
+                <c:ptCount val="4"/>
+                <c:pt idx="0">
+                  <c:v>Category 1</c:v>
+                </c:pt>
+                <c:pt idx="1">
+                  <c:v>Category 2</c:v>
+                </c:pt>
+                <c:pt idx="2">
+                  <c:v>Category 3</c:v>
+                </c:pt>
+                <c:pt idx="3">
+                  <c:v>Category 4</c:v>
+                </c:pt>
+              </c:strCache>
+            </c:strRef>
+          </c:cat>
+          <c:val>
+            <c:numRef>
+              <c:f>Sheet1!$C$2:$C$5</c:f>
+              <c:numCache>
+                <c:formatCode>General</c:formatCode>
+                <c:ptCount val="4"/>
+                <c:pt idx="0">
+                  <c:v>2.4</c:v>
+                </c:pt>
+                <c:pt idx="1">
+                  <c:v>4.4</c:v>
+                </c:pt>
+                <c:pt idx="2">
+                  <c:v>1.8</c:v>
+                </c:pt>
+                <c:pt idx="3">
+                  <c:v>2.8</c:v>
+                </c:pt>
+              </c:numCache>
+            </c:numRef>
+          </c:val>
+        </c:ser>
+        <c:ser>
+          <c:idx val="2"/>
+          <c:order val="2"/>
+          <c:tx>
+            <c:strRef>
+              <c:f>Sheet1!$D$1</c:f>
+              <c:strCache>
+                <c:ptCount val="1"/>
+                <c:pt idx="0">
+                  <c:v>Series 3</c:v>
+                </c:pt>
+              </c:strCache>
+            </c:strRef>
+          </c:tx>
+          <c:invertIfNegative val="0"/>
+          <c:cat>
+            <c:strRef>
+              <c:f>Sheet1!$A$2:$A$5</c:f>
+              <c:strCache>
+                <c:ptCount val="4"/>
+                <c:pt idx="0">
+                  <c:v>Category 1</c:v>
+                </c:pt>
+                <c:pt idx="1">
+                  <c:v>Category 2</c:v>
+                </c:pt>
+                <c:pt idx="2">
+                  <c:v>Category 3</c:v>
+                </c:pt>
+                <c:pt idx="3">
+                  <c:v>Category 4</c:v>
+                </c:pt>
+              </c:strCache>
+            </c:strRef>
+          </c:cat>
+          <c:val>
+            <c:numRef>
+              <c:f>Sheet1!$D$2:$D$5</c:f>
+              <c:numCache>
+                <c:formatCode>General</c:formatCode>
+                <c:ptCount val="4"/>
+                <c:pt idx="0">
+                  <c:v>2.0</c:v>
+                </c:pt>
+                <c:pt idx="1">
+                  <c:v>2.0</c:v>
+                </c:pt>
+                <c:pt idx="2">
+                  <c:v>3.0</c:v>
+                </c:pt>
+                <c:pt idx="3">
+                  <c:v>5.0</c:v>
+                </c:pt>
+              </c:numCache>
+            </c:numRef>
+          </c:val>
+        </c:ser>
+        <c:dLbls>
+          <c:showLegendKey val="0"/>
+          <c:showVal val="0"/>
+          <c:showCatName val="0"/>
+          <c:showSerName val="0"/>
+          <c:showPercent val="0"/>
+          <c:showBubbleSize val="0"/>
+        </c:dLbls>
+        <c:gapWidth val="150"/>
+        <c:axId val="-2130016488"/>
+        <c:axId val="-2067475064"/>
+      </c:barChart>
+      <c:catAx>
+        <c:axId val="-2130016488"/>
+        <c:scaling>
+          <c:orientation val="minMax"/>
+        </c:scaling>
+        <c:delete val="0"/>
+        <c:axPos val="l"/>
+        <c:majorTickMark val="none"/>
+        <c:minorTickMark val="none"/>
+        <c:tickLblPos val="none"/>
+        <c:crossAx val="-2067475064"/>
+        <c:crosses val="autoZero"/>
+        <c:auto val="1"/>
+        <c:lblAlgn val="ctr"/>
+        <c:lblOffset val="100"/>
+        <c:noMultiLvlLbl val="0"/>
+      </c:catAx>
+      <c:valAx>
+        <c:axId val="-2067475064"/>
+        <c:scaling>
+          <c:orientation val="minMax"/>
+        </c:scaling>
+        <c:delete val="0"/>
+        <c:axPos val="b"/>
+        <c:majorGridlines/>
+        <c:numFmt formatCode="General" sourceLinked="1"/>
+        <c:majorTickMark val="out"/>
+        <c:minorTickMark val="none"/>
+        <c:tickLblPos val="nextTo"/>
+        <c:crossAx val="-2130016488"/>
+        <c:crosses val="autoZero"/>
+        <c:crossBetween val="between"/>
+      </c:valAx>
+    </c:plotArea>
+    <c:plotVisOnly val="1"/>
+    <c:dispBlanksAs val="gap"/>
+    <c:showDLblsOverMax val="0"/>
+  </c:chart>
+  <c:txPr>
+    <a:bodyPr/>
+    <a:lstStyle/>
+    <a:p>
+      <a:pPr>
+        <a:defRPr sz="1800"/>
+      </a:pPr>
+      <a:endParaRPr lang="en-US"/>
+    </a:p>
+  </c:txPr>
+  <c:externalData r:id="rId1">
+    <c:autoUpdate val="0"/>
+  </c:externalData>
+</c:chartSpace>
+</file>
+
+<file path=ppt/charts/chart8.xml><?xml version="1.0" encoding="utf-8"?>
+<c:chartSpace xmlns:c="http://schemas.openxmlformats.org/drawingml/2006/chart" xmlns:a="http://schemas.openxmlformats.org/drawingml/2006/main" xmlns:r="http://schemas.openxmlformats.org/officeDocument/2006/relationships">
+  <c:date1904 val="0"/>
+  <c:lang val="en-US"/>
+  <c:roundedCorners val="0"/>
+  <mc:AlternateContent xmlns:mc="http://schemas.openxmlformats.org/markup-compatibility/2006">
+    <mc:Choice xmlns:c14="http://schemas.microsoft.com/office/drawing/2007/8/2/chart" Requires="c14">
+      <c14:style val="118"/>
+    </mc:Choice>
+    <mc:Fallback>
+      <c:style val="18"/>
+    </mc:Fallback>
+  </mc:AlternateContent>
+  <c:chart>
+    <c:autoTitleDeleted val="0"/>
+    <c:plotArea>
+      <c:layout/>
+      <c:barChart>
+        <c:barDir val="bar"/>
+        <c:grouping val="stacked"/>
+        <c:varyColors val="0"/>
+        <c:ser>
+          <c:idx val="0"/>
+          <c:order val="0"/>
+          <c:tx>
+            <c:strRef>
+              <c:f>Sheet1!$B$1</c:f>
+              <c:strCache>
+                <c:ptCount val="1"/>
+                <c:pt idx="0">
+                  <c:v>Series 1</c:v>
+                </c:pt>
+              </c:strCache>
+            </c:strRef>
+          </c:tx>
+          <c:invertIfNegative val="0"/>
+          <c:cat>
+            <c:strRef>
+              <c:f>Sheet1!$A$2:$A$5</c:f>
+              <c:strCache>
+                <c:ptCount val="4"/>
+                <c:pt idx="0">
+                  <c:v>Category 1</c:v>
+                </c:pt>
+                <c:pt idx="1">
+                  <c:v>Category 2</c:v>
+                </c:pt>
+                <c:pt idx="2">
+                  <c:v>Category 3</c:v>
+                </c:pt>
+                <c:pt idx="3">
+                  <c:v>Category 4</c:v>
+                </c:pt>
+              </c:strCache>
+            </c:strRef>
+          </c:cat>
+          <c:val>
+            <c:numRef>
+              <c:f>Sheet1!$B$2:$B$5</c:f>
+              <c:numCache>
+                <c:formatCode>General</c:formatCode>
+                <c:ptCount val="4"/>
+                <c:pt idx="0">
+                  <c:v>4.3</c:v>
+                </c:pt>
+                <c:pt idx="1">
+                  <c:v>2.5</c:v>
+                </c:pt>
+                <c:pt idx="2">
+                  <c:v>3.5</c:v>
+                </c:pt>
+                <c:pt idx="3">
+                  <c:v>4.5</c:v>
+                </c:pt>
+              </c:numCache>
+            </c:numRef>
+          </c:val>
+        </c:ser>
+        <c:ser>
+          <c:idx val="1"/>
+          <c:order val="1"/>
+          <c:tx>
+            <c:strRef>
+              <c:f>Sheet1!$C$1</c:f>
+              <c:strCache>
+                <c:ptCount val="1"/>
+                <c:pt idx="0">
+                  <c:v>Series 2</c:v>
+                </c:pt>
+              </c:strCache>
+            </c:strRef>
+          </c:tx>
+          <c:invertIfNegative val="0"/>
+          <c:cat>
+            <c:strRef>
+              <c:f>Sheet1!$A$2:$A$5</c:f>
+              <c:strCache>
+                <c:ptCount val="4"/>
+                <c:pt idx="0">
+                  <c:v>Category 1</c:v>
+                </c:pt>
+                <c:pt idx="1">
+                  <c:v>Category 2</c:v>
+                </c:pt>
+                <c:pt idx="2">
+                  <c:v>Category 3</c:v>
+                </c:pt>
+                <c:pt idx="3">
+                  <c:v>Category 4</c:v>
+                </c:pt>
+              </c:strCache>
+            </c:strRef>
+          </c:cat>
+          <c:val>
+            <c:numRef>
+              <c:f>Sheet1!$C$2:$C$5</c:f>
+              <c:numCache>
+                <c:formatCode>General</c:formatCode>
+                <c:ptCount val="4"/>
+                <c:pt idx="0">
+                  <c:v>2.4</c:v>
+                </c:pt>
+                <c:pt idx="1">
+                  <c:v>4.4</c:v>
+                </c:pt>
+                <c:pt idx="2">
+                  <c:v>1.8</c:v>
+                </c:pt>
+                <c:pt idx="3">
+                  <c:v>2.8</c:v>
+                </c:pt>
+              </c:numCache>
+            </c:numRef>
+          </c:val>
+        </c:ser>
+        <c:ser>
+          <c:idx val="2"/>
+          <c:order val="2"/>
+          <c:tx>
+            <c:strRef>
+              <c:f>Sheet1!$D$1</c:f>
+              <c:strCache>
+                <c:ptCount val="1"/>
+                <c:pt idx="0">
+                  <c:v>Series 3</c:v>
+                </c:pt>
+              </c:strCache>
+            </c:strRef>
+          </c:tx>
+          <c:invertIfNegative val="0"/>
+          <c:cat>
+            <c:strRef>
+              <c:f>Sheet1!$A$2:$A$5</c:f>
+              <c:strCache>
+                <c:ptCount val="4"/>
+                <c:pt idx="0">
+                  <c:v>Category 1</c:v>
+                </c:pt>
+                <c:pt idx="1">
+                  <c:v>Category 2</c:v>
+                </c:pt>
+                <c:pt idx="2">
+                  <c:v>Category 3</c:v>
+                </c:pt>
+                <c:pt idx="3">
+                  <c:v>Category 4</c:v>
+                </c:pt>
+              </c:strCache>
+            </c:strRef>
+          </c:cat>
+          <c:val>
+            <c:numRef>
+              <c:f>Sheet1!$D$2:$D$5</c:f>
+              <c:numCache>
+                <c:formatCode>General</c:formatCode>
+                <c:ptCount val="4"/>
+                <c:pt idx="0">
+                  <c:v>2.0</c:v>
+                </c:pt>
+                <c:pt idx="1">
+                  <c:v>2.0</c:v>
+                </c:pt>
+                <c:pt idx="2">
+                  <c:v>3.0</c:v>
+                </c:pt>
+                <c:pt idx="3">
+                  <c:v>5.0</c:v>
+                </c:pt>
+              </c:numCache>
+            </c:numRef>
+          </c:val>
+        </c:ser>
+        <c:dLbls>
+          <c:showLegendKey val="0"/>
+          <c:showVal val="0"/>
+          <c:showCatName val="0"/>
+          <c:showSerName val="0"/>
+          <c:showPercent val="0"/>
+          <c:showBubbleSize val="0"/>
+        </c:dLbls>
+        <c:gapWidth val="150"/>
+        <c:overlap val="100"/>
+        <c:axId val="-2066153896"/>
+        <c:axId val="-2065454808"/>
+      </c:barChart>
+      <c:catAx>
+        <c:axId val="-2066153896"/>
+        <c:scaling>
+          <c:orientation val="minMax"/>
+        </c:scaling>
+        <c:delete val="0"/>
+        <c:axPos val="l"/>
+        <c:majorTickMark val="none"/>
+        <c:minorTickMark val="none"/>
+        <c:tickLblPos val="none"/>
+        <c:crossAx val="-2065454808"/>
+        <c:crosses val="autoZero"/>
+        <c:auto val="1"/>
+        <c:lblAlgn val="ctr"/>
+        <c:lblOffset val="100"/>
+        <c:noMultiLvlLbl val="0"/>
+      </c:catAx>
+      <c:valAx>
+        <c:axId val="-2065454808"/>
+        <c:scaling>
+          <c:orientation val="minMax"/>
+        </c:scaling>
+        <c:delete val="0"/>
+        <c:axPos val="b"/>
+        <c:majorGridlines/>
+        <c:numFmt formatCode="General" sourceLinked="1"/>
+        <c:majorTickMark val="out"/>
+        <c:minorTickMark val="none"/>
+        <c:tickLblPos val="nextTo"/>
+        <c:crossAx val="-2066153896"/>
+        <c:crosses val="autoZero"/>
+        <c:crossBetween val="between"/>
+      </c:valAx>
+    </c:plotArea>
+    <c:plotVisOnly val="1"/>
+    <c:dispBlanksAs val="gap"/>
+    <c:showDLblsOverMax val="0"/>
+  </c:chart>
+  <c:txPr>
+    <a:bodyPr/>
+    <a:lstStyle/>
+    <a:p>
+      <a:pPr>
+        <a:defRPr sz="1800"/>
+      </a:pPr>
+      <a:endParaRPr lang="en-US"/>
+    </a:p>
+  </c:txPr>
+  <c:externalData r:id="rId1">
+    <c:autoUpdate val="0"/>
+  </c:externalData>
+</c:chartSpace>
+</file>
+
+<file path=ppt/charts/chart9.xml><?xml version="1.0" encoding="utf-8"?>
+<c:chartSpace xmlns:c="http://schemas.openxmlformats.org/drawingml/2006/chart" xmlns:a="http://schemas.openxmlformats.org/drawingml/2006/main" xmlns:r="http://schemas.openxmlformats.org/officeDocument/2006/relationships">
+  <c:date1904 val="0"/>
+  <c:lang val="en-US"/>
+  <c:roundedCorners val="0"/>
+  <mc:AlternateContent xmlns:mc="http://schemas.openxmlformats.org/markup-compatibility/2006">
+    <mc:Choice xmlns:c14="http://schemas.microsoft.com/office/drawing/2007/8/2/chart" Requires="c14">
+      <c14:style val="118"/>
+    </mc:Choice>
+    <mc:Fallback>
+      <c:style val="18"/>
+    </mc:Fallback>
+  </mc:AlternateContent>
+  <c:chart>
+    <c:autoTitleDeleted val="0"/>
+    <c:plotArea>
+      <c:layout/>
+      <c:barChart>
+        <c:barDir val="bar"/>
+        <c:grouping val="percentStacked"/>
+        <c:varyColors val="0"/>
+        <c:ser>
+          <c:idx val="0"/>
+          <c:order val="0"/>
+          <c:tx>
+            <c:strRef>
+              <c:f>Sheet1!$B$1</c:f>
+              <c:strCache>
+                <c:ptCount val="1"/>
+                <c:pt idx="0">
+                  <c:v>Series 1</c:v>
+                </c:pt>
+              </c:strCache>
+            </c:strRef>
+          </c:tx>
+          <c:invertIfNegative val="0"/>
+          <c:cat>
+            <c:strRef>
+              <c:f>Sheet1!$A$2:$A$5</c:f>
+              <c:strCache>
+                <c:ptCount val="4"/>
+                <c:pt idx="0">
+                  <c:v>Category 1</c:v>
+                </c:pt>
+                <c:pt idx="1">
+                  <c:v>Category 2</c:v>
+                </c:pt>
+                <c:pt idx="2">
+                  <c:v>Category 3</c:v>
+                </c:pt>
+                <c:pt idx="3">
+                  <c:v>Category 4</c:v>
+                </c:pt>
+              </c:strCache>
+            </c:strRef>
+          </c:cat>
+          <c:val>
+            <c:numRef>
+              <c:f>Sheet1!$B$2:$B$5</c:f>
+              <c:numCache>
+                <c:formatCode>General</c:formatCode>
+                <c:ptCount val="4"/>
+                <c:pt idx="0">
+                  <c:v>4.3</c:v>
+                </c:pt>
+                <c:pt idx="1">
+                  <c:v>2.5</c:v>
+                </c:pt>
+                <c:pt idx="2">
+                  <c:v>3.5</c:v>
+                </c:pt>
+                <c:pt idx="3">
+                  <c:v>4.5</c:v>
+                </c:pt>
+              </c:numCache>
+            </c:numRef>
+          </c:val>
+        </c:ser>
+        <c:ser>
+          <c:idx val="1"/>
+          <c:order val="1"/>
+          <c:tx>
+            <c:strRef>
+              <c:f>Sheet1!$C$1</c:f>
+              <c:strCache>
+                <c:ptCount val="1"/>
+                <c:pt idx="0">
+                  <c:v>Series 2</c:v>
+                </c:pt>
+              </c:strCache>
+            </c:strRef>
+          </c:tx>
+          <c:invertIfNegative val="0"/>
+          <c:cat>
+            <c:strRef>
+              <c:f>Sheet1!$A$2:$A$5</c:f>
+              <c:strCache>
+                <c:ptCount val="4"/>
+                <c:pt idx="0">
+                  <c:v>Category 1</c:v>
+                </c:pt>
+                <c:pt idx="1">
+                  <c:v>Category 2</c:v>
+                </c:pt>
+                <c:pt idx="2">
+                  <c:v>Category 3</c:v>
+                </c:pt>
+                <c:pt idx="3">
+                  <c:v>Category 4</c:v>
+                </c:pt>
+              </c:strCache>
+            </c:strRef>
+          </c:cat>
+          <c:val>
+            <c:numRef>
+              <c:f>Sheet1!$C$2:$C$5</c:f>
+              <c:numCache>
+                <c:formatCode>General</c:formatCode>
+                <c:ptCount val="4"/>
+                <c:pt idx="0">
+                  <c:v>2.4</c:v>
+                </c:pt>
+                <c:pt idx="1">
+                  <c:v>4.4</c:v>
+                </c:pt>
+                <c:pt idx="2">
+                  <c:v>1.8</c:v>
+                </c:pt>
+                <c:pt idx="3">
+                  <c:v>2.8</c:v>
+                </c:pt>
+              </c:numCache>
+            </c:numRef>
+          </c:val>
+        </c:ser>
+        <c:ser>
+          <c:idx val="2"/>
+          <c:order val="2"/>
+          <c:tx>
+            <c:strRef>
+              <c:f>Sheet1!$D$1</c:f>
+              <c:strCache>
+                <c:ptCount val="1"/>
+                <c:pt idx="0">
+                  <c:v>Series 3</c:v>
+                </c:pt>
+              </c:strCache>
+            </c:strRef>
+          </c:tx>
+          <c:invertIfNegative val="0"/>
+          <c:cat>
+            <c:strRef>
+              <c:f>Sheet1!$A$2:$A$5</c:f>
+              <c:strCache>
+                <c:ptCount val="4"/>
+                <c:pt idx="0">
+                  <c:v>Category 1</c:v>
+                </c:pt>
+                <c:pt idx="1">
+                  <c:v>Category 2</c:v>
+                </c:pt>
+                <c:pt idx="2">
+                  <c:v>Category 3</c:v>
+                </c:pt>
+                <c:pt idx="3">
+                  <c:v>Category 4</c:v>
+                </c:pt>
+              </c:strCache>
+            </c:strRef>
+          </c:cat>
+          <c:val>
+            <c:numRef>
+              <c:f>Sheet1!$D$2:$D$5</c:f>
+              <c:numCache>
+                <c:formatCode>General</c:formatCode>
+                <c:ptCount val="4"/>
+                <c:pt idx="0">
+                  <c:v>2.0</c:v>
+                </c:pt>
+                <c:pt idx="1">
+                  <c:v>2.0</c:v>
+                </c:pt>
+                <c:pt idx="2">
+                  <c:v>3.0</c:v>
+                </c:pt>
+                <c:pt idx="3">
+                  <c:v>5.0</c:v>
+                </c:pt>
+              </c:numCache>
+            </c:numRef>
+          </c:val>
+        </c:ser>
+        <c:dLbls>
+          <c:showLegendKey val="0"/>
+          <c:showVal val="0"/>
+          <c:showCatName val="0"/>
+          <c:showSerName val="0"/>
+          <c:showPercent val="0"/>
+          <c:showBubbleSize val="0"/>
+        </c:dLbls>
+        <c:gapWidth val="150"/>
+        <c:overlap val="100"/>
+        <c:axId val="-2130300488"/>
+        <c:axId val="-2064180088"/>
+      </c:barChart>
+      <c:catAx>
+        <c:axId val="-2130300488"/>
+        <c:scaling>
+          <c:orientation val="minMax"/>
+        </c:scaling>
+        <c:delete val="0"/>
+        <c:axPos val="l"/>
+        <c:majorTickMark val="none"/>
+        <c:minorTickMark val="none"/>
+        <c:tickLblPos val="none"/>
+        <c:crossAx val="-2064180088"/>
+        <c:crosses val="autoZero"/>
+        <c:auto val="1"/>
+        <c:lblAlgn val="ctr"/>
+        <c:lblOffset val="100"/>
+        <c:noMultiLvlLbl val="0"/>
+      </c:catAx>
+      <c:valAx>
+        <c:axId val="-2064180088"/>
+        <c:scaling>
+          <c:orientation val="minMax"/>
+        </c:scaling>
+        <c:delete val="0"/>
+        <c:axPos val="b"/>
+        <c:majorGridlines/>
+        <c:numFmt formatCode="0%" sourceLinked="1"/>
+        <c:majorTickMark val="out"/>
+        <c:minorTickMark val="none"/>
+        <c:tickLblPos val="nextTo"/>
+        <c:crossAx val="-2130300488"/>
+        <c:crosses val="autoZero"/>
+        <c:crossBetween val="between"/>
+      </c:valAx>
+    </c:plotArea>
+    <c:plotVisOnly val="1"/>
+    <c:dispBlanksAs val="gap"/>
     <c:showDLblsOverMax val="0"/>
   </c:chart>
   <c:txPr>
@@ -1902,6 +3455,168 @@
 </p:sld>
 </file>
 
+<file path=ppt/slides/slide2.xml><?xml version="1.0" encoding="utf-8"?>
+<p:sld xmlns:a="http://schemas.openxmlformats.org/drawingml/2006/main" xmlns:r="http://schemas.openxmlformats.org/officeDocument/2006/relationships" xmlns:p="http://schemas.openxmlformats.org/presentationml/2006/main">
+  <p:cSld>
+    <p:spTree>
+      <p:nvGrpSpPr>
+        <p:cNvPr id="1" name=""/>
+        <p:cNvGrpSpPr/>
+        <p:nvPr/>
+      </p:nvGrpSpPr>
+      <p:grpSpPr>
+        <a:xfrm>
+          <a:off x="0" y="0"/>
+          <a:ext cx="0" cy="0"/>
+          <a:chOff x="0" y="0"/>
+          <a:chExt cx="0" cy="0"/>
+        </a:xfrm>
+      </p:grpSpPr>
+      <p:graphicFrame>
+        <p:nvGraphicFramePr>
+          <p:cNvPr id="2" name="Chart 1"/>
+          <p:cNvGraphicFramePr/>
+          <p:nvPr>
+            <p:extLst>
+              <p:ext uri="{D42A27DB-BD31-4B8C-83A1-F6EECF244321}">
+                <p14:modId xmlns:p14="http://schemas.microsoft.com/office/powerpoint/2010/main" val="2262689881"/>
+              </p:ext>
+            </p:extLst>
+          </p:nvPr>
+        </p:nvGraphicFramePr>
+        <p:xfrm>
+          <a:off x="228600" y="228600"/>
+          <a:ext cx="2759224" cy="2768352"/>
+        </p:xfrm>
+        <a:graphic>
+          <a:graphicData uri="http://schemas.openxmlformats.org/drawingml/2006/chart">
+            <c:chart xmlns:c="http://schemas.openxmlformats.org/drawingml/2006/chart" xmlns:r="http://schemas.openxmlformats.org/officeDocument/2006/relationships" r:id="rId2"/>
+          </a:graphicData>
+        </a:graphic>
+      </p:graphicFrame>
+      <p:graphicFrame>
+        <p:nvGraphicFramePr>
+          <p:cNvPr id="3" name="Chart 2"/>
+          <p:cNvGraphicFramePr/>
+          <p:nvPr>
+            <p:extLst>
+              <p:ext uri="{D42A27DB-BD31-4B8C-83A1-F6EECF244321}">
+                <p14:modId xmlns:p14="http://schemas.microsoft.com/office/powerpoint/2010/main" val="1199929666"/>
+              </p:ext>
+            </p:extLst>
+          </p:nvPr>
+        </p:nvGraphicFramePr>
+        <p:xfrm>
+          <a:off x="3200400" y="228600"/>
+          <a:ext cx="2759968" cy="2752080"/>
+        </p:xfrm>
+        <a:graphic>
+          <a:graphicData uri="http://schemas.openxmlformats.org/drawingml/2006/chart">
+            <c:chart xmlns:c="http://schemas.openxmlformats.org/drawingml/2006/chart" xmlns:r="http://schemas.openxmlformats.org/officeDocument/2006/relationships" r:id="rId3"/>
+          </a:graphicData>
+        </a:graphic>
+      </p:graphicFrame>
+      <p:graphicFrame>
+        <p:nvGraphicFramePr>
+          <p:cNvPr id="4" name="Chart 3"/>
+          <p:cNvGraphicFramePr/>
+          <p:nvPr>
+            <p:extLst>
+              <p:ext uri="{D42A27DB-BD31-4B8C-83A1-F6EECF244321}">
+                <p14:modId xmlns:p14="http://schemas.microsoft.com/office/powerpoint/2010/main" val="3832963034"/>
+              </p:ext>
+            </p:extLst>
+          </p:nvPr>
+        </p:nvGraphicFramePr>
+        <p:xfrm>
+          <a:off x="6172200" y="228600"/>
+          <a:ext cx="2759968" cy="2752080"/>
+        </p:xfrm>
+        <a:graphic>
+          <a:graphicData uri="http://schemas.openxmlformats.org/drawingml/2006/chart">
+            <c:chart xmlns:c="http://schemas.openxmlformats.org/drawingml/2006/chart" xmlns:r="http://schemas.openxmlformats.org/officeDocument/2006/relationships" r:id="rId4"/>
+          </a:graphicData>
+        </a:graphic>
+      </p:graphicFrame>
+      <p:graphicFrame>
+        <p:nvGraphicFramePr>
+          <p:cNvPr id="5" name="Chart 4"/>
+          <p:cNvGraphicFramePr/>
+          <p:nvPr>
+            <p:extLst>
+              <p:ext uri="{D42A27DB-BD31-4B8C-83A1-F6EECF244321}">
+                <p14:modId xmlns:p14="http://schemas.microsoft.com/office/powerpoint/2010/main" val="4184429407"/>
+              </p:ext>
+            </p:extLst>
+          </p:nvPr>
+        </p:nvGraphicFramePr>
+        <p:xfrm>
+          <a:off x="228600" y="3886200"/>
+          <a:ext cx="2736304" cy="2736304"/>
+        </p:xfrm>
+        <a:graphic>
+          <a:graphicData uri="http://schemas.openxmlformats.org/drawingml/2006/chart">
+            <c:chart xmlns:c="http://schemas.openxmlformats.org/drawingml/2006/chart" xmlns:r="http://schemas.openxmlformats.org/officeDocument/2006/relationships" r:id="rId5"/>
+          </a:graphicData>
+        </a:graphic>
+      </p:graphicFrame>
+      <p:graphicFrame>
+        <p:nvGraphicFramePr>
+          <p:cNvPr id="6" name="Chart 5"/>
+          <p:cNvGraphicFramePr/>
+          <p:nvPr>
+            <p:extLst>
+              <p:ext uri="{D42A27DB-BD31-4B8C-83A1-F6EECF244321}">
+                <p14:modId xmlns:p14="http://schemas.microsoft.com/office/powerpoint/2010/main" val="4276786718"/>
+              </p:ext>
+            </p:extLst>
+          </p:nvPr>
+        </p:nvGraphicFramePr>
+        <p:xfrm>
+          <a:off x="3200400" y="3886200"/>
+          <a:ext cx="2759968" cy="2752080"/>
+        </p:xfrm>
+        <a:graphic>
+          <a:graphicData uri="http://schemas.openxmlformats.org/drawingml/2006/chart">
+            <c:chart xmlns:c="http://schemas.openxmlformats.org/drawingml/2006/chart" xmlns:r="http://schemas.openxmlformats.org/officeDocument/2006/relationships" r:id="rId6"/>
+          </a:graphicData>
+        </a:graphic>
+      </p:graphicFrame>
+      <p:graphicFrame>
+        <p:nvGraphicFramePr>
+          <p:cNvPr id="7" name="Chart 6"/>
+          <p:cNvGraphicFramePr/>
+          <p:nvPr>
+            <p:extLst>
+              <p:ext uri="{D42A27DB-BD31-4B8C-83A1-F6EECF244321}">
+                <p14:modId xmlns:p14="http://schemas.microsoft.com/office/powerpoint/2010/main" val="2052763083"/>
+              </p:ext>
+            </p:extLst>
+          </p:nvPr>
+        </p:nvGraphicFramePr>
+        <p:xfrm>
+          <a:off x="6172200" y="3886200"/>
+          <a:ext cx="2759968" cy="2752080"/>
+        </p:xfrm>
+        <a:graphic>
+          <a:graphicData uri="http://schemas.openxmlformats.org/drawingml/2006/chart">
+            <c:chart xmlns:c="http://schemas.openxmlformats.org/drawingml/2006/chart" xmlns:r="http://schemas.openxmlformats.org/officeDocument/2006/relationships" r:id="rId7"/>
+          </a:graphicData>
+        </a:graphic>
+      </p:graphicFrame>
+    </p:spTree>
+    <p:extLst>
+      <p:ext uri="{BB962C8B-B14F-4D97-AF65-F5344CB8AC3E}">
+        <p14:creationId xmlns:p14="http://schemas.microsoft.com/office/powerpoint/2010/main" val="4244329123"/>
+      </p:ext>
+    </p:extLst>
+  </p:cSld>
+  <p:clrMapOvr>
+    <a:masterClrMapping/>
+  </p:clrMapOvr>
+</p:sld>
+</file>
+
 <file path=ppt/theme/theme1.xml><?xml version="1.0" encoding="utf-8"?>
 <a:theme xmlns:a="http://schemas.openxmlformats.org/drawingml/2006/main" name="Office Theme">
   <a:themeElements>

</xml_diff>

<commit_message>
acpt: add scenarios for Line chart types
</commit_message>
<xml_diff>
--- a/features/steps/test_files/cht-chart-type.pptx
+++ b/features/steps/test_files/cht-chart-type.pptx
@@ -7,6 +7,7 @@
   <p:sldIdLst>
     <p:sldId id="256" r:id="rId2"/>
     <p:sldId id="257" r:id="rId3"/>
+    <p:sldId id="258" r:id="rId4"/>
   </p:sldIdLst>
   <p:sldSz cx="9144000" cy="6858000" type="screen4x3"/>
   <p:notesSz cx="6858000" cy="9144000"/>
@@ -1077,6 +1078,1581 @@
     </c:plotArea>
     <c:plotVisOnly val="1"/>
     <c:dispBlanksAs val="gap"/>
+    <c:showDLblsOverMax val="0"/>
+  </c:chart>
+  <c:txPr>
+    <a:bodyPr/>
+    <a:lstStyle/>
+    <a:p>
+      <a:pPr>
+        <a:defRPr sz="1800"/>
+      </a:pPr>
+      <a:endParaRPr lang="en-US"/>
+    </a:p>
+  </c:txPr>
+  <c:externalData r:id="rId1">
+    <c:autoUpdate val="0"/>
+  </c:externalData>
+</c:chartSpace>
+</file>
+
+<file path=ppt/charts/chart13.xml><?xml version="1.0" encoding="utf-8"?>
+<c:chartSpace xmlns:c="http://schemas.openxmlformats.org/drawingml/2006/chart" xmlns:a="http://schemas.openxmlformats.org/drawingml/2006/main" xmlns:r="http://schemas.openxmlformats.org/officeDocument/2006/relationships">
+  <c:date1904 val="0"/>
+  <c:lang val="en-US"/>
+  <c:roundedCorners val="0"/>
+  <mc:AlternateContent xmlns:mc="http://schemas.openxmlformats.org/markup-compatibility/2006">
+    <mc:Choice xmlns:c14="http://schemas.microsoft.com/office/drawing/2007/8/2/chart" Requires="c14">
+      <c14:style val="118"/>
+    </mc:Choice>
+    <mc:Fallback>
+      <c:style val="18"/>
+    </mc:Fallback>
+  </mc:AlternateContent>
+  <c:chart>
+    <c:autoTitleDeleted val="0"/>
+    <c:plotArea>
+      <c:layout/>
+      <c:lineChart>
+        <c:grouping val="standard"/>
+        <c:varyColors val="0"/>
+        <c:ser>
+          <c:idx val="0"/>
+          <c:order val="0"/>
+          <c:tx>
+            <c:strRef>
+              <c:f>Sheet1!$B$1</c:f>
+              <c:strCache>
+                <c:ptCount val="1"/>
+                <c:pt idx="0">
+                  <c:v>Series 1</c:v>
+                </c:pt>
+              </c:strCache>
+            </c:strRef>
+          </c:tx>
+          <c:marker>
+            <c:symbol val="none"/>
+          </c:marker>
+          <c:cat>
+            <c:strRef>
+              <c:f>Sheet1!$A$2:$A$5</c:f>
+              <c:strCache>
+                <c:ptCount val="4"/>
+                <c:pt idx="0">
+                  <c:v>Category 1</c:v>
+                </c:pt>
+                <c:pt idx="1">
+                  <c:v>Category 2</c:v>
+                </c:pt>
+                <c:pt idx="2">
+                  <c:v>Category 3</c:v>
+                </c:pt>
+                <c:pt idx="3">
+                  <c:v>Category 4</c:v>
+                </c:pt>
+              </c:strCache>
+            </c:strRef>
+          </c:cat>
+          <c:val>
+            <c:numRef>
+              <c:f>Sheet1!$B$2:$B$5</c:f>
+              <c:numCache>
+                <c:formatCode>General</c:formatCode>
+                <c:ptCount val="4"/>
+                <c:pt idx="0">
+                  <c:v>4.3</c:v>
+                </c:pt>
+                <c:pt idx="1">
+                  <c:v>2.5</c:v>
+                </c:pt>
+                <c:pt idx="2">
+                  <c:v>3.5</c:v>
+                </c:pt>
+                <c:pt idx="3">
+                  <c:v>4.5</c:v>
+                </c:pt>
+              </c:numCache>
+            </c:numRef>
+          </c:val>
+          <c:smooth val="0"/>
+        </c:ser>
+        <c:ser>
+          <c:idx val="1"/>
+          <c:order val="1"/>
+          <c:tx>
+            <c:strRef>
+              <c:f>Sheet1!$C$1</c:f>
+              <c:strCache>
+                <c:ptCount val="1"/>
+                <c:pt idx="0">
+                  <c:v>Series 2</c:v>
+                </c:pt>
+              </c:strCache>
+            </c:strRef>
+          </c:tx>
+          <c:marker>
+            <c:symbol val="none"/>
+          </c:marker>
+          <c:cat>
+            <c:strRef>
+              <c:f>Sheet1!$A$2:$A$5</c:f>
+              <c:strCache>
+                <c:ptCount val="4"/>
+                <c:pt idx="0">
+                  <c:v>Category 1</c:v>
+                </c:pt>
+                <c:pt idx="1">
+                  <c:v>Category 2</c:v>
+                </c:pt>
+                <c:pt idx="2">
+                  <c:v>Category 3</c:v>
+                </c:pt>
+                <c:pt idx="3">
+                  <c:v>Category 4</c:v>
+                </c:pt>
+              </c:strCache>
+            </c:strRef>
+          </c:cat>
+          <c:val>
+            <c:numRef>
+              <c:f>Sheet1!$C$2:$C$5</c:f>
+              <c:numCache>
+                <c:formatCode>General</c:formatCode>
+                <c:ptCount val="4"/>
+                <c:pt idx="0">
+                  <c:v>2.4</c:v>
+                </c:pt>
+                <c:pt idx="1">
+                  <c:v>4.4</c:v>
+                </c:pt>
+                <c:pt idx="2">
+                  <c:v>1.8</c:v>
+                </c:pt>
+                <c:pt idx="3">
+                  <c:v>2.8</c:v>
+                </c:pt>
+              </c:numCache>
+            </c:numRef>
+          </c:val>
+          <c:smooth val="0"/>
+        </c:ser>
+        <c:ser>
+          <c:idx val="2"/>
+          <c:order val="2"/>
+          <c:tx>
+            <c:strRef>
+              <c:f>Sheet1!$D$1</c:f>
+              <c:strCache>
+                <c:ptCount val="1"/>
+                <c:pt idx="0">
+                  <c:v>Series 3</c:v>
+                </c:pt>
+              </c:strCache>
+            </c:strRef>
+          </c:tx>
+          <c:marker>
+            <c:symbol val="none"/>
+          </c:marker>
+          <c:cat>
+            <c:strRef>
+              <c:f>Sheet1!$A$2:$A$5</c:f>
+              <c:strCache>
+                <c:ptCount val="4"/>
+                <c:pt idx="0">
+                  <c:v>Category 1</c:v>
+                </c:pt>
+                <c:pt idx="1">
+                  <c:v>Category 2</c:v>
+                </c:pt>
+                <c:pt idx="2">
+                  <c:v>Category 3</c:v>
+                </c:pt>
+                <c:pt idx="3">
+                  <c:v>Category 4</c:v>
+                </c:pt>
+              </c:strCache>
+            </c:strRef>
+          </c:cat>
+          <c:val>
+            <c:numRef>
+              <c:f>Sheet1!$D$2:$D$5</c:f>
+              <c:numCache>
+                <c:formatCode>General</c:formatCode>
+                <c:ptCount val="4"/>
+                <c:pt idx="0">
+                  <c:v>2.0</c:v>
+                </c:pt>
+                <c:pt idx="1">
+                  <c:v>2.0</c:v>
+                </c:pt>
+                <c:pt idx="2">
+                  <c:v>3.0</c:v>
+                </c:pt>
+                <c:pt idx="3">
+                  <c:v>5.0</c:v>
+                </c:pt>
+              </c:numCache>
+            </c:numRef>
+          </c:val>
+          <c:smooth val="0"/>
+        </c:ser>
+        <c:dLbls>
+          <c:showLegendKey val="0"/>
+          <c:showVal val="0"/>
+          <c:showCatName val="0"/>
+          <c:showSerName val="0"/>
+          <c:showPercent val="0"/>
+          <c:showBubbleSize val="0"/>
+        </c:dLbls>
+        <c:marker val="1"/>
+        <c:smooth val="0"/>
+        <c:axId val="-2067994936"/>
+        <c:axId val="-2066936984"/>
+      </c:lineChart>
+      <c:catAx>
+        <c:axId val="-2067994936"/>
+        <c:scaling>
+          <c:orientation val="minMax"/>
+        </c:scaling>
+        <c:delete val="0"/>
+        <c:axPos val="b"/>
+        <c:majorTickMark val="none"/>
+        <c:minorTickMark val="none"/>
+        <c:tickLblPos val="none"/>
+        <c:crossAx val="-2066936984"/>
+        <c:crosses val="autoZero"/>
+        <c:auto val="1"/>
+        <c:lblAlgn val="ctr"/>
+        <c:lblOffset val="100"/>
+        <c:noMultiLvlLbl val="0"/>
+      </c:catAx>
+      <c:valAx>
+        <c:axId val="-2066936984"/>
+        <c:scaling>
+          <c:orientation val="minMax"/>
+        </c:scaling>
+        <c:delete val="0"/>
+        <c:axPos val="l"/>
+        <c:majorGridlines/>
+        <c:numFmt formatCode="General" sourceLinked="1"/>
+        <c:majorTickMark val="out"/>
+        <c:minorTickMark val="none"/>
+        <c:tickLblPos val="nextTo"/>
+        <c:crossAx val="-2067994936"/>
+        <c:crosses val="autoZero"/>
+        <c:crossBetween val="between"/>
+      </c:valAx>
+    </c:plotArea>
+    <c:plotVisOnly val="1"/>
+    <c:dispBlanksAs val="gap"/>
+    <c:showDLblsOverMax val="0"/>
+  </c:chart>
+  <c:txPr>
+    <a:bodyPr/>
+    <a:lstStyle/>
+    <a:p>
+      <a:pPr>
+        <a:defRPr sz="1800"/>
+      </a:pPr>
+      <a:endParaRPr lang="en-US"/>
+    </a:p>
+  </c:txPr>
+  <c:externalData r:id="rId1">
+    <c:autoUpdate val="0"/>
+  </c:externalData>
+</c:chartSpace>
+</file>
+
+<file path=ppt/charts/chart14.xml><?xml version="1.0" encoding="utf-8"?>
+<c:chartSpace xmlns:c="http://schemas.openxmlformats.org/drawingml/2006/chart" xmlns:a="http://schemas.openxmlformats.org/drawingml/2006/main" xmlns:r="http://schemas.openxmlformats.org/officeDocument/2006/relationships">
+  <c:date1904 val="0"/>
+  <c:lang val="en-US"/>
+  <c:roundedCorners val="0"/>
+  <mc:AlternateContent xmlns:mc="http://schemas.openxmlformats.org/markup-compatibility/2006">
+    <mc:Choice xmlns:c14="http://schemas.microsoft.com/office/drawing/2007/8/2/chart" Requires="c14">
+      <c14:style val="118"/>
+    </mc:Choice>
+    <mc:Fallback>
+      <c:style val="18"/>
+    </mc:Fallback>
+  </mc:AlternateContent>
+  <c:chart>
+    <c:autoTitleDeleted val="0"/>
+    <c:plotArea>
+      <c:layout/>
+      <c:lineChart>
+        <c:grouping val="stacked"/>
+        <c:varyColors val="0"/>
+        <c:ser>
+          <c:idx val="0"/>
+          <c:order val="0"/>
+          <c:tx>
+            <c:strRef>
+              <c:f>Sheet1!$B$1</c:f>
+              <c:strCache>
+                <c:ptCount val="1"/>
+                <c:pt idx="0">
+                  <c:v>Series 1</c:v>
+                </c:pt>
+              </c:strCache>
+            </c:strRef>
+          </c:tx>
+          <c:marker>
+            <c:symbol val="none"/>
+          </c:marker>
+          <c:cat>
+            <c:strRef>
+              <c:f>Sheet1!$A$2:$A$5</c:f>
+              <c:strCache>
+                <c:ptCount val="4"/>
+                <c:pt idx="0">
+                  <c:v>Category 1</c:v>
+                </c:pt>
+                <c:pt idx="1">
+                  <c:v>Category 2</c:v>
+                </c:pt>
+                <c:pt idx="2">
+                  <c:v>Category 3</c:v>
+                </c:pt>
+                <c:pt idx="3">
+                  <c:v>Category 4</c:v>
+                </c:pt>
+              </c:strCache>
+            </c:strRef>
+          </c:cat>
+          <c:val>
+            <c:numRef>
+              <c:f>Sheet1!$B$2:$B$5</c:f>
+              <c:numCache>
+                <c:formatCode>General</c:formatCode>
+                <c:ptCount val="4"/>
+                <c:pt idx="0">
+                  <c:v>4.3</c:v>
+                </c:pt>
+                <c:pt idx="1">
+                  <c:v>2.5</c:v>
+                </c:pt>
+                <c:pt idx="2">
+                  <c:v>3.5</c:v>
+                </c:pt>
+                <c:pt idx="3">
+                  <c:v>4.5</c:v>
+                </c:pt>
+              </c:numCache>
+            </c:numRef>
+          </c:val>
+          <c:smooth val="0"/>
+        </c:ser>
+        <c:ser>
+          <c:idx val="1"/>
+          <c:order val="1"/>
+          <c:tx>
+            <c:strRef>
+              <c:f>Sheet1!$C$1</c:f>
+              <c:strCache>
+                <c:ptCount val="1"/>
+                <c:pt idx="0">
+                  <c:v>Series 2</c:v>
+                </c:pt>
+              </c:strCache>
+            </c:strRef>
+          </c:tx>
+          <c:marker>
+            <c:symbol val="none"/>
+          </c:marker>
+          <c:cat>
+            <c:strRef>
+              <c:f>Sheet1!$A$2:$A$5</c:f>
+              <c:strCache>
+                <c:ptCount val="4"/>
+                <c:pt idx="0">
+                  <c:v>Category 1</c:v>
+                </c:pt>
+                <c:pt idx="1">
+                  <c:v>Category 2</c:v>
+                </c:pt>
+                <c:pt idx="2">
+                  <c:v>Category 3</c:v>
+                </c:pt>
+                <c:pt idx="3">
+                  <c:v>Category 4</c:v>
+                </c:pt>
+              </c:strCache>
+            </c:strRef>
+          </c:cat>
+          <c:val>
+            <c:numRef>
+              <c:f>Sheet1!$C$2:$C$5</c:f>
+              <c:numCache>
+                <c:formatCode>General</c:formatCode>
+                <c:ptCount val="4"/>
+                <c:pt idx="0">
+                  <c:v>2.4</c:v>
+                </c:pt>
+                <c:pt idx="1">
+                  <c:v>4.4</c:v>
+                </c:pt>
+                <c:pt idx="2">
+                  <c:v>1.8</c:v>
+                </c:pt>
+                <c:pt idx="3">
+                  <c:v>2.8</c:v>
+                </c:pt>
+              </c:numCache>
+            </c:numRef>
+          </c:val>
+          <c:smooth val="0"/>
+        </c:ser>
+        <c:ser>
+          <c:idx val="2"/>
+          <c:order val="2"/>
+          <c:tx>
+            <c:strRef>
+              <c:f>Sheet1!$D$1</c:f>
+              <c:strCache>
+                <c:ptCount val="1"/>
+                <c:pt idx="0">
+                  <c:v>Series 3</c:v>
+                </c:pt>
+              </c:strCache>
+            </c:strRef>
+          </c:tx>
+          <c:marker>
+            <c:symbol val="none"/>
+          </c:marker>
+          <c:cat>
+            <c:strRef>
+              <c:f>Sheet1!$A$2:$A$5</c:f>
+              <c:strCache>
+                <c:ptCount val="4"/>
+                <c:pt idx="0">
+                  <c:v>Category 1</c:v>
+                </c:pt>
+                <c:pt idx="1">
+                  <c:v>Category 2</c:v>
+                </c:pt>
+                <c:pt idx="2">
+                  <c:v>Category 3</c:v>
+                </c:pt>
+                <c:pt idx="3">
+                  <c:v>Category 4</c:v>
+                </c:pt>
+              </c:strCache>
+            </c:strRef>
+          </c:cat>
+          <c:val>
+            <c:numRef>
+              <c:f>Sheet1!$D$2:$D$5</c:f>
+              <c:numCache>
+                <c:formatCode>General</c:formatCode>
+                <c:ptCount val="4"/>
+                <c:pt idx="0">
+                  <c:v>2.0</c:v>
+                </c:pt>
+                <c:pt idx="1">
+                  <c:v>2.0</c:v>
+                </c:pt>
+                <c:pt idx="2">
+                  <c:v>3.0</c:v>
+                </c:pt>
+                <c:pt idx="3">
+                  <c:v>5.0</c:v>
+                </c:pt>
+              </c:numCache>
+            </c:numRef>
+          </c:val>
+          <c:smooth val="0"/>
+        </c:ser>
+        <c:dLbls>
+          <c:showLegendKey val="0"/>
+          <c:showVal val="0"/>
+          <c:showCatName val="0"/>
+          <c:showSerName val="0"/>
+          <c:showPercent val="0"/>
+          <c:showBubbleSize val="0"/>
+        </c:dLbls>
+        <c:marker val="1"/>
+        <c:smooth val="0"/>
+        <c:axId val="-2050161832"/>
+        <c:axId val="-2050158648"/>
+      </c:lineChart>
+      <c:catAx>
+        <c:axId val="-2050161832"/>
+        <c:scaling>
+          <c:orientation val="minMax"/>
+        </c:scaling>
+        <c:delete val="0"/>
+        <c:axPos val="b"/>
+        <c:majorTickMark val="none"/>
+        <c:minorTickMark val="none"/>
+        <c:tickLblPos val="none"/>
+        <c:crossAx val="-2050158648"/>
+        <c:crosses val="autoZero"/>
+        <c:auto val="1"/>
+        <c:lblAlgn val="ctr"/>
+        <c:lblOffset val="100"/>
+        <c:noMultiLvlLbl val="0"/>
+      </c:catAx>
+      <c:valAx>
+        <c:axId val="-2050158648"/>
+        <c:scaling>
+          <c:orientation val="minMax"/>
+        </c:scaling>
+        <c:delete val="0"/>
+        <c:axPos val="l"/>
+        <c:majorGridlines/>
+        <c:numFmt formatCode="General" sourceLinked="1"/>
+        <c:majorTickMark val="out"/>
+        <c:minorTickMark val="none"/>
+        <c:tickLblPos val="nextTo"/>
+        <c:crossAx val="-2050161832"/>
+        <c:crosses val="autoZero"/>
+        <c:crossBetween val="between"/>
+      </c:valAx>
+    </c:plotArea>
+    <c:plotVisOnly val="1"/>
+    <c:dispBlanksAs val="zero"/>
+    <c:showDLblsOverMax val="0"/>
+  </c:chart>
+  <c:txPr>
+    <a:bodyPr/>
+    <a:lstStyle/>
+    <a:p>
+      <a:pPr>
+        <a:defRPr sz="1800"/>
+      </a:pPr>
+      <a:endParaRPr lang="en-US"/>
+    </a:p>
+  </c:txPr>
+  <c:externalData r:id="rId1">
+    <c:autoUpdate val="0"/>
+  </c:externalData>
+</c:chartSpace>
+</file>
+
+<file path=ppt/charts/chart15.xml><?xml version="1.0" encoding="utf-8"?>
+<c:chartSpace xmlns:c="http://schemas.openxmlformats.org/drawingml/2006/chart" xmlns:a="http://schemas.openxmlformats.org/drawingml/2006/main" xmlns:r="http://schemas.openxmlformats.org/officeDocument/2006/relationships">
+  <c:date1904 val="0"/>
+  <c:lang val="en-US"/>
+  <c:roundedCorners val="0"/>
+  <mc:AlternateContent xmlns:mc="http://schemas.openxmlformats.org/markup-compatibility/2006">
+    <mc:Choice xmlns:c14="http://schemas.microsoft.com/office/drawing/2007/8/2/chart" Requires="c14">
+      <c14:style val="118"/>
+    </mc:Choice>
+    <mc:Fallback>
+      <c:style val="18"/>
+    </mc:Fallback>
+  </mc:AlternateContent>
+  <c:chart>
+    <c:autoTitleDeleted val="0"/>
+    <c:plotArea>
+      <c:layout/>
+      <c:lineChart>
+        <c:grouping val="percentStacked"/>
+        <c:varyColors val="0"/>
+        <c:ser>
+          <c:idx val="0"/>
+          <c:order val="0"/>
+          <c:tx>
+            <c:strRef>
+              <c:f>Sheet1!$B$1</c:f>
+              <c:strCache>
+                <c:ptCount val="1"/>
+                <c:pt idx="0">
+                  <c:v>Series 1</c:v>
+                </c:pt>
+              </c:strCache>
+            </c:strRef>
+          </c:tx>
+          <c:marker>
+            <c:symbol val="none"/>
+          </c:marker>
+          <c:cat>
+            <c:strRef>
+              <c:f>Sheet1!$A$2:$A$5</c:f>
+              <c:strCache>
+                <c:ptCount val="4"/>
+                <c:pt idx="0">
+                  <c:v>Category 1</c:v>
+                </c:pt>
+                <c:pt idx="1">
+                  <c:v>Category 2</c:v>
+                </c:pt>
+                <c:pt idx="2">
+                  <c:v>Category 3</c:v>
+                </c:pt>
+                <c:pt idx="3">
+                  <c:v>Category 4</c:v>
+                </c:pt>
+              </c:strCache>
+            </c:strRef>
+          </c:cat>
+          <c:val>
+            <c:numRef>
+              <c:f>Sheet1!$B$2:$B$5</c:f>
+              <c:numCache>
+                <c:formatCode>General</c:formatCode>
+                <c:ptCount val="4"/>
+                <c:pt idx="0">
+                  <c:v>4.3</c:v>
+                </c:pt>
+                <c:pt idx="1">
+                  <c:v>2.5</c:v>
+                </c:pt>
+                <c:pt idx="2">
+                  <c:v>3.5</c:v>
+                </c:pt>
+                <c:pt idx="3">
+                  <c:v>4.5</c:v>
+                </c:pt>
+              </c:numCache>
+            </c:numRef>
+          </c:val>
+          <c:smooth val="0"/>
+        </c:ser>
+        <c:ser>
+          <c:idx val="1"/>
+          <c:order val="1"/>
+          <c:tx>
+            <c:strRef>
+              <c:f>Sheet1!$C$1</c:f>
+              <c:strCache>
+                <c:ptCount val="1"/>
+                <c:pt idx="0">
+                  <c:v>Series 2</c:v>
+                </c:pt>
+              </c:strCache>
+            </c:strRef>
+          </c:tx>
+          <c:marker>
+            <c:symbol val="none"/>
+          </c:marker>
+          <c:cat>
+            <c:strRef>
+              <c:f>Sheet1!$A$2:$A$5</c:f>
+              <c:strCache>
+                <c:ptCount val="4"/>
+                <c:pt idx="0">
+                  <c:v>Category 1</c:v>
+                </c:pt>
+                <c:pt idx="1">
+                  <c:v>Category 2</c:v>
+                </c:pt>
+                <c:pt idx="2">
+                  <c:v>Category 3</c:v>
+                </c:pt>
+                <c:pt idx="3">
+                  <c:v>Category 4</c:v>
+                </c:pt>
+              </c:strCache>
+            </c:strRef>
+          </c:cat>
+          <c:val>
+            <c:numRef>
+              <c:f>Sheet1!$C$2:$C$5</c:f>
+              <c:numCache>
+                <c:formatCode>General</c:formatCode>
+                <c:ptCount val="4"/>
+                <c:pt idx="0">
+                  <c:v>2.4</c:v>
+                </c:pt>
+                <c:pt idx="1">
+                  <c:v>4.4</c:v>
+                </c:pt>
+                <c:pt idx="2">
+                  <c:v>1.8</c:v>
+                </c:pt>
+                <c:pt idx="3">
+                  <c:v>2.8</c:v>
+                </c:pt>
+              </c:numCache>
+            </c:numRef>
+          </c:val>
+          <c:smooth val="0"/>
+        </c:ser>
+        <c:ser>
+          <c:idx val="2"/>
+          <c:order val="2"/>
+          <c:tx>
+            <c:strRef>
+              <c:f>Sheet1!$D$1</c:f>
+              <c:strCache>
+                <c:ptCount val="1"/>
+                <c:pt idx="0">
+                  <c:v>Series 3</c:v>
+                </c:pt>
+              </c:strCache>
+            </c:strRef>
+          </c:tx>
+          <c:marker>
+            <c:symbol val="none"/>
+          </c:marker>
+          <c:cat>
+            <c:strRef>
+              <c:f>Sheet1!$A$2:$A$5</c:f>
+              <c:strCache>
+                <c:ptCount val="4"/>
+                <c:pt idx="0">
+                  <c:v>Category 1</c:v>
+                </c:pt>
+                <c:pt idx="1">
+                  <c:v>Category 2</c:v>
+                </c:pt>
+                <c:pt idx="2">
+                  <c:v>Category 3</c:v>
+                </c:pt>
+                <c:pt idx="3">
+                  <c:v>Category 4</c:v>
+                </c:pt>
+              </c:strCache>
+            </c:strRef>
+          </c:cat>
+          <c:val>
+            <c:numRef>
+              <c:f>Sheet1!$D$2:$D$5</c:f>
+              <c:numCache>
+                <c:formatCode>General</c:formatCode>
+                <c:ptCount val="4"/>
+                <c:pt idx="0">
+                  <c:v>2.0</c:v>
+                </c:pt>
+                <c:pt idx="1">
+                  <c:v>2.0</c:v>
+                </c:pt>
+                <c:pt idx="2">
+                  <c:v>3.0</c:v>
+                </c:pt>
+                <c:pt idx="3">
+                  <c:v>5.0</c:v>
+                </c:pt>
+              </c:numCache>
+            </c:numRef>
+          </c:val>
+          <c:smooth val="0"/>
+        </c:ser>
+        <c:dLbls>
+          <c:showLegendKey val="0"/>
+          <c:showVal val="0"/>
+          <c:showCatName val="0"/>
+          <c:showSerName val="0"/>
+          <c:showPercent val="0"/>
+          <c:showBubbleSize val="0"/>
+        </c:dLbls>
+        <c:marker val="1"/>
+        <c:smooth val="0"/>
+        <c:axId val="-2064797208"/>
+        <c:axId val="-2065622360"/>
+      </c:lineChart>
+      <c:catAx>
+        <c:axId val="-2064797208"/>
+        <c:scaling>
+          <c:orientation val="minMax"/>
+        </c:scaling>
+        <c:delete val="0"/>
+        <c:axPos val="b"/>
+        <c:majorTickMark val="none"/>
+        <c:minorTickMark val="none"/>
+        <c:tickLblPos val="none"/>
+        <c:crossAx val="-2065622360"/>
+        <c:crosses val="autoZero"/>
+        <c:auto val="1"/>
+        <c:lblAlgn val="ctr"/>
+        <c:lblOffset val="100"/>
+        <c:noMultiLvlLbl val="0"/>
+      </c:catAx>
+      <c:valAx>
+        <c:axId val="-2065622360"/>
+        <c:scaling>
+          <c:orientation val="minMax"/>
+        </c:scaling>
+        <c:delete val="0"/>
+        <c:axPos val="l"/>
+        <c:majorGridlines/>
+        <c:numFmt formatCode="0%" sourceLinked="1"/>
+        <c:majorTickMark val="out"/>
+        <c:minorTickMark val="none"/>
+        <c:tickLblPos val="nextTo"/>
+        <c:crossAx val="-2064797208"/>
+        <c:crosses val="autoZero"/>
+        <c:crossBetween val="between"/>
+      </c:valAx>
+    </c:plotArea>
+    <c:plotVisOnly val="1"/>
+    <c:dispBlanksAs val="zero"/>
+    <c:showDLblsOverMax val="0"/>
+  </c:chart>
+  <c:txPr>
+    <a:bodyPr/>
+    <a:lstStyle/>
+    <a:p>
+      <a:pPr>
+        <a:defRPr sz="1800"/>
+      </a:pPr>
+      <a:endParaRPr lang="en-US"/>
+    </a:p>
+  </c:txPr>
+  <c:externalData r:id="rId1">
+    <c:autoUpdate val="0"/>
+  </c:externalData>
+</c:chartSpace>
+</file>
+
+<file path=ppt/charts/chart16.xml><?xml version="1.0" encoding="utf-8"?>
+<c:chartSpace xmlns:c="http://schemas.openxmlformats.org/drawingml/2006/chart" xmlns:a="http://schemas.openxmlformats.org/drawingml/2006/main" xmlns:r="http://schemas.openxmlformats.org/officeDocument/2006/relationships">
+  <c:date1904 val="0"/>
+  <c:lang val="en-US"/>
+  <c:roundedCorners val="0"/>
+  <mc:AlternateContent xmlns:mc="http://schemas.openxmlformats.org/markup-compatibility/2006">
+    <mc:Choice xmlns:c14="http://schemas.microsoft.com/office/drawing/2007/8/2/chart" Requires="c14">
+      <c14:style val="118"/>
+    </mc:Choice>
+    <mc:Fallback>
+      <c:style val="18"/>
+    </mc:Fallback>
+  </mc:AlternateContent>
+  <c:chart>
+    <c:autoTitleDeleted val="0"/>
+    <c:plotArea>
+      <c:layout/>
+      <c:lineChart>
+        <c:grouping val="standard"/>
+        <c:varyColors val="0"/>
+        <c:ser>
+          <c:idx val="0"/>
+          <c:order val="0"/>
+          <c:tx>
+            <c:strRef>
+              <c:f>Sheet1!$B$1</c:f>
+              <c:strCache>
+                <c:ptCount val="1"/>
+                <c:pt idx="0">
+                  <c:v>Series 1</c:v>
+                </c:pt>
+              </c:strCache>
+            </c:strRef>
+          </c:tx>
+          <c:cat>
+            <c:strRef>
+              <c:f>Sheet1!$A$2:$A$5</c:f>
+              <c:strCache>
+                <c:ptCount val="4"/>
+                <c:pt idx="0">
+                  <c:v>Category 1</c:v>
+                </c:pt>
+                <c:pt idx="1">
+                  <c:v>Category 2</c:v>
+                </c:pt>
+                <c:pt idx="2">
+                  <c:v>Category 3</c:v>
+                </c:pt>
+                <c:pt idx="3">
+                  <c:v>Category 4</c:v>
+                </c:pt>
+              </c:strCache>
+            </c:strRef>
+          </c:cat>
+          <c:val>
+            <c:numRef>
+              <c:f>Sheet1!$B$2:$B$5</c:f>
+              <c:numCache>
+                <c:formatCode>General</c:formatCode>
+                <c:ptCount val="4"/>
+                <c:pt idx="0">
+                  <c:v>4.3</c:v>
+                </c:pt>
+                <c:pt idx="1">
+                  <c:v>2.5</c:v>
+                </c:pt>
+                <c:pt idx="2">
+                  <c:v>3.5</c:v>
+                </c:pt>
+                <c:pt idx="3">
+                  <c:v>4.5</c:v>
+                </c:pt>
+              </c:numCache>
+            </c:numRef>
+          </c:val>
+          <c:smooth val="0"/>
+        </c:ser>
+        <c:ser>
+          <c:idx val="1"/>
+          <c:order val="1"/>
+          <c:tx>
+            <c:strRef>
+              <c:f>Sheet1!$C$1</c:f>
+              <c:strCache>
+                <c:ptCount val="1"/>
+                <c:pt idx="0">
+                  <c:v>Series 2</c:v>
+                </c:pt>
+              </c:strCache>
+            </c:strRef>
+          </c:tx>
+          <c:cat>
+            <c:strRef>
+              <c:f>Sheet1!$A$2:$A$5</c:f>
+              <c:strCache>
+                <c:ptCount val="4"/>
+                <c:pt idx="0">
+                  <c:v>Category 1</c:v>
+                </c:pt>
+                <c:pt idx="1">
+                  <c:v>Category 2</c:v>
+                </c:pt>
+                <c:pt idx="2">
+                  <c:v>Category 3</c:v>
+                </c:pt>
+                <c:pt idx="3">
+                  <c:v>Category 4</c:v>
+                </c:pt>
+              </c:strCache>
+            </c:strRef>
+          </c:cat>
+          <c:val>
+            <c:numRef>
+              <c:f>Sheet1!$C$2:$C$5</c:f>
+              <c:numCache>
+                <c:formatCode>General</c:formatCode>
+                <c:ptCount val="4"/>
+                <c:pt idx="0">
+                  <c:v>2.4</c:v>
+                </c:pt>
+                <c:pt idx="1">
+                  <c:v>4.4</c:v>
+                </c:pt>
+                <c:pt idx="2">
+                  <c:v>1.8</c:v>
+                </c:pt>
+                <c:pt idx="3">
+                  <c:v>2.8</c:v>
+                </c:pt>
+              </c:numCache>
+            </c:numRef>
+          </c:val>
+          <c:smooth val="0"/>
+        </c:ser>
+        <c:ser>
+          <c:idx val="2"/>
+          <c:order val="2"/>
+          <c:tx>
+            <c:strRef>
+              <c:f>Sheet1!$D$1</c:f>
+              <c:strCache>
+                <c:ptCount val="1"/>
+                <c:pt idx="0">
+                  <c:v>Series 3</c:v>
+                </c:pt>
+              </c:strCache>
+            </c:strRef>
+          </c:tx>
+          <c:cat>
+            <c:strRef>
+              <c:f>Sheet1!$A$2:$A$5</c:f>
+              <c:strCache>
+                <c:ptCount val="4"/>
+                <c:pt idx="0">
+                  <c:v>Category 1</c:v>
+                </c:pt>
+                <c:pt idx="1">
+                  <c:v>Category 2</c:v>
+                </c:pt>
+                <c:pt idx="2">
+                  <c:v>Category 3</c:v>
+                </c:pt>
+                <c:pt idx="3">
+                  <c:v>Category 4</c:v>
+                </c:pt>
+              </c:strCache>
+            </c:strRef>
+          </c:cat>
+          <c:val>
+            <c:numRef>
+              <c:f>Sheet1!$D$2:$D$5</c:f>
+              <c:numCache>
+                <c:formatCode>General</c:formatCode>
+                <c:ptCount val="4"/>
+                <c:pt idx="0">
+                  <c:v>2.0</c:v>
+                </c:pt>
+                <c:pt idx="1">
+                  <c:v>2.0</c:v>
+                </c:pt>
+                <c:pt idx="2">
+                  <c:v>3.0</c:v>
+                </c:pt>
+                <c:pt idx="3">
+                  <c:v>5.0</c:v>
+                </c:pt>
+              </c:numCache>
+            </c:numRef>
+          </c:val>
+          <c:smooth val="0"/>
+        </c:ser>
+        <c:dLbls>
+          <c:showLegendKey val="0"/>
+          <c:showVal val="0"/>
+          <c:showCatName val="0"/>
+          <c:showSerName val="0"/>
+          <c:showPercent val="0"/>
+          <c:showBubbleSize val="0"/>
+        </c:dLbls>
+        <c:marker val="1"/>
+        <c:smooth val="0"/>
+        <c:axId val="-2140006904"/>
+        <c:axId val="-2048902376"/>
+      </c:lineChart>
+      <c:catAx>
+        <c:axId val="-2140006904"/>
+        <c:scaling>
+          <c:orientation val="minMax"/>
+        </c:scaling>
+        <c:delete val="0"/>
+        <c:axPos val="b"/>
+        <c:majorTickMark val="none"/>
+        <c:minorTickMark val="none"/>
+        <c:tickLblPos val="none"/>
+        <c:crossAx val="-2048902376"/>
+        <c:crosses val="autoZero"/>
+        <c:auto val="1"/>
+        <c:lblAlgn val="ctr"/>
+        <c:lblOffset val="100"/>
+        <c:noMultiLvlLbl val="0"/>
+      </c:catAx>
+      <c:valAx>
+        <c:axId val="-2048902376"/>
+        <c:scaling>
+          <c:orientation val="minMax"/>
+        </c:scaling>
+        <c:delete val="0"/>
+        <c:axPos val="l"/>
+        <c:majorGridlines/>
+        <c:numFmt formatCode="General" sourceLinked="1"/>
+        <c:majorTickMark val="out"/>
+        <c:minorTickMark val="none"/>
+        <c:tickLblPos val="nextTo"/>
+        <c:crossAx val="-2140006904"/>
+        <c:crosses val="autoZero"/>
+        <c:crossBetween val="between"/>
+      </c:valAx>
+    </c:plotArea>
+    <c:plotVisOnly val="1"/>
+    <c:dispBlanksAs val="gap"/>
+    <c:showDLblsOverMax val="0"/>
+  </c:chart>
+  <c:txPr>
+    <a:bodyPr/>
+    <a:lstStyle/>
+    <a:p>
+      <a:pPr>
+        <a:defRPr sz="1800"/>
+      </a:pPr>
+      <a:endParaRPr lang="en-US"/>
+    </a:p>
+  </c:txPr>
+  <c:externalData r:id="rId1">
+    <c:autoUpdate val="0"/>
+  </c:externalData>
+</c:chartSpace>
+</file>
+
+<file path=ppt/charts/chart17.xml><?xml version="1.0" encoding="utf-8"?>
+<c:chartSpace xmlns:c="http://schemas.openxmlformats.org/drawingml/2006/chart" xmlns:a="http://schemas.openxmlformats.org/drawingml/2006/main" xmlns:r="http://schemas.openxmlformats.org/officeDocument/2006/relationships">
+  <c:date1904 val="0"/>
+  <c:lang val="en-US"/>
+  <c:roundedCorners val="0"/>
+  <mc:AlternateContent xmlns:mc="http://schemas.openxmlformats.org/markup-compatibility/2006">
+    <mc:Choice xmlns:c14="http://schemas.microsoft.com/office/drawing/2007/8/2/chart" Requires="c14">
+      <c14:style val="118"/>
+    </mc:Choice>
+    <mc:Fallback>
+      <c:style val="18"/>
+    </mc:Fallback>
+  </mc:AlternateContent>
+  <c:chart>
+    <c:autoTitleDeleted val="0"/>
+    <c:plotArea>
+      <c:layout/>
+      <c:lineChart>
+        <c:grouping val="stacked"/>
+        <c:varyColors val="0"/>
+        <c:ser>
+          <c:idx val="0"/>
+          <c:order val="0"/>
+          <c:tx>
+            <c:strRef>
+              <c:f>Sheet1!$B$1</c:f>
+              <c:strCache>
+                <c:ptCount val="1"/>
+                <c:pt idx="0">
+                  <c:v>Series 1</c:v>
+                </c:pt>
+              </c:strCache>
+            </c:strRef>
+          </c:tx>
+          <c:cat>
+            <c:strRef>
+              <c:f>Sheet1!$A$2:$A$5</c:f>
+              <c:strCache>
+                <c:ptCount val="4"/>
+                <c:pt idx="0">
+                  <c:v>Category 1</c:v>
+                </c:pt>
+                <c:pt idx="1">
+                  <c:v>Category 2</c:v>
+                </c:pt>
+                <c:pt idx="2">
+                  <c:v>Category 3</c:v>
+                </c:pt>
+                <c:pt idx="3">
+                  <c:v>Category 4</c:v>
+                </c:pt>
+              </c:strCache>
+            </c:strRef>
+          </c:cat>
+          <c:val>
+            <c:numRef>
+              <c:f>Sheet1!$B$2:$B$5</c:f>
+              <c:numCache>
+                <c:formatCode>General</c:formatCode>
+                <c:ptCount val="4"/>
+                <c:pt idx="0">
+                  <c:v>4.3</c:v>
+                </c:pt>
+                <c:pt idx="1">
+                  <c:v>2.5</c:v>
+                </c:pt>
+                <c:pt idx="2">
+                  <c:v>3.5</c:v>
+                </c:pt>
+                <c:pt idx="3">
+                  <c:v>4.5</c:v>
+                </c:pt>
+              </c:numCache>
+            </c:numRef>
+          </c:val>
+          <c:smooth val="0"/>
+        </c:ser>
+        <c:ser>
+          <c:idx val="1"/>
+          <c:order val="1"/>
+          <c:tx>
+            <c:strRef>
+              <c:f>Sheet1!$C$1</c:f>
+              <c:strCache>
+                <c:ptCount val="1"/>
+                <c:pt idx="0">
+                  <c:v>Series 2</c:v>
+                </c:pt>
+              </c:strCache>
+            </c:strRef>
+          </c:tx>
+          <c:cat>
+            <c:strRef>
+              <c:f>Sheet1!$A$2:$A$5</c:f>
+              <c:strCache>
+                <c:ptCount val="4"/>
+                <c:pt idx="0">
+                  <c:v>Category 1</c:v>
+                </c:pt>
+                <c:pt idx="1">
+                  <c:v>Category 2</c:v>
+                </c:pt>
+                <c:pt idx="2">
+                  <c:v>Category 3</c:v>
+                </c:pt>
+                <c:pt idx="3">
+                  <c:v>Category 4</c:v>
+                </c:pt>
+              </c:strCache>
+            </c:strRef>
+          </c:cat>
+          <c:val>
+            <c:numRef>
+              <c:f>Sheet1!$C$2:$C$5</c:f>
+              <c:numCache>
+                <c:formatCode>General</c:formatCode>
+                <c:ptCount val="4"/>
+                <c:pt idx="0">
+                  <c:v>2.4</c:v>
+                </c:pt>
+                <c:pt idx="1">
+                  <c:v>4.4</c:v>
+                </c:pt>
+                <c:pt idx="2">
+                  <c:v>1.8</c:v>
+                </c:pt>
+                <c:pt idx="3">
+                  <c:v>2.8</c:v>
+                </c:pt>
+              </c:numCache>
+            </c:numRef>
+          </c:val>
+          <c:smooth val="0"/>
+        </c:ser>
+        <c:ser>
+          <c:idx val="2"/>
+          <c:order val="2"/>
+          <c:tx>
+            <c:strRef>
+              <c:f>Sheet1!$D$1</c:f>
+              <c:strCache>
+                <c:ptCount val="1"/>
+                <c:pt idx="0">
+                  <c:v>Series 3</c:v>
+                </c:pt>
+              </c:strCache>
+            </c:strRef>
+          </c:tx>
+          <c:cat>
+            <c:strRef>
+              <c:f>Sheet1!$A$2:$A$5</c:f>
+              <c:strCache>
+                <c:ptCount val="4"/>
+                <c:pt idx="0">
+                  <c:v>Category 1</c:v>
+                </c:pt>
+                <c:pt idx="1">
+                  <c:v>Category 2</c:v>
+                </c:pt>
+                <c:pt idx="2">
+                  <c:v>Category 3</c:v>
+                </c:pt>
+                <c:pt idx="3">
+                  <c:v>Category 4</c:v>
+                </c:pt>
+              </c:strCache>
+            </c:strRef>
+          </c:cat>
+          <c:val>
+            <c:numRef>
+              <c:f>Sheet1!$D$2:$D$5</c:f>
+              <c:numCache>
+                <c:formatCode>General</c:formatCode>
+                <c:ptCount val="4"/>
+                <c:pt idx="0">
+                  <c:v>2.0</c:v>
+                </c:pt>
+                <c:pt idx="1">
+                  <c:v>2.0</c:v>
+                </c:pt>
+                <c:pt idx="2">
+                  <c:v>3.0</c:v>
+                </c:pt>
+                <c:pt idx="3">
+                  <c:v>5.0</c:v>
+                </c:pt>
+              </c:numCache>
+            </c:numRef>
+          </c:val>
+          <c:smooth val="0"/>
+        </c:ser>
+        <c:dLbls>
+          <c:showLegendKey val="0"/>
+          <c:showVal val="0"/>
+          <c:showCatName val="0"/>
+          <c:showSerName val="0"/>
+          <c:showPercent val="0"/>
+          <c:showBubbleSize val="0"/>
+        </c:dLbls>
+        <c:marker val="1"/>
+        <c:smooth val="0"/>
+        <c:axId val="-2065865192"/>
+        <c:axId val="-2143512776"/>
+      </c:lineChart>
+      <c:catAx>
+        <c:axId val="-2065865192"/>
+        <c:scaling>
+          <c:orientation val="minMax"/>
+        </c:scaling>
+        <c:delete val="0"/>
+        <c:axPos val="b"/>
+        <c:majorTickMark val="none"/>
+        <c:minorTickMark val="none"/>
+        <c:tickLblPos val="none"/>
+        <c:crossAx val="-2143512776"/>
+        <c:crosses val="autoZero"/>
+        <c:auto val="1"/>
+        <c:lblAlgn val="ctr"/>
+        <c:lblOffset val="100"/>
+        <c:noMultiLvlLbl val="0"/>
+      </c:catAx>
+      <c:valAx>
+        <c:axId val="-2143512776"/>
+        <c:scaling>
+          <c:orientation val="minMax"/>
+        </c:scaling>
+        <c:delete val="0"/>
+        <c:axPos val="l"/>
+        <c:majorGridlines/>
+        <c:numFmt formatCode="General" sourceLinked="1"/>
+        <c:majorTickMark val="out"/>
+        <c:minorTickMark val="none"/>
+        <c:tickLblPos val="nextTo"/>
+        <c:crossAx val="-2065865192"/>
+        <c:crosses val="autoZero"/>
+        <c:crossBetween val="between"/>
+      </c:valAx>
+    </c:plotArea>
+    <c:plotVisOnly val="1"/>
+    <c:dispBlanksAs val="zero"/>
+    <c:showDLblsOverMax val="0"/>
+  </c:chart>
+  <c:txPr>
+    <a:bodyPr/>
+    <a:lstStyle/>
+    <a:p>
+      <a:pPr>
+        <a:defRPr sz="1800"/>
+      </a:pPr>
+      <a:endParaRPr lang="en-US"/>
+    </a:p>
+  </c:txPr>
+  <c:externalData r:id="rId1">
+    <c:autoUpdate val="0"/>
+  </c:externalData>
+</c:chartSpace>
+</file>
+
+<file path=ppt/charts/chart18.xml><?xml version="1.0" encoding="utf-8"?>
+<c:chartSpace xmlns:c="http://schemas.openxmlformats.org/drawingml/2006/chart" xmlns:a="http://schemas.openxmlformats.org/drawingml/2006/main" xmlns:r="http://schemas.openxmlformats.org/officeDocument/2006/relationships">
+  <c:date1904 val="0"/>
+  <c:lang val="en-US"/>
+  <c:roundedCorners val="0"/>
+  <mc:AlternateContent xmlns:mc="http://schemas.openxmlformats.org/markup-compatibility/2006">
+    <mc:Choice xmlns:c14="http://schemas.microsoft.com/office/drawing/2007/8/2/chart" Requires="c14">
+      <c14:style val="118"/>
+    </mc:Choice>
+    <mc:Fallback>
+      <c:style val="18"/>
+    </mc:Fallback>
+  </mc:AlternateContent>
+  <c:chart>
+    <c:autoTitleDeleted val="0"/>
+    <c:plotArea>
+      <c:layout/>
+      <c:lineChart>
+        <c:grouping val="percentStacked"/>
+        <c:varyColors val="0"/>
+        <c:ser>
+          <c:idx val="0"/>
+          <c:order val="0"/>
+          <c:tx>
+            <c:strRef>
+              <c:f>Sheet1!$B$1</c:f>
+              <c:strCache>
+                <c:ptCount val="1"/>
+                <c:pt idx="0">
+                  <c:v>Series 1</c:v>
+                </c:pt>
+              </c:strCache>
+            </c:strRef>
+          </c:tx>
+          <c:cat>
+            <c:strRef>
+              <c:f>Sheet1!$A$2:$A$5</c:f>
+              <c:strCache>
+                <c:ptCount val="4"/>
+                <c:pt idx="0">
+                  <c:v>Category 1</c:v>
+                </c:pt>
+                <c:pt idx="1">
+                  <c:v>Category 2</c:v>
+                </c:pt>
+                <c:pt idx="2">
+                  <c:v>Category 3</c:v>
+                </c:pt>
+                <c:pt idx="3">
+                  <c:v>Category 4</c:v>
+                </c:pt>
+              </c:strCache>
+            </c:strRef>
+          </c:cat>
+          <c:val>
+            <c:numRef>
+              <c:f>Sheet1!$B$2:$B$5</c:f>
+              <c:numCache>
+                <c:formatCode>General</c:formatCode>
+                <c:ptCount val="4"/>
+                <c:pt idx="0">
+                  <c:v>4.3</c:v>
+                </c:pt>
+                <c:pt idx="1">
+                  <c:v>2.5</c:v>
+                </c:pt>
+                <c:pt idx="2">
+                  <c:v>3.5</c:v>
+                </c:pt>
+                <c:pt idx="3">
+                  <c:v>4.5</c:v>
+                </c:pt>
+              </c:numCache>
+            </c:numRef>
+          </c:val>
+          <c:smooth val="0"/>
+        </c:ser>
+        <c:ser>
+          <c:idx val="1"/>
+          <c:order val="1"/>
+          <c:tx>
+            <c:strRef>
+              <c:f>Sheet1!$C$1</c:f>
+              <c:strCache>
+                <c:ptCount val="1"/>
+                <c:pt idx="0">
+                  <c:v>Series 2</c:v>
+                </c:pt>
+              </c:strCache>
+            </c:strRef>
+          </c:tx>
+          <c:cat>
+            <c:strRef>
+              <c:f>Sheet1!$A$2:$A$5</c:f>
+              <c:strCache>
+                <c:ptCount val="4"/>
+                <c:pt idx="0">
+                  <c:v>Category 1</c:v>
+                </c:pt>
+                <c:pt idx="1">
+                  <c:v>Category 2</c:v>
+                </c:pt>
+                <c:pt idx="2">
+                  <c:v>Category 3</c:v>
+                </c:pt>
+                <c:pt idx="3">
+                  <c:v>Category 4</c:v>
+                </c:pt>
+              </c:strCache>
+            </c:strRef>
+          </c:cat>
+          <c:val>
+            <c:numRef>
+              <c:f>Sheet1!$C$2:$C$5</c:f>
+              <c:numCache>
+                <c:formatCode>General</c:formatCode>
+                <c:ptCount val="4"/>
+                <c:pt idx="0">
+                  <c:v>2.4</c:v>
+                </c:pt>
+                <c:pt idx="1">
+                  <c:v>4.4</c:v>
+                </c:pt>
+                <c:pt idx="2">
+                  <c:v>1.8</c:v>
+                </c:pt>
+                <c:pt idx="3">
+                  <c:v>2.8</c:v>
+                </c:pt>
+              </c:numCache>
+            </c:numRef>
+          </c:val>
+          <c:smooth val="0"/>
+        </c:ser>
+        <c:ser>
+          <c:idx val="2"/>
+          <c:order val="2"/>
+          <c:tx>
+            <c:strRef>
+              <c:f>Sheet1!$D$1</c:f>
+              <c:strCache>
+                <c:ptCount val="1"/>
+                <c:pt idx="0">
+                  <c:v>Series 3</c:v>
+                </c:pt>
+              </c:strCache>
+            </c:strRef>
+          </c:tx>
+          <c:cat>
+            <c:strRef>
+              <c:f>Sheet1!$A$2:$A$5</c:f>
+              <c:strCache>
+                <c:ptCount val="4"/>
+                <c:pt idx="0">
+                  <c:v>Category 1</c:v>
+                </c:pt>
+                <c:pt idx="1">
+                  <c:v>Category 2</c:v>
+                </c:pt>
+                <c:pt idx="2">
+                  <c:v>Category 3</c:v>
+                </c:pt>
+                <c:pt idx="3">
+                  <c:v>Category 4</c:v>
+                </c:pt>
+              </c:strCache>
+            </c:strRef>
+          </c:cat>
+          <c:val>
+            <c:numRef>
+              <c:f>Sheet1!$D$2:$D$5</c:f>
+              <c:numCache>
+                <c:formatCode>General</c:formatCode>
+                <c:ptCount val="4"/>
+                <c:pt idx="0">
+                  <c:v>2.0</c:v>
+                </c:pt>
+                <c:pt idx="1">
+                  <c:v>2.0</c:v>
+                </c:pt>
+                <c:pt idx="2">
+                  <c:v>3.0</c:v>
+                </c:pt>
+                <c:pt idx="3">
+                  <c:v>5.0</c:v>
+                </c:pt>
+              </c:numCache>
+            </c:numRef>
+          </c:val>
+          <c:smooth val="0"/>
+        </c:ser>
+        <c:dLbls>
+          <c:showLegendKey val="0"/>
+          <c:showVal val="0"/>
+          <c:showCatName val="0"/>
+          <c:showSerName val="0"/>
+          <c:showPercent val="0"/>
+          <c:showBubbleSize val="0"/>
+        </c:dLbls>
+        <c:marker val="1"/>
+        <c:smooth val="0"/>
+        <c:axId val="-2054735976"/>
+        <c:axId val="-2054516584"/>
+      </c:lineChart>
+      <c:catAx>
+        <c:axId val="-2054735976"/>
+        <c:scaling>
+          <c:orientation val="minMax"/>
+        </c:scaling>
+        <c:delete val="0"/>
+        <c:axPos val="b"/>
+        <c:majorTickMark val="none"/>
+        <c:minorTickMark val="none"/>
+        <c:tickLblPos val="none"/>
+        <c:crossAx val="-2054516584"/>
+        <c:crosses val="autoZero"/>
+        <c:auto val="1"/>
+        <c:lblAlgn val="ctr"/>
+        <c:lblOffset val="100"/>
+        <c:noMultiLvlLbl val="0"/>
+      </c:catAx>
+      <c:valAx>
+        <c:axId val="-2054516584"/>
+        <c:scaling>
+          <c:orientation val="minMax"/>
+        </c:scaling>
+        <c:delete val="0"/>
+        <c:axPos val="l"/>
+        <c:majorGridlines/>
+        <c:numFmt formatCode="0%" sourceLinked="1"/>
+        <c:majorTickMark val="out"/>
+        <c:minorTickMark val="none"/>
+        <c:tickLblPos val="nextTo"/>
+        <c:crossAx val="-2054735976"/>
+        <c:crosses val="autoZero"/>
+        <c:crossBetween val="between"/>
+      </c:valAx>
+    </c:plotArea>
+    <c:plotVisOnly val="1"/>
+    <c:dispBlanksAs val="zero"/>
     <c:showDLblsOverMax val="0"/>
   </c:chart>
   <c:txPr>
@@ -3617,6 +5193,168 @@
 </p:sld>
 </file>
 
+<file path=ppt/slides/slide3.xml><?xml version="1.0" encoding="utf-8"?>
+<p:sld xmlns:a="http://schemas.openxmlformats.org/drawingml/2006/main" xmlns:r="http://schemas.openxmlformats.org/officeDocument/2006/relationships" xmlns:p="http://schemas.openxmlformats.org/presentationml/2006/main">
+  <p:cSld>
+    <p:spTree>
+      <p:nvGrpSpPr>
+        <p:cNvPr id="1" name=""/>
+        <p:cNvGrpSpPr/>
+        <p:nvPr/>
+      </p:nvGrpSpPr>
+      <p:grpSpPr>
+        <a:xfrm>
+          <a:off x="0" y="0"/>
+          <a:ext cx="0" cy="0"/>
+          <a:chOff x="0" y="0"/>
+          <a:chExt cx="0" cy="0"/>
+        </a:xfrm>
+      </p:grpSpPr>
+      <p:graphicFrame>
+        <p:nvGraphicFramePr>
+          <p:cNvPr id="2" name="Chart 1"/>
+          <p:cNvGraphicFramePr/>
+          <p:nvPr>
+            <p:extLst>
+              <p:ext uri="{D42A27DB-BD31-4B8C-83A1-F6EECF244321}">
+                <p14:modId xmlns:p14="http://schemas.microsoft.com/office/powerpoint/2010/main" val="266608802"/>
+              </p:ext>
+            </p:extLst>
+          </p:nvPr>
+        </p:nvGraphicFramePr>
+        <p:xfrm>
+          <a:off x="228600" y="228600"/>
+          <a:ext cx="2759224" cy="2768352"/>
+        </p:xfrm>
+        <a:graphic>
+          <a:graphicData uri="http://schemas.openxmlformats.org/drawingml/2006/chart">
+            <c:chart xmlns:c="http://schemas.openxmlformats.org/drawingml/2006/chart" xmlns:r="http://schemas.openxmlformats.org/officeDocument/2006/relationships" r:id="rId2"/>
+          </a:graphicData>
+        </a:graphic>
+      </p:graphicFrame>
+      <p:graphicFrame>
+        <p:nvGraphicFramePr>
+          <p:cNvPr id="3" name="Chart 2"/>
+          <p:cNvGraphicFramePr/>
+          <p:nvPr>
+            <p:extLst>
+              <p:ext uri="{D42A27DB-BD31-4B8C-83A1-F6EECF244321}">
+                <p14:modId xmlns:p14="http://schemas.microsoft.com/office/powerpoint/2010/main" val="2421586218"/>
+              </p:ext>
+            </p:extLst>
+          </p:nvPr>
+        </p:nvGraphicFramePr>
+        <p:xfrm>
+          <a:off x="3200400" y="228600"/>
+          <a:ext cx="2759968" cy="2752080"/>
+        </p:xfrm>
+        <a:graphic>
+          <a:graphicData uri="http://schemas.openxmlformats.org/drawingml/2006/chart">
+            <c:chart xmlns:c="http://schemas.openxmlformats.org/drawingml/2006/chart" xmlns:r="http://schemas.openxmlformats.org/officeDocument/2006/relationships" r:id="rId3"/>
+          </a:graphicData>
+        </a:graphic>
+      </p:graphicFrame>
+      <p:graphicFrame>
+        <p:nvGraphicFramePr>
+          <p:cNvPr id="4" name="Chart 3"/>
+          <p:cNvGraphicFramePr/>
+          <p:nvPr>
+            <p:extLst>
+              <p:ext uri="{D42A27DB-BD31-4B8C-83A1-F6EECF244321}">
+                <p14:modId xmlns:p14="http://schemas.microsoft.com/office/powerpoint/2010/main" val="2703658300"/>
+              </p:ext>
+            </p:extLst>
+          </p:nvPr>
+        </p:nvGraphicFramePr>
+        <p:xfrm>
+          <a:off x="6172200" y="228600"/>
+          <a:ext cx="2759968" cy="2752080"/>
+        </p:xfrm>
+        <a:graphic>
+          <a:graphicData uri="http://schemas.openxmlformats.org/drawingml/2006/chart">
+            <c:chart xmlns:c="http://schemas.openxmlformats.org/drawingml/2006/chart" xmlns:r="http://schemas.openxmlformats.org/officeDocument/2006/relationships" r:id="rId4"/>
+          </a:graphicData>
+        </a:graphic>
+      </p:graphicFrame>
+      <p:graphicFrame>
+        <p:nvGraphicFramePr>
+          <p:cNvPr id="5" name="Chart 4"/>
+          <p:cNvGraphicFramePr/>
+          <p:nvPr>
+            <p:extLst>
+              <p:ext uri="{D42A27DB-BD31-4B8C-83A1-F6EECF244321}">
+                <p14:modId xmlns:p14="http://schemas.microsoft.com/office/powerpoint/2010/main" val="3344643651"/>
+              </p:ext>
+            </p:extLst>
+          </p:nvPr>
+        </p:nvGraphicFramePr>
+        <p:xfrm>
+          <a:off x="228600" y="3886200"/>
+          <a:ext cx="2759968" cy="2752080"/>
+        </p:xfrm>
+        <a:graphic>
+          <a:graphicData uri="http://schemas.openxmlformats.org/drawingml/2006/chart">
+            <c:chart xmlns:c="http://schemas.openxmlformats.org/drawingml/2006/chart" xmlns:r="http://schemas.openxmlformats.org/officeDocument/2006/relationships" r:id="rId5"/>
+          </a:graphicData>
+        </a:graphic>
+      </p:graphicFrame>
+      <p:graphicFrame>
+        <p:nvGraphicFramePr>
+          <p:cNvPr id="6" name="Chart 5"/>
+          <p:cNvGraphicFramePr/>
+          <p:nvPr>
+            <p:extLst>
+              <p:ext uri="{D42A27DB-BD31-4B8C-83A1-F6EECF244321}">
+                <p14:modId xmlns:p14="http://schemas.microsoft.com/office/powerpoint/2010/main" val="902927628"/>
+              </p:ext>
+            </p:extLst>
+          </p:nvPr>
+        </p:nvGraphicFramePr>
+        <p:xfrm>
+          <a:off x="3200400" y="3886200"/>
+          <a:ext cx="2759968" cy="2752080"/>
+        </p:xfrm>
+        <a:graphic>
+          <a:graphicData uri="http://schemas.openxmlformats.org/drawingml/2006/chart">
+            <c:chart xmlns:c="http://schemas.openxmlformats.org/drawingml/2006/chart" xmlns:r="http://schemas.openxmlformats.org/officeDocument/2006/relationships" r:id="rId6"/>
+          </a:graphicData>
+        </a:graphic>
+      </p:graphicFrame>
+      <p:graphicFrame>
+        <p:nvGraphicFramePr>
+          <p:cNvPr id="7" name="Chart 6"/>
+          <p:cNvGraphicFramePr/>
+          <p:nvPr>
+            <p:extLst>
+              <p:ext uri="{D42A27DB-BD31-4B8C-83A1-F6EECF244321}">
+                <p14:modId xmlns:p14="http://schemas.microsoft.com/office/powerpoint/2010/main" val="1622638089"/>
+              </p:ext>
+            </p:extLst>
+          </p:nvPr>
+        </p:nvGraphicFramePr>
+        <p:xfrm>
+          <a:off x="6172200" y="3886200"/>
+          <a:ext cx="2759968" cy="2752080"/>
+        </p:xfrm>
+        <a:graphic>
+          <a:graphicData uri="http://schemas.openxmlformats.org/drawingml/2006/chart">
+            <c:chart xmlns:c="http://schemas.openxmlformats.org/drawingml/2006/chart" xmlns:r="http://schemas.openxmlformats.org/officeDocument/2006/relationships" r:id="rId7"/>
+          </a:graphicData>
+        </a:graphic>
+      </p:graphicFrame>
+    </p:spTree>
+    <p:extLst>
+      <p:ext uri="{BB962C8B-B14F-4D97-AF65-F5344CB8AC3E}">
+        <p14:creationId xmlns:p14="http://schemas.microsoft.com/office/powerpoint/2010/main" val="2140216810"/>
+      </p:ext>
+    </p:extLst>
+  </p:cSld>
+  <p:clrMapOvr>
+    <a:masterClrMapping/>
+  </p:clrMapOvr>
+</p:sld>
+</file>
+
 <file path=ppt/theme/theme1.xml><?xml version="1.0" encoding="utf-8"?>
 <a:theme xmlns:a="http://schemas.openxmlformats.org/drawingml/2006/main" name="Office Theme">
   <a:themeElements>

</xml_diff>

<commit_message>
acpt: add scenarios for Pie chart types
</commit_message>
<xml_diff>
--- a/features/steps/test_files/cht-chart-type.pptx
+++ b/features/steps/test_files/cht-chart-type.pptx
@@ -8,6 +8,7 @@
     <p:sldId id="256" r:id="rId2"/>
     <p:sldId id="257" r:id="rId3"/>
     <p:sldId id="258" r:id="rId4"/>
+    <p:sldId id="259" r:id="rId5"/>
   </p:sldIdLst>
   <p:sldSz cx="9144000" cy="6858000" type="screen4x3"/>
   <p:notesSz cx="6858000" cy="9144000"/>
@@ -2671,6 +2672,117 @@
 </c:chartSpace>
 </file>
 
+<file path=ppt/charts/chart19.xml><?xml version="1.0" encoding="utf-8"?>
+<c:chartSpace xmlns:c="http://schemas.openxmlformats.org/drawingml/2006/chart" xmlns:a="http://schemas.openxmlformats.org/drawingml/2006/main" xmlns:r="http://schemas.openxmlformats.org/officeDocument/2006/relationships">
+  <c:date1904 val="0"/>
+  <c:lang val="en-US"/>
+  <c:roundedCorners val="0"/>
+  <mc:AlternateContent xmlns:mc="http://schemas.openxmlformats.org/markup-compatibility/2006">
+    <mc:Choice xmlns:c14="http://schemas.microsoft.com/office/drawing/2007/8/2/chart" Requires="c14">
+      <c14:style val="118"/>
+    </mc:Choice>
+    <mc:Fallback>
+      <c:style val="18"/>
+    </mc:Fallback>
+  </mc:AlternateContent>
+  <c:chart>
+    <c:title>
+      <c:layout/>
+      <c:overlay val="0"/>
+    </c:title>
+    <c:autoTitleDeleted val="0"/>
+    <c:plotArea>
+      <c:layout/>
+      <c:pieChart>
+        <c:varyColors val="1"/>
+        <c:ser>
+          <c:idx val="0"/>
+          <c:order val="0"/>
+          <c:tx>
+            <c:strRef>
+              <c:f>Sheet1!$B$1</c:f>
+              <c:strCache>
+                <c:ptCount val="1"/>
+                <c:pt idx="0">
+                  <c:v>Sales</c:v>
+                </c:pt>
+              </c:strCache>
+            </c:strRef>
+          </c:tx>
+          <c:cat>
+            <c:strRef>
+              <c:f>Sheet1!$A$2:$A$5</c:f>
+              <c:strCache>
+                <c:ptCount val="4"/>
+                <c:pt idx="0">
+                  <c:v>1st Qtr</c:v>
+                </c:pt>
+                <c:pt idx="1">
+                  <c:v>2nd Qtr</c:v>
+                </c:pt>
+                <c:pt idx="2">
+                  <c:v>3rd Qtr</c:v>
+                </c:pt>
+                <c:pt idx="3">
+                  <c:v>4th Qtr</c:v>
+                </c:pt>
+              </c:strCache>
+            </c:strRef>
+          </c:cat>
+          <c:val>
+            <c:numRef>
+              <c:f>Sheet1!$B$2:$B$5</c:f>
+              <c:numCache>
+                <c:formatCode>General</c:formatCode>
+                <c:ptCount val="4"/>
+                <c:pt idx="0">
+                  <c:v>8.2</c:v>
+                </c:pt>
+                <c:pt idx="1">
+                  <c:v>3.2</c:v>
+                </c:pt>
+                <c:pt idx="2">
+                  <c:v>1.4</c:v>
+                </c:pt>
+                <c:pt idx="3">
+                  <c:v>1.2</c:v>
+                </c:pt>
+              </c:numCache>
+            </c:numRef>
+          </c:val>
+        </c:ser>
+        <c:dLbls>
+          <c:showLegendKey val="0"/>
+          <c:showVal val="0"/>
+          <c:showCatName val="0"/>
+          <c:showSerName val="0"/>
+          <c:showPercent val="0"/>
+          <c:showBubbleSize val="0"/>
+          <c:showLeaderLines val="1"/>
+        </c:dLbls>
+        <c:firstSliceAng val="0"/>
+      </c:pieChart>
+    </c:plotArea>
+    <c:plotVisOnly val="1"/>
+    <c:dispBlanksAs val="gap"/>
+    <c:showDLblsOverMax val="0"/>
+  </c:chart>
+  <c:txPr>
+    <a:bodyPr/>
+    <a:lstStyle/>
+    <a:p>
+      <a:pPr>
+        <a:defRPr sz="1800"/>
+      </a:pPr>
+      <a:endParaRPr lang="en-US"/>
+    </a:p>
+  </c:txPr>
+  <c:externalData r:id="rId1">
+    <c:autoUpdate val="0"/>
+  </c:externalData>
+</c:chartSpace>
+</file>
+
 <file path=ppt/charts/chart2.xml><?xml version="1.0" encoding="utf-8"?>
 <c:chartSpace xmlns:c="http://schemas.openxmlformats.org/drawingml/2006/chart" xmlns:a="http://schemas.openxmlformats.org/drawingml/2006/main" xmlns:r="http://schemas.openxmlformats.org/officeDocument/2006/relationships">
   <c:date1904 val="0"/>
@@ -2864,6 +2976,118 @@
     </c:plotArea>
     <c:plotVisOnly val="1"/>
     <c:dispBlanksAs val="zero"/>
+    <c:showDLblsOverMax val="0"/>
+  </c:chart>
+  <c:txPr>
+    <a:bodyPr/>
+    <a:lstStyle/>
+    <a:p>
+      <a:pPr>
+        <a:defRPr sz="1800"/>
+      </a:pPr>
+      <a:endParaRPr lang="en-US"/>
+    </a:p>
+  </c:txPr>
+  <c:externalData r:id="rId1">
+    <c:autoUpdate val="0"/>
+  </c:externalData>
+</c:chartSpace>
+</file>
+
+<file path=ppt/charts/chart20.xml><?xml version="1.0" encoding="utf-8"?>
+<c:chartSpace xmlns:c="http://schemas.openxmlformats.org/drawingml/2006/chart" xmlns:a="http://schemas.openxmlformats.org/drawingml/2006/main" xmlns:r="http://schemas.openxmlformats.org/officeDocument/2006/relationships">
+  <c:date1904 val="0"/>
+  <c:lang val="en-US"/>
+  <c:roundedCorners val="0"/>
+  <mc:AlternateContent xmlns:mc="http://schemas.openxmlformats.org/markup-compatibility/2006">
+    <mc:Choice xmlns:c14="http://schemas.microsoft.com/office/drawing/2007/8/2/chart" Requires="c14">
+      <c14:style val="118"/>
+    </mc:Choice>
+    <mc:Fallback>
+      <c:style val="18"/>
+    </mc:Fallback>
+  </mc:AlternateContent>
+  <c:chart>
+    <c:title>
+      <c:layout/>
+      <c:overlay val="0"/>
+    </c:title>
+    <c:autoTitleDeleted val="0"/>
+    <c:plotArea>
+      <c:layout/>
+      <c:pieChart>
+        <c:varyColors val="1"/>
+        <c:ser>
+          <c:idx val="0"/>
+          <c:order val="0"/>
+          <c:tx>
+            <c:strRef>
+              <c:f>Sheet1!$B$1</c:f>
+              <c:strCache>
+                <c:ptCount val="1"/>
+                <c:pt idx="0">
+                  <c:v>Sales</c:v>
+                </c:pt>
+              </c:strCache>
+            </c:strRef>
+          </c:tx>
+          <c:explosion val="25"/>
+          <c:cat>
+            <c:strRef>
+              <c:f>Sheet1!$A$2:$A$5</c:f>
+              <c:strCache>
+                <c:ptCount val="4"/>
+                <c:pt idx="0">
+                  <c:v>1st Qtr</c:v>
+                </c:pt>
+                <c:pt idx="1">
+                  <c:v>2nd Qtr</c:v>
+                </c:pt>
+                <c:pt idx="2">
+                  <c:v>3rd Qtr</c:v>
+                </c:pt>
+                <c:pt idx="3">
+                  <c:v>4th Qtr</c:v>
+                </c:pt>
+              </c:strCache>
+            </c:strRef>
+          </c:cat>
+          <c:val>
+            <c:numRef>
+              <c:f>Sheet1!$B$2:$B$5</c:f>
+              <c:numCache>
+                <c:formatCode>General</c:formatCode>
+                <c:ptCount val="4"/>
+                <c:pt idx="0">
+                  <c:v>8.2</c:v>
+                </c:pt>
+                <c:pt idx="1">
+                  <c:v>3.2</c:v>
+                </c:pt>
+                <c:pt idx="2">
+                  <c:v>1.4</c:v>
+                </c:pt>
+                <c:pt idx="3">
+                  <c:v>1.2</c:v>
+                </c:pt>
+              </c:numCache>
+            </c:numRef>
+          </c:val>
+        </c:ser>
+        <c:dLbls>
+          <c:showLegendKey val="0"/>
+          <c:showVal val="0"/>
+          <c:showCatName val="0"/>
+          <c:showSerName val="0"/>
+          <c:showPercent val="0"/>
+          <c:showBubbleSize val="0"/>
+          <c:showLeaderLines val="1"/>
+        </c:dLbls>
+        <c:firstSliceAng val="0"/>
+      </c:pieChart>
+    </c:plotArea>
+    <c:plotVisOnly val="1"/>
+    <c:dispBlanksAs val="gap"/>
     <c:showDLblsOverMax val="0"/>
   </c:chart>
   <c:txPr>
@@ -5355,6 +5579,80 @@
 </p:sld>
 </file>
 
+<file path=ppt/slides/slide4.xml><?xml version="1.0" encoding="utf-8"?>
+<p:sld xmlns:a="http://schemas.openxmlformats.org/drawingml/2006/main" xmlns:r="http://schemas.openxmlformats.org/officeDocument/2006/relationships" xmlns:p="http://schemas.openxmlformats.org/presentationml/2006/main">
+  <p:cSld>
+    <p:spTree>
+      <p:nvGrpSpPr>
+        <p:cNvPr id="1" name=""/>
+        <p:cNvGrpSpPr/>
+        <p:nvPr/>
+      </p:nvGrpSpPr>
+      <p:grpSpPr>
+        <a:xfrm>
+          <a:off x="0" y="0"/>
+          <a:ext cx="0" cy="0"/>
+          <a:chOff x="0" y="0"/>
+          <a:chExt cx="0" cy="0"/>
+        </a:xfrm>
+      </p:grpSpPr>
+      <p:graphicFrame>
+        <p:nvGraphicFramePr>
+          <p:cNvPr id="2" name="Chart 1"/>
+          <p:cNvGraphicFramePr/>
+          <p:nvPr>
+            <p:extLst>
+              <p:ext uri="{D42A27DB-BD31-4B8C-83A1-F6EECF244321}">
+                <p14:modId xmlns:p14="http://schemas.microsoft.com/office/powerpoint/2010/main" val="2915923594"/>
+              </p:ext>
+            </p:extLst>
+          </p:nvPr>
+        </p:nvGraphicFramePr>
+        <p:xfrm>
+          <a:off x="228600" y="228600"/>
+          <a:ext cx="3623320" cy="3632448"/>
+        </p:xfrm>
+        <a:graphic>
+          <a:graphicData uri="http://schemas.openxmlformats.org/drawingml/2006/chart">
+            <c:chart xmlns:c="http://schemas.openxmlformats.org/drawingml/2006/chart" xmlns:r="http://schemas.openxmlformats.org/officeDocument/2006/relationships" r:id="rId2"/>
+          </a:graphicData>
+        </a:graphic>
+      </p:graphicFrame>
+      <p:graphicFrame>
+        <p:nvGraphicFramePr>
+          <p:cNvPr id="3" name="Chart 2"/>
+          <p:cNvGraphicFramePr/>
+          <p:nvPr>
+            <p:extLst>
+              <p:ext uri="{D42A27DB-BD31-4B8C-83A1-F6EECF244321}">
+                <p14:modId xmlns:p14="http://schemas.microsoft.com/office/powerpoint/2010/main" val="3834768805"/>
+              </p:ext>
+            </p:extLst>
+          </p:nvPr>
+        </p:nvGraphicFramePr>
+        <p:xfrm>
+          <a:off x="5292080" y="3068960"/>
+          <a:ext cx="3647728" cy="3631952"/>
+        </p:xfrm>
+        <a:graphic>
+          <a:graphicData uri="http://schemas.openxmlformats.org/drawingml/2006/chart">
+            <c:chart xmlns:c="http://schemas.openxmlformats.org/drawingml/2006/chart" xmlns:r="http://schemas.openxmlformats.org/officeDocument/2006/relationships" r:id="rId3"/>
+          </a:graphicData>
+        </a:graphic>
+      </p:graphicFrame>
+    </p:spTree>
+    <p:extLst>
+      <p:ext uri="{BB962C8B-B14F-4D97-AF65-F5344CB8AC3E}">
+        <p14:creationId xmlns:p14="http://schemas.microsoft.com/office/powerpoint/2010/main" val="3695801923"/>
+      </p:ext>
+    </p:extLst>
+  </p:cSld>
+  <p:clrMapOvr>
+    <a:masterClrMapping/>
+  </p:clrMapOvr>
+</p:sld>
+</file>
+
 <file path=ppt/theme/theme1.xml><?xml version="1.0" encoding="utf-8"?>
 <a:theme xmlns:a="http://schemas.openxmlformats.org/drawingml/2006/main" name="Office Theme">
   <a:themeElements>

</xml_diff>

<commit_message>
acpt: add scenarios for XY/Bubble Chart.chart_type
</commit_message>
<xml_diff>
--- a/features/steps/test_files/cht-chart-type.pptx
+++ b/features/steps/test_files/cht-chart-type.pptx
@@ -9,6 +9,8 @@
     <p:sldId id="257" r:id="rId3"/>
     <p:sldId id="258" r:id="rId4"/>
     <p:sldId id="259" r:id="rId5"/>
+    <p:sldId id="260" r:id="rId6"/>
+    <p:sldId id="261" r:id="rId7"/>
   </p:sldIdLst>
   <p:sldSz cx="9144000" cy="6858000" type="screen4x3"/>
   <p:notesSz cx="6858000" cy="9144000"/>
@@ -264,11 +266,11 @@
           <c:showPercent val="0"/>
           <c:showBubbleSize val="0"/>
         </c:dLbls>
-        <c:axId val="-2067920504"/>
-        <c:axId val="-2068272744"/>
+        <c:axId val="-2083145160"/>
+        <c:axId val="-2083142120"/>
       </c:areaChart>
       <c:dateAx>
-        <c:axId val="-2067920504"/>
+        <c:axId val="-2083145160"/>
         <c:scaling>
           <c:orientation val="minMax"/>
         </c:scaling>
@@ -278,14 +280,14 @@
         <c:majorTickMark val="none"/>
         <c:minorTickMark val="none"/>
         <c:tickLblPos val="none"/>
-        <c:crossAx val="-2068272744"/>
+        <c:crossAx val="-2083142120"/>
         <c:crosses val="autoZero"/>
         <c:auto val="1"/>
         <c:lblOffset val="100"/>
         <c:baseTimeUnit val="days"/>
       </c:dateAx>
       <c:valAx>
-        <c:axId val="-2068272744"/>
+        <c:axId val="-2083142120"/>
         <c:scaling>
           <c:orientation val="minMax"/>
         </c:scaling>
@@ -296,7 +298,7 @@
         <c:majorTickMark val="out"/>
         <c:minorTickMark val="none"/>
         <c:tickLblPos val="nextTo"/>
-        <c:crossAx val="-2067920504"/>
+        <c:crossAx val="-2083145160"/>
         <c:crosses val="autoZero"/>
         <c:crossBetween val="midCat"/>
       </c:valAx>
@@ -522,11 +524,11 @@
           <c:showBubbleSize val="0"/>
         </c:dLbls>
         <c:gapWidth val="150"/>
-        <c:axId val="-2063973096"/>
-        <c:axId val="-2067022744"/>
+        <c:axId val="-2083451784"/>
+        <c:axId val="-2083448808"/>
       </c:barChart>
       <c:catAx>
-        <c:axId val="-2063973096"/>
+        <c:axId val="-2083451784"/>
         <c:scaling>
           <c:orientation val="minMax"/>
         </c:scaling>
@@ -535,7 +537,7 @@
         <c:majorTickMark val="none"/>
         <c:minorTickMark val="none"/>
         <c:tickLblPos val="none"/>
-        <c:crossAx val="-2067022744"/>
+        <c:crossAx val="-2083448808"/>
         <c:crosses val="autoZero"/>
         <c:auto val="1"/>
         <c:lblAlgn val="ctr"/>
@@ -543,7 +545,7 @@
         <c:noMultiLvlLbl val="0"/>
       </c:catAx>
       <c:valAx>
-        <c:axId val="-2067022744"/>
+        <c:axId val="-2083448808"/>
         <c:scaling>
           <c:orientation val="minMax"/>
         </c:scaling>
@@ -554,7 +556,7 @@
         <c:majorTickMark val="out"/>
         <c:minorTickMark val="none"/>
         <c:tickLblPos val="nextTo"/>
-        <c:crossAx val="-2063973096"/>
+        <c:crossAx val="-2083451784"/>
         <c:crosses val="autoZero"/>
         <c:crossBetween val="between"/>
       </c:valAx>
@@ -781,11 +783,11 @@
         </c:dLbls>
         <c:gapWidth val="150"/>
         <c:overlap val="100"/>
-        <c:axId val="-2052883832"/>
-        <c:axId val="-2052512376"/>
+        <c:axId val="-2083420888"/>
+        <c:axId val="-2083417912"/>
       </c:barChart>
       <c:catAx>
-        <c:axId val="-2052883832"/>
+        <c:axId val="-2083420888"/>
         <c:scaling>
           <c:orientation val="minMax"/>
         </c:scaling>
@@ -794,7 +796,7 @@
         <c:majorTickMark val="none"/>
         <c:minorTickMark val="none"/>
         <c:tickLblPos val="none"/>
-        <c:crossAx val="-2052512376"/>
+        <c:crossAx val="-2083417912"/>
         <c:crosses val="autoZero"/>
         <c:auto val="1"/>
         <c:lblAlgn val="ctr"/>
@@ -802,7 +804,7 @@
         <c:noMultiLvlLbl val="0"/>
       </c:catAx>
       <c:valAx>
-        <c:axId val="-2052512376"/>
+        <c:axId val="-2083417912"/>
         <c:scaling>
           <c:orientation val="minMax"/>
         </c:scaling>
@@ -813,7 +815,7 @@
         <c:majorTickMark val="out"/>
         <c:minorTickMark val="none"/>
         <c:tickLblPos val="nextTo"/>
-        <c:crossAx val="-2052883832"/>
+        <c:crossAx val="-2083420888"/>
         <c:crosses val="autoZero"/>
         <c:crossBetween val="between"/>
       </c:valAx>
@@ -1040,11 +1042,11 @@
         </c:dLbls>
         <c:gapWidth val="150"/>
         <c:overlap val="100"/>
-        <c:axId val="-2063978104"/>
-        <c:axId val="-2130175976"/>
+        <c:axId val="-2082512136"/>
+        <c:axId val="-2082509160"/>
       </c:barChart>
       <c:catAx>
-        <c:axId val="-2063978104"/>
+        <c:axId val="-2082512136"/>
         <c:scaling>
           <c:orientation val="minMax"/>
         </c:scaling>
@@ -1053,7 +1055,7 @@
         <c:majorTickMark val="none"/>
         <c:minorTickMark val="none"/>
         <c:tickLblPos val="none"/>
-        <c:crossAx val="-2130175976"/>
+        <c:crossAx val="-2082509160"/>
         <c:crosses val="autoZero"/>
         <c:auto val="1"/>
         <c:lblAlgn val="ctr"/>
@@ -1061,7 +1063,7 @@
         <c:noMultiLvlLbl val="0"/>
       </c:catAx>
       <c:valAx>
-        <c:axId val="-2130175976"/>
+        <c:axId val="-2082509160"/>
         <c:scaling>
           <c:orientation val="minMax"/>
         </c:scaling>
@@ -1072,7 +1074,7 @@
         <c:majorTickMark val="out"/>
         <c:minorTickMark val="none"/>
         <c:tickLblPos val="nextTo"/>
-        <c:crossAx val="-2063978104"/>
+        <c:crossAx val="-2082512136"/>
         <c:crosses val="autoZero"/>
         <c:crossBetween val="between"/>
       </c:valAx>
@@ -1307,11 +1309,11 @@
         </c:dLbls>
         <c:marker val="1"/>
         <c:smooth val="0"/>
-        <c:axId val="-2067994936"/>
-        <c:axId val="-2066936984"/>
+        <c:axId val="-2082651656"/>
+        <c:axId val="-2082648680"/>
       </c:lineChart>
       <c:catAx>
-        <c:axId val="-2067994936"/>
+        <c:axId val="-2082651656"/>
         <c:scaling>
           <c:orientation val="minMax"/>
         </c:scaling>
@@ -1320,7 +1322,7 @@
         <c:majorTickMark val="none"/>
         <c:minorTickMark val="none"/>
         <c:tickLblPos val="none"/>
-        <c:crossAx val="-2066936984"/>
+        <c:crossAx val="-2082648680"/>
         <c:crosses val="autoZero"/>
         <c:auto val="1"/>
         <c:lblAlgn val="ctr"/>
@@ -1328,7 +1330,7 @@
         <c:noMultiLvlLbl val="0"/>
       </c:catAx>
       <c:valAx>
-        <c:axId val="-2066936984"/>
+        <c:axId val="-2082648680"/>
         <c:scaling>
           <c:orientation val="minMax"/>
         </c:scaling>
@@ -1339,7 +1341,7 @@
         <c:majorTickMark val="out"/>
         <c:minorTickMark val="none"/>
         <c:tickLblPos val="nextTo"/>
-        <c:crossAx val="-2067994936"/>
+        <c:crossAx val="-2082651656"/>
         <c:crosses val="autoZero"/>
         <c:crossBetween val="between"/>
       </c:valAx>
@@ -1574,11 +1576,11 @@
         </c:dLbls>
         <c:marker val="1"/>
         <c:smooth val="0"/>
-        <c:axId val="-2050161832"/>
-        <c:axId val="-2050158648"/>
+        <c:axId val="-2082620376"/>
+        <c:axId val="-2082617400"/>
       </c:lineChart>
       <c:catAx>
-        <c:axId val="-2050161832"/>
+        <c:axId val="-2082620376"/>
         <c:scaling>
           <c:orientation val="minMax"/>
         </c:scaling>
@@ -1587,7 +1589,7 @@
         <c:majorTickMark val="none"/>
         <c:minorTickMark val="none"/>
         <c:tickLblPos val="none"/>
-        <c:crossAx val="-2050158648"/>
+        <c:crossAx val="-2082617400"/>
         <c:crosses val="autoZero"/>
         <c:auto val="1"/>
         <c:lblAlgn val="ctr"/>
@@ -1595,7 +1597,7 @@
         <c:noMultiLvlLbl val="0"/>
       </c:catAx>
       <c:valAx>
-        <c:axId val="-2050158648"/>
+        <c:axId val="-2082617400"/>
         <c:scaling>
           <c:orientation val="minMax"/>
         </c:scaling>
@@ -1606,7 +1608,7 @@
         <c:majorTickMark val="out"/>
         <c:minorTickMark val="none"/>
         <c:tickLblPos val="nextTo"/>
-        <c:crossAx val="-2050161832"/>
+        <c:crossAx val="-2082620376"/>
         <c:crosses val="autoZero"/>
         <c:crossBetween val="between"/>
       </c:valAx>
@@ -1841,11 +1843,11 @@
         </c:dLbls>
         <c:marker val="1"/>
         <c:smooth val="0"/>
-        <c:axId val="-2064797208"/>
-        <c:axId val="-2065622360"/>
+        <c:axId val="-2082589112"/>
+        <c:axId val="-2082586136"/>
       </c:lineChart>
       <c:catAx>
-        <c:axId val="-2064797208"/>
+        <c:axId val="-2082589112"/>
         <c:scaling>
           <c:orientation val="minMax"/>
         </c:scaling>
@@ -1854,7 +1856,7 @@
         <c:majorTickMark val="none"/>
         <c:minorTickMark val="none"/>
         <c:tickLblPos val="none"/>
-        <c:crossAx val="-2065622360"/>
+        <c:crossAx val="-2082586136"/>
         <c:crosses val="autoZero"/>
         <c:auto val="1"/>
         <c:lblAlgn val="ctr"/>
@@ -1862,7 +1864,7 @@
         <c:noMultiLvlLbl val="0"/>
       </c:catAx>
       <c:valAx>
-        <c:axId val="-2065622360"/>
+        <c:axId val="-2082586136"/>
         <c:scaling>
           <c:orientation val="minMax"/>
         </c:scaling>
@@ -1873,7 +1875,7 @@
         <c:majorTickMark val="out"/>
         <c:minorTickMark val="none"/>
         <c:tickLblPos val="nextTo"/>
-        <c:crossAx val="-2064797208"/>
+        <c:crossAx val="-2082589112"/>
         <c:crosses val="autoZero"/>
         <c:crossBetween val="between"/>
       </c:valAx>
@@ -2099,11 +2101,11 @@
         </c:dLbls>
         <c:marker val="1"/>
         <c:smooth val="0"/>
-        <c:axId val="-2140006904"/>
-        <c:axId val="-2048902376"/>
+        <c:axId val="-2082557400"/>
+        <c:axId val="-2082554424"/>
       </c:lineChart>
       <c:catAx>
-        <c:axId val="-2140006904"/>
+        <c:axId val="-2082557400"/>
         <c:scaling>
           <c:orientation val="minMax"/>
         </c:scaling>
@@ -2112,7 +2114,7 @@
         <c:majorTickMark val="none"/>
         <c:minorTickMark val="none"/>
         <c:tickLblPos val="none"/>
-        <c:crossAx val="-2048902376"/>
+        <c:crossAx val="-2082554424"/>
         <c:crosses val="autoZero"/>
         <c:auto val="1"/>
         <c:lblAlgn val="ctr"/>
@@ -2120,7 +2122,7 @@
         <c:noMultiLvlLbl val="0"/>
       </c:catAx>
       <c:valAx>
-        <c:axId val="-2048902376"/>
+        <c:axId val="-2082554424"/>
         <c:scaling>
           <c:orientation val="minMax"/>
         </c:scaling>
@@ -2131,7 +2133,7 @@
         <c:majorTickMark val="out"/>
         <c:minorTickMark val="none"/>
         <c:tickLblPos val="nextTo"/>
-        <c:crossAx val="-2140006904"/>
+        <c:crossAx val="-2082557400"/>
         <c:crosses val="autoZero"/>
         <c:crossBetween val="between"/>
       </c:valAx>
@@ -2357,11 +2359,11 @@
         </c:dLbls>
         <c:marker val="1"/>
         <c:smooth val="0"/>
-        <c:axId val="-2065865192"/>
-        <c:axId val="-2143512776"/>
+        <c:axId val="-2118721944"/>
+        <c:axId val="-2118718968"/>
       </c:lineChart>
       <c:catAx>
-        <c:axId val="-2065865192"/>
+        <c:axId val="-2118721944"/>
         <c:scaling>
           <c:orientation val="minMax"/>
         </c:scaling>
@@ -2370,7 +2372,7 @@
         <c:majorTickMark val="none"/>
         <c:minorTickMark val="none"/>
         <c:tickLblPos val="none"/>
-        <c:crossAx val="-2143512776"/>
+        <c:crossAx val="-2118718968"/>
         <c:crosses val="autoZero"/>
         <c:auto val="1"/>
         <c:lblAlgn val="ctr"/>
@@ -2378,7 +2380,7 @@
         <c:noMultiLvlLbl val="0"/>
       </c:catAx>
       <c:valAx>
-        <c:axId val="-2143512776"/>
+        <c:axId val="-2118718968"/>
         <c:scaling>
           <c:orientation val="minMax"/>
         </c:scaling>
@@ -2389,7 +2391,7 @@
         <c:majorTickMark val="out"/>
         <c:minorTickMark val="none"/>
         <c:tickLblPos val="nextTo"/>
-        <c:crossAx val="-2065865192"/>
+        <c:crossAx val="-2118721944"/>
         <c:crosses val="autoZero"/>
         <c:crossBetween val="between"/>
       </c:valAx>
@@ -2615,11 +2617,11 @@
         </c:dLbls>
         <c:marker val="1"/>
         <c:smooth val="0"/>
-        <c:axId val="-2054735976"/>
-        <c:axId val="-2054516584"/>
+        <c:axId val="-2118530232"/>
+        <c:axId val="-2118178488"/>
       </c:lineChart>
       <c:catAx>
-        <c:axId val="-2054735976"/>
+        <c:axId val="-2118530232"/>
         <c:scaling>
           <c:orientation val="minMax"/>
         </c:scaling>
@@ -2628,7 +2630,7 @@
         <c:majorTickMark val="none"/>
         <c:minorTickMark val="none"/>
         <c:tickLblPos val="none"/>
-        <c:crossAx val="-2054516584"/>
+        <c:crossAx val="-2118178488"/>
         <c:crosses val="autoZero"/>
         <c:auto val="1"/>
         <c:lblAlgn val="ctr"/>
@@ -2636,7 +2638,7 @@
         <c:noMultiLvlLbl val="0"/>
       </c:catAx>
       <c:valAx>
-        <c:axId val="-2054516584"/>
+        <c:axId val="-2118178488"/>
         <c:scaling>
           <c:orientation val="minMax"/>
         </c:scaling>
@@ -2647,7 +2649,7 @@
         <c:majorTickMark val="out"/>
         <c:minorTickMark val="none"/>
         <c:tickLblPos val="nextTo"/>
-        <c:crossAx val="-2054735976"/>
+        <c:crossAx val="-2118530232"/>
         <c:crosses val="autoZero"/>
         <c:crossBetween val="between"/>
       </c:valAx>
@@ -2937,11 +2939,11 @@
           <c:showPercent val="0"/>
           <c:showBubbleSize val="0"/>
         </c:dLbls>
-        <c:axId val="-2071302680"/>
-        <c:axId val="-2071300600"/>
+        <c:axId val="-2083118120"/>
+        <c:axId val="-2083115080"/>
       </c:areaChart>
       <c:dateAx>
-        <c:axId val="-2071302680"/>
+        <c:axId val="-2083118120"/>
         <c:scaling>
           <c:orientation val="minMax"/>
         </c:scaling>
@@ -2951,14 +2953,14 @@
         <c:majorTickMark val="none"/>
         <c:minorTickMark val="none"/>
         <c:tickLblPos val="none"/>
-        <c:crossAx val="-2071300600"/>
+        <c:crossAx val="-2083115080"/>
         <c:crosses val="autoZero"/>
         <c:auto val="1"/>
         <c:lblOffset val="100"/>
         <c:baseTimeUnit val="days"/>
       </c:dateAx>
       <c:valAx>
-        <c:axId val="-2071300600"/>
+        <c:axId val="-2083115080"/>
         <c:scaling>
           <c:orientation val="minMax"/>
         </c:scaling>
@@ -2969,7 +2971,7 @@
         <c:majorTickMark val="out"/>
         <c:minorTickMark val="none"/>
         <c:tickLblPos val="nextTo"/>
-        <c:crossAx val="-2071302680"/>
+        <c:crossAx val="-2083118120"/>
         <c:crosses val="autoZero"/>
         <c:crossBetween val="midCat"/>
       </c:valAx>
@@ -3106,6 +3108,1002 @@
 </c:chartSpace>
 </file>
 
+<file path=ppt/charts/chart21.xml><?xml version="1.0" encoding="utf-8"?>
+<c:chartSpace xmlns:c="http://schemas.openxmlformats.org/drawingml/2006/chart" xmlns:a="http://schemas.openxmlformats.org/drawingml/2006/main" xmlns:r="http://schemas.openxmlformats.org/officeDocument/2006/relationships">
+  <c:date1904 val="0"/>
+  <c:lang val="en-US"/>
+  <c:roundedCorners val="0"/>
+  <mc:AlternateContent xmlns:mc="http://schemas.openxmlformats.org/markup-compatibility/2006">
+    <mc:Choice xmlns:c14="http://schemas.microsoft.com/office/drawing/2007/8/2/chart" Requires="c14">
+      <c14:style val="118"/>
+    </mc:Choice>
+    <mc:Fallback>
+      <c:style val="18"/>
+    </mc:Fallback>
+  </mc:AlternateContent>
+  <c:chart>
+    <c:autoTitleDeleted val="1"/>
+    <c:plotArea>
+      <c:layout/>
+      <c:scatterChart>
+        <c:scatterStyle val="lineMarker"/>
+        <c:varyColors val="0"/>
+        <c:ser>
+          <c:idx val="0"/>
+          <c:order val="0"/>
+          <c:tx>
+            <c:strRef>
+              <c:f>Sheet1!$B$1</c:f>
+              <c:strCache>
+                <c:ptCount val="1"/>
+                <c:pt idx="0">
+                  <c:v>Y-Value 1</c:v>
+                </c:pt>
+              </c:strCache>
+            </c:strRef>
+          </c:tx>
+          <c:spPr>
+            <a:ln w="47625">
+              <a:noFill/>
+            </a:ln>
+          </c:spPr>
+          <c:xVal>
+            <c:numRef>
+              <c:f>Sheet1!$A$2:$A$4</c:f>
+              <c:numCache>
+                <c:formatCode>General</c:formatCode>
+                <c:ptCount val="3"/>
+                <c:pt idx="0">
+                  <c:v>0.7</c:v>
+                </c:pt>
+                <c:pt idx="1">
+                  <c:v>1.8</c:v>
+                </c:pt>
+                <c:pt idx="2">
+                  <c:v>2.6</c:v>
+                </c:pt>
+              </c:numCache>
+            </c:numRef>
+          </c:xVal>
+          <c:yVal>
+            <c:numRef>
+              <c:f>Sheet1!$B$2:$B$4</c:f>
+              <c:numCache>
+                <c:formatCode>General</c:formatCode>
+                <c:ptCount val="3"/>
+                <c:pt idx="0">
+                  <c:v>2.7</c:v>
+                </c:pt>
+                <c:pt idx="1">
+                  <c:v>3.2</c:v>
+                </c:pt>
+                <c:pt idx="2">
+                  <c:v>0.8</c:v>
+                </c:pt>
+              </c:numCache>
+            </c:numRef>
+          </c:yVal>
+          <c:smooth val="0"/>
+        </c:ser>
+        <c:dLbls>
+          <c:showLegendKey val="0"/>
+          <c:showVal val="0"/>
+          <c:showCatName val="0"/>
+          <c:showSerName val="0"/>
+          <c:showPercent val="0"/>
+          <c:showBubbleSize val="0"/>
+        </c:dLbls>
+        <c:axId val="-2118780904"/>
+        <c:axId val="-2118898856"/>
+      </c:scatterChart>
+      <c:valAx>
+        <c:axId val="-2118780904"/>
+        <c:scaling>
+          <c:orientation val="minMax"/>
+        </c:scaling>
+        <c:delete val="0"/>
+        <c:axPos val="b"/>
+        <c:numFmt formatCode="General" sourceLinked="1"/>
+        <c:majorTickMark val="out"/>
+        <c:minorTickMark val="none"/>
+        <c:tickLblPos val="nextTo"/>
+        <c:crossAx val="-2118898856"/>
+        <c:crosses val="autoZero"/>
+        <c:crossBetween val="midCat"/>
+      </c:valAx>
+      <c:valAx>
+        <c:axId val="-2118898856"/>
+        <c:scaling>
+          <c:orientation val="minMax"/>
+        </c:scaling>
+        <c:delete val="0"/>
+        <c:axPos val="l"/>
+        <c:majorGridlines/>
+        <c:numFmt formatCode="General" sourceLinked="1"/>
+        <c:majorTickMark val="out"/>
+        <c:minorTickMark val="none"/>
+        <c:tickLblPos val="nextTo"/>
+        <c:crossAx val="-2118780904"/>
+        <c:crosses val="autoZero"/>
+        <c:crossBetween val="midCat"/>
+      </c:valAx>
+    </c:plotArea>
+    <c:plotVisOnly val="1"/>
+    <c:dispBlanksAs val="gap"/>
+    <c:showDLblsOverMax val="0"/>
+  </c:chart>
+  <c:txPr>
+    <a:bodyPr/>
+    <a:lstStyle/>
+    <a:p>
+      <a:pPr>
+        <a:defRPr sz="1800"/>
+      </a:pPr>
+      <a:endParaRPr lang="en-US"/>
+    </a:p>
+  </c:txPr>
+  <c:externalData r:id="rId1">
+    <c:autoUpdate val="0"/>
+  </c:externalData>
+</c:chartSpace>
+</file>
+
+<file path=ppt/charts/chart22.xml><?xml version="1.0" encoding="utf-8"?>
+<c:chartSpace xmlns:c="http://schemas.openxmlformats.org/drawingml/2006/chart" xmlns:a="http://schemas.openxmlformats.org/drawingml/2006/main" xmlns:r="http://schemas.openxmlformats.org/officeDocument/2006/relationships">
+  <c:date1904 val="0"/>
+  <c:lang val="en-US"/>
+  <c:roundedCorners val="0"/>
+  <mc:AlternateContent xmlns:mc="http://schemas.openxmlformats.org/markup-compatibility/2006">
+    <mc:Choice xmlns:c14="http://schemas.microsoft.com/office/drawing/2007/8/2/chart" Requires="c14">
+      <c14:style val="118"/>
+    </mc:Choice>
+    <mc:Fallback>
+      <c:style val="18"/>
+    </mc:Fallback>
+  </mc:AlternateContent>
+  <c:chart>
+    <c:autoTitleDeleted val="1"/>
+    <c:plotArea>
+      <c:layout/>
+      <c:scatterChart>
+        <c:scatterStyle val="lineMarker"/>
+        <c:varyColors val="0"/>
+        <c:ser>
+          <c:idx val="0"/>
+          <c:order val="0"/>
+          <c:tx>
+            <c:strRef>
+              <c:f>Sheet1!$B$1</c:f>
+              <c:strCache>
+                <c:ptCount val="1"/>
+                <c:pt idx="0">
+                  <c:v>Y-Value 1</c:v>
+                </c:pt>
+              </c:strCache>
+            </c:strRef>
+          </c:tx>
+          <c:xVal>
+            <c:numRef>
+              <c:f>Sheet1!$A$2:$A$4</c:f>
+              <c:numCache>
+                <c:formatCode>General</c:formatCode>
+                <c:ptCount val="3"/>
+                <c:pt idx="0">
+                  <c:v>0.7</c:v>
+                </c:pt>
+                <c:pt idx="1">
+                  <c:v>1.8</c:v>
+                </c:pt>
+                <c:pt idx="2">
+                  <c:v>2.6</c:v>
+                </c:pt>
+              </c:numCache>
+            </c:numRef>
+          </c:xVal>
+          <c:yVal>
+            <c:numRef>
+              <c:f>Sheet1!$B$2:$B$4</c:f>
+              <c:numCache>
+                <c:formatCode>General</c:formatCode>
+                <c:ptCount val="3"/>
+                <c:pt idx="0">
+                  <c:v>2.7</c:v>
+                </c:pt>
+                <c:pt idx="1">
+                  <c:v>3.2</c:v>
+                </c:pt>
+                <c:pt idx="2">
+                  <c:v>0.8</c:v>
+                </c:pt>
+              </c:numCache>
+            </c:numRef>
+          </c:yVal>
+          <c:smooth val="0"/>
+        </c:ser>
+        <c:dLbls>
+          <c:showLegendKey val="0"/>
+          <c:showVal val="0"/>
+          <c:showCatName val="0"/>
+          <c:showSerName val="0"/>
+          <c:showPercent val="0"/>
+          <c:showBubbleSize val="0"/>
+        </c:dLbls>
+        <c:axId val="-2088184280"/>
+        <c:axId val="-2087797768"/>
+      </c:scatterChart>
+      <c:valAx>
+        <c:axId val="-2088184280"/>
+        <c:scaling>
+          <c:orientation val="minMax"/>
+        </c:scaling>
+        <c:delete val="0"/>
+        <c:axPos val="b"/>
+        <c:numFmt formatCode="General" sourceLinked="1"/>
+        <c:majorTickMark val="out"/>
+        <c:minorTickMark val="none"/>
+        <c:tickLblPos val="nextTo"/>
+        <c:crossAx val="-2087797768"/>
+        <c:crosses val="autoZero"/>
+        <c:crossBetween val="midCat"/>
+      </c:valAx>
+      <c:valAx>
+        <c:axId val="-2087797768"/>
+        <c:scaling>
+          <c:orientation val="minMax"/>
+        </c:scaling>
+        <c:delete val="0"/>
+        <c:axPos val="l"/>
+        <c:majorGridlines/>
+        <c:numFmt formatCode="General" sourceLinked="1"/>
+        <c:majorTickMark val="out"/>
+        <c:minorTickMark val="none"/>
+        <c:tickLblPos val="nextTo"/>
+        <c:crossAx val="-2088184280"/>
+        <c:crosses val="autoZero"/>
+        <c:crossBetween val="midCat"/>
+      </c:valAx>
+    </c:plotArea>
+    <c:plotVisOnly val="1"/>
+    <c:dispBlanksAs val="gap"/>
+    <c:showDLblsOverMax val="0"/>
+  </c:chart>
+  <c:txPr>
+    <a:bodyPr/>
+    <a:lstStyle/>
+    <a:p>
+      <a:pPr>
+        <a:defRPr sz="1800"/>
+      </a:pPr>
+      <a:endParaRPr lang="en-US"/>
+    </a:p>
+  </c:txPr>
+  <c:externalData r:id="rId1">
+    <c:autoUpdate val="0"/>
+  </c:externalData>
+</c:chartSpace>
+</file>
+
+<file path=ppt/charts/chart23.xml><?xml version="1.0" encoding="utf-8"?>
+<c:chartSpace xmlns:c="http://schemas.openxmlformats.org/drawingml/2006/chart" xmlns:a="http://schemas.openxmlformats.org/drawingml/2006/main" xmlns:r="http://schemas.openxmlformats.org/officeDocument/2006/relationships">
+  <c:date1904 val="0"/>
+  <c:lang val="en-US"/>
+  <c:roundedCorners val="0"/>
+  <mc:AlternateContent xmlns:mc="http://schemas.openxmlformats.org/markup-compatibility/2006">
+    <mc:Choice xmlns:c14="http://schemas.microsoft.com/office/drawing/2007/8/2/chart" Requires="c14">
+      <c14:style val="118"/>
+    </mc:Choice>
+    <mc:Fallback>
+      <c:style val="18"/>
+    </mc:Fallback>
+  </mc:AlternateContent>
+  <c:chart>
+    <c:autoTitleDeleted val="1"/>
+    <c:plotArea>
+      <c:layout/>
+      <c:scatterChart>
+        <c:scatterStyle val="lineMarker"/>
+        <c:varyColors val="0"/>
+        <c:ser>
+          <c:idx val="0"/>
+          <c:order val="0"/>
+          <c:tx>
+            <c:strRef>
+              <c:f>Sheet1!$B$1</c:f>
+              <c:strCache>
+                <c:ptCount val="1"/>
+                <c:pt idx="0">
+                  <c:v>Y-Value 1</c:v>
+                </c:pt>
+              </c:strCache>
+            </c:strRef>
+          </c:tx>
+          <c:marker>
+            <c:symbol val="none"/>
+          </c:marker>
+          <c:xVal>
+            <c:numRef>
+              <c:f>Sheet1!$A$2:$A$4</c:f>
+              <c:numCache>
+                <c:formatCode>General</c:formatCode>
+                <c:ptCount val="3"/>
+                <c:pt idx="0">
+                  <c:v>0.7</c:v>
+                </c:pt>
+                <c:pt idx="1">
+                  <c:v>1.8</c:v>
+                </c:pt>
+                <c:pt idx="2">
+                  <c:v>2.6</c:v>
+                </c:pt>
+              </c:numCache>
+            </c:numRef>
+          </c:xVal>
+          <c:yVal>
+            <c:numRef>
+              <c:f>Sheet1!$B$2:$B$4</c:f>
+              <c:numCache>
+                <c:formatCode>General</c:formatCode>
+                <c:ptCount val="3"/>
+                <c:pt idx="0">
+                  <c:v>2.7</c:v>
+                </c:pt>
+                <c:pt idx="1">
+                  <c:v>3.2</c:v>
+                </c:pt>
+                <c:pt idx="2">
+                  <c:v>0.8</c:v>
+                </c:pt>
+              </c:numCache>
+            </c:numRef>
+          </c:yVal>
+          <c:smooth val="0"/>
+        </c:ser>
+        <c:dLbls>
+          <c:showLegendKey val="0"/>
+          <c:showVal val="0"/>
+          <c:showCatName val="0"/>
+          <c:showSerName val="0"/>
+          <c:showPercent val="0"/>
+          <c:showBubbleSize val="0"/>
+        </c:dLbls>
+        <c:axId val="-2081686136"/>
+        <c:axId val="-2081492104"/>
+      </c:scatterChart>
+      <c:valAx>
+        <c:axId val="-2081686136"/>
+        <c:scaling>
+          <c:orientation val="minMax"/>
+        </c:scaling>
+        <c:delete val="0"/>
+        <c:axPos val="b"/>
+        <c:numFmt formatCode="General" sourceLinked="1"/>
+        <c:majorTickMark val="out"/>
+        <c:minorTickMark val="none"/>
+        <c:tickLblPos val="nextTo"/>
+        <c:crossAx val="-2081492104"/>
+        <c:crosses val="autoZero"/>
+        <c:crossBetween val="midCat"/>
+      </c:valAx>
+      <c:valAx>
+        <c:axId val="-2081492104"/>
+        <c:scaling>
+          <c:orientation val="minMax"/>
+        </c:scaling>
+        <c:delete val="0"/>
+        <c:axPos val="l"/>
+        <c:majorGridlines/>
+        <c:numFmt formatCode="General" sourceLinked="1"/>
+        <c:majorTickMark val="out"/>
+        <c:minorTickMark val="none"/>
+        <c:tickLblPos val="nextTo"/>
+        <c:crossAx val="-2081686136"/>
+        <c:crosses val="autoZero"/>
+        <c:crossBetween val="midCat"/>
+      </c:valAx>
+    </c:plotArea>
+    <c:plotVisOnly val="1"/>
+    <c:dispBlanksAs val="gap"/>
+    <c:showDLblsOverMax val="0"/>
+  </c:chart>
+  <c:txPr>
+    <a:bodyPr/>
+    <a:lstStyle/>
+    <a:p>
+      <a:pPr>
+        <a:defRPr sz="1800"/>
+      </a:pPr>
+      <a:endParaRPr lang="en-US"/>
+    </a:p>
+  </c:txPr>
+  <c:externalData r:id="rId1">
+    <c:autoUpdate val="0"/>
+  </c:externalData>
+</c:chartSpace>
+</file>
+
+<file path=ppt/charts/chart24.xml><?xml version="1.0" encoding="utf-8"?>
+<c:chartSpace xmlns:c="http://schemas.openxmlformats.org/drawingml/2006/chart" xmlns:a="http://schemas.openxmlformats.org/drawingml/2006/main" xmlns:r="http://schemas.openxmlformats.org/officeDocument/2006/relationships">
+  <c:date1904 val="0"/>
+  <c:lang val="en-US"/>
+  <c:roundedCorners val="0"/>
+  <mc:AlternateContent xmlns:mc="http://schemas.openxmlformats.org/markup-compatibility/2006">
+    <mc:Choice xmlns:c14="http://schemas.microsoft.com/office/drawing/2007/8/2/chart" Requires="c14">
+      <c14:style val="118"/>
+    </mc:Choice>
+    <mc:Fallback>
+      <c:style val="18"/>
+    </mc:Fallback>
+  </mc:AlternateContent>
+  <c:chart>
+    <c:autoTitleDeleted val="1"/>
+    <c:plotArea>
+      <c:layout/>
+      <c:scatterChart>
+        <c:scatterStyle val="smoothMarker"/>
+        <c:varyColors val="0"/>
+        <c:ser>
+          <c:idx val="0"/>
+          <c:order val="0"/>
+          <c:tx>
+            <c:strRef>
+              <c:f>Sheet1!$B$1</c:f>
+              <c:strCache>
+                <c:ptCount val="1"/>
+                <c:pt idx="0">
+                  <c:v>Y-Value 1</c:v>
+                </c:pt>
+              </c:strCache>
+            </c:strRef>
+          </c:tx>
+          <c:xVal>
+            <c:numRef>
+              <c:f>Sheet1!$A$2:$A$4</c:f>
+              <c:numCache>
+                <c:formatCode>General</c:formatCode>
+                <c:ptCount val="3"/>
+                <c:pt idx="0">
+                  <c:v>0.7</c:v>
+                </c:pt>
+                <c:pt idx="1">
+                  <c:v>1.8</c:v>
+                </c:pt>
+                <c:pt idx="2">
+                  <c:v>2.6</c:v>
+                </c:pt>
+              </c:numCache>
+            </c:numRef>
+          </c:xVal>
+          <c:yVal>
+            <c:numRef>
+              <c:f>Sheet1!$B$2:$B$4</c:f>
+              <c:numCache>
+                <c:formatCode>General</c:formatCode>
+                <c:ptCount val="3"/>
+                <c:pt idx="0">
+                  <c:v>2.7</c:v>
+                </c:pt>
+                <c:pt idx="1">
+                  <c:v>3.2</c:v>
+                </c:pt>
+                <c:pt idx="2">
+                  <c:v>0.8</c:v>
+                </c:pt>
+              </c:numCache>
+            </c:numRef>
+          </c:yVal>
+          <c:smooth val="1"/>
+        </c:ser>
+        <c:dLbls>
+          <c:showLegendKey val="0"/>
+          <c:showVal val="0"/>
+          <c:showCatName val="0"/>
+          <c:showSerName val="0"/>
+          <c:showPercent val="0"/>
+          <c:showBubbleSize val="0"/>
+        </c:dLbls>
+        <c:axId val="-2120219480"/>
+        <c:axId val="-2088014888"/>
+      </c:scatterChart>
+      <c:valAx>
+        <c:axId val="-2120219480"/>
+        <c:scaling>
+          <c:orientation val="minMax"/>
+        </c:scaling>
+        <c:delete val="0"/>
+        <c:axPos val="b"/>
+        <c:numFmt formatCode="General" sourceLinked="1"/>
+        <c:majorTickMark val="out"/>
+        <c:minorTickMark val="none"/>
+        <c:tickLblPos val="nextTo"/>
+        <c:crossAx val="-2088014888"/>
+        <c:crosses val="autoZero"/>
+        <c:crossBetween val="midCat"/>
+      </c:valAx>
+      <c:valAx>
+        <c:axId val="-2088014888"/>
+        <c:scaling>
+          <c:orientation val="minMax"/>
+        </c:scaling>
+        <c:delete val="0"/>
+        <c:axPos val="l"/>
+        <c:majorGridlines/>
+        <c:numFmt formatCode="General" sourceLinked="1"/>
+        <c:majorTickMark val="out"/>
+        <c:minorTickMark val="none"/>
+        <c:tickLblPos val="nextTo"/>
+        <c:crossAx val="-2120219480"/>
+        <c:crosses val="autoZero"/>
+        <c:crossBetween val="midCat"/>
+      </c:valAx>
+    </c:plotArea>
+    <c:plotVisOnly val="1"/>
+    <c:dispBlanksAs val="gap"/>
+    <c:showDLblsOverMax val="0"/>
+  </c:chart>
+  <c:txPr>
+    <a:bodyPr/>
+    <a:lstStyle/>
+    <a:p>
+      <a:pPr>
+        <a:defRPr sz="1800"/>
+      </a:pPr>
+      <a:endParaRPr lang="en-US"/>
+    </a:p>
+  </c:txPr>
+  <c:externalData r:id="rId1">
+    <c:autoUpdate val="0"/>
+  </c:externalData>
+</c:chartSpace>
+</file>
+
+<file path=ppt/charts/chart25.xml><?xml version="1.0" encoding="utf-8"?>
+<c:chartSpace xmlns:c="http://schemas.openxmlformats.org/drawingml/2006/chart" xmlns:a="http://schemas.openxmlformats.org/drawingml/2006/main" xmlns:r="http://schemas.openxmlformats.org/officeDocument/2006/relationships">
+  <c:date1904 val="0"/>
+  <c:lang val="en-US"/>
+  <c:roundedCorners val="0"/>
+  <mc:AlternateContent xmlns:mc="http://schemas.openxmlformats.org/markup-compatibility/2006">
+    <mc:Choice xmlns:c14="http://schemas.microsoft.com/office/drawing/2007/8/2/chart" Requires="c14">
+      <c14:style val="118"/>
+    </mc:Choice>
+    <mc:Fallback>
+      <c:style val="18"/>
+    </mc:Fallback>
+  </mc:AlternateContent>
+  <c:chart>
+    <c:autoTitleDeleted val="1"/>
+    <c:plotArea>
+      <c:layout/>
+      <c:scatterChart>
+        <c:scatterStyle val="smoothMarker"/>
+        <c:varyColors val="0"/>
+        <c:ser>
+          <c:idx val="0"/>
+          <c:order val="0"/>
+          <c:tx>
+            <c:strRef>
+              <c:f>Sheet1!$B$1</c:f>
+              <c:strCache>
+                <c:ptCount val="1"/>
+                <c:pt idx="0">
+                  <c:v>Y-Value 1</c:v>
+                </c:pt>
+              </c:strCache>
+            </c:strRef>
+          </c:tx>
+          <c:marker>
+            <c:symbol val="none"/>
+          </c:marker>
+          <c:xVal>
+            <c:numRef>
+              <c:f>Sheet1!$A$2:$A$4</c:f>
+              <c:numCache>
+                <c:formatCode>General</c:formatCode>
+                <c:ptCount val="3"/>
+                <c:pt idx="0">
+                  <c:v>0.7</c:v>
+                </c:pt>
+                <c:pt idx="1">
+                  <c:v>1.8</c:v>
+                </c:pt>
+                <c:pt idx="2">
+                  <c:v>2.6</c:v>
+                </c:pt>
+              </c:numCache>
+            </c:numRef>
+          </c:xVal>
+          <c:yVal>
+            <c:numRef>
+              <c:f>Sheet1!$B$2:$B$4</c:f>
+              <c:numCache>
+                <c:formatCode>General</c:formatCode>
+                <c:ptCount val="3"/>
+                <c:pt idx="0">
+                  <c:v>2.7</c:v>
+                </c:pt>
+                <c:pt idx="1">
+                  <c:v>3.2</c:v>
+                </c:pt>
+                <c:pt idx="2">
+                  <c:v>0.8</c:v>
+                </c:pt>
+              </c:numCache>
+            </c:numRef>
+          </c:yVal>
+          <c:smooth val="1"/>
+        </c:ser>
+        <c:dLbls>
+          <c:showLegendKey val="0"/>
+          <c:showVal val="0"/>
+          <c:showCatName val="0"/>
+          <c:showSerName val="0"/>
+          <c:showPercent val="0"/>
+          <c:showBubbleSize val="0"/>
+        </c:dLbls>
+        <c:axId val="-2088323224"/>
+        <c:axId val="-2119955512"/>
+      </c:scatterChart>
+      <c:valAx>
+        <c:axId val="-2088323224"/>
+        <c:scaling>
+          <c:orientation val="minMax"/>
+        </c:scaling>
+        <c:delete val="0"/>
+        <c:axPos val="b"/>
+        <c:numFmt formatCode="General" sourceLinked="1"/>
+        <c:majorTickMark val="out"/>
+        <c:minorTickMark val="none"/>
+        <c:tickLblPos val="nextTo"/>
+        <c:crossAx val="-2119955512"/>
+        <c:crosses val="autoZero"/>
+        <c:crossBetween val="midCat"/>
+      </c:valAx>
+      <c:valAx>
+        <c:axId val="-2119955512"/>
+        <c:scaling>
+          <c:orientation val="minMax"/>
+        </c:scaling>
+        <c:delete val="0"/>
+        <c:axPos val="l"/>
+        <c:majorGridlines/>
+        <c:numFmt formatCode="General" sourceLinked="1"/>
+        <c:majorTickMark val="out"/>
+        <c:minorTickMark val="none"/>
+        <c:tickLblPos val="nextTo"/>
+        <c:crossAx val="-2088323224"/>
+        <c:crosses val="autoZero"/>
+        <c:crossBetween val="midCat"/>
+      </c:valAx>
+    </c:plotArea>
+    <c:plotVisOnly val="1"/>
+    <c:dispBlanksAs val="gap"/>
+    <c:showDLblsOverMax val="0"/>
+  </c:chart>
+  <c:txPr>
+    <a:bodyPr/>
+    <a:lstStyle/>
+    <a:p>
+      <a:pPr>
+        <a:defRPr sz="1800"/>
+      </a:pPr>
+      <a:endParaRPr lang="en-US"/>
+    </a:p>
+  </c:txPr>
+  <c:externalData r:id="rId1">
+    <c:autoUpdate val="0"/>
+  </c:externalData>
+</c:chartSpace>
+</file>
+
+<file path=ppt/charts/chart26.xml><?xml version="1.0" encoding="utf-8"?>
+<c:chartSpace xmlns:c="http://schemas.openxmlformats.org/drawingml/2006/chart" xmlns:a="http://schemas.openxmlformats.org/drawingml/2006/main" xmlns:r="http://schemas.openxmlformats.org/officeDocument/2006/relationships">
+  <c:date1904 val="0"/>
+  <c:lang val="en-US"/>
+  <c:roundedCorners val="0"/>
+  <mc:AlternateContent xmlns:mc="http://schemas.openxmlformats.org/markup-compatibility/2006">
+    <mc:Choice xmlns:c14="http://schemas.microsoft.com/office/drawing/2007/8/2/chart" Requires="c14">
+      <c14:style val="118"/>
+    </mc:Choice>
+    <mc:Fallback>
+      <c:style val="18"/>
+    </mc:Fallback>
+  </mc:AlternateContent>
+  <c:chart>
+    <c:autoTitleDeleted val="1"/>
+    <c:plotArea>
+      <c:layout/>
+      <c:bubbleChart>
+        <c:varyColors val="0"/>
+        <c:ser>
+          <c:idx val="0"/>
+          <c:order val="0"/>
+          <c:tx>
+            <c:strRef>
+              <c:f>Sheet1!$B$1</c:f>
+              <c:strCache>
+                <c:ptCount val="1"/>
+                <c:pt idx="0">
+                  <c:v>Y-Value 1</c:v>
+                </c:pt>
+              </c:strCache>
+            </c:strRef>
+          </c:tx>
+          <c:invertIfNegative val="0"/>
+          <c:xVal>
+            <c:numRef>
+              <c:f>Sheet1!$A$2:$A$4</c:f>
+              <c:numCache>
+                <c:formatCode>General</c:formatCode>
+                <c:ptCount val="3"/>
+                <c:pt idx="0">
+                  <c:v>0.7</c:v>
+                </c:pt>
+                <c:pt idx="1">
+                  <c:v>1.8</c:v>
+                </c:pt>
+                <c:pt idx="2">
+                  <c:v>2.6</c:v>
+                </c:pt>
+              </c:numCache>
+            </c:numRef>
+          </c:xVal>
+          <c:yVal>
+            <c:numRef>
+              <c:f>Sheet1!$B$2:$B$4</c:f>
+              <c:numCache>
+                <c:formatCode>General</c:formatCode>
+                <c:ptCount val="3"/>
+                <c:pt idx="0">
+                  <c:v>2.7</c:v>
+                </c:pt>
+                <c:pt idx="1">
+                  <c:v>3.2</c:v>
+                </c:pt>
+                <c:pt idx="2">
+                  <c:v>0.8</c:v>
+                </c:pt>
+              </c:numCache>
+            </c:numRef>
+          </c:yVal>
+          <c:bubbleSize>
+            <c:numRef>
+              <c:f>Sheet1!$C$2:$C$4</c:f>
+              <c:numCache>
+                <c:formatCode>General</c:formatCode>
+                <c:ptCount val="3"/>
+                <c:pt idx="0">
+                  <c:v>10.0</c:v>
+                </c:pt>
+                <c:pt idx="1">
+                  <c:v>4.0</c:v>
+                </c:pt>
+                <c:pt idx="2">
+                  <c:v>8.0</c:v>
+                </c:pt>
+              </c:numCache>
+            </c:numRef>
+          </c:bubbleSize>
+          <c:bubble3D val="0"/>
+        </c:ser>
+        <c:dLbls>
+          <c:showLegendKey val="0"/>
+          <c:showVal val="0"/>
+          <c:showCatName val="0"/>
+          <c:showSerName val="0"/>
+          <c:showPercent val="0"/>
+          <c:showBubbleSize val="0"/>
+        </c:dLbls>
+        <c:bubbleScale val="100"/>
+        <c:showNegBubbles val="0"/>
+        <c:axId val="-2117441288"/>
+        <c:axId val="-2117422024"/>
+      </c:bubbleChart>
+      <c:valAx>
+        <c:axId val="-2117441288"/>
+        <c:scaling>
+          <c:orientation val="minMax"/>
+        </c:scaling>
+        <c:delete val="0"/>
+        <c:axPos val="b"/>
+        <c:numFmt formatCode="General" sourceLinked="1"/>
+        <c:majorTickMark val="out"/>
+        <c:minorTickMark val="none"/>
+        <c:tickLblPos val="nextTo"/>
+        <c:crossAx val="-2117422024"/>
+        <c:crosses val="autoZero"/>
+        <c:crossBetween val="midCat"/>
+      </c:valAx>
+      <c:valAx>
+        <c:axId val="-2117422024"/>
+        <c:scaling>
+          <c:orientation val="minMax"/>
+        </c:scaling>
+        <c:delete val="0"/>
+        <c:axPos val="l"/>
+        <c:majorGridlines/>
+        <c:numFmt formatCode="General" sourceLinked="1"/>
+        <c:majorTickMark val="out"/>
+        <c:minorTickMark val="none"/>
+        <c:tickLblPos val="nextTo"/>
+        <c:crossAx val="-2117441288"/>
+        <c:crosses val="autoZero"/>
+        <c:crossBetween val="midCat"/>
+      </c:valAx>
+    </c:plotArea>
+    <c:plotVisOnly val="1"/>
+    <c:dispBlanksAs val="gap"/>
+    <c:showDLblsOverMax val="0"/>
+  </c:chart>
+  <c:txPr>
+    <a:bodyPr/>
+    <a:lstStyle/>
+    <a:p>
+      <a:pPr>
+        <a:defRPr sz="1800"/>
+      </a:pPr>
+      <a:endParaRPr lang="en-US"/>
+    </a:p>
+  </c:txPr>
+  <c:externalData r:id="rId1">
+    <c:autoUpdate val="0"/>
+  </c:externalData>
+</c:chartSpace>
+</file>
+
+<file path=ppt/charts/chart27.xml><?xml version="1.0" encoding="utf-8"?>
+<c:chartSpace xmlns:c="http://schemas.openxmlformats.org/drawingml/2006/chart" xmlns:a="http://schemas.openxmlformats.org/drawingml/2006/main" xmlns:r="http://schemas.openxmlformats.org/officeDocument/2006/relationships">
+  <c:date1904 val="0"/>
+  <c:lang val="en-US"/>
+  <c:roundedCorners val="0"/>
+  <mc:AlternateContent xmlns:mc="http://schemas.openxmlformats.org/markup-compatibility/2006">
+    <mc:Choice xmlns:c14="http://schemas.microsoft.com/office/drawing/2007/8/2/chart" Requires="c14">
+      <c14:style val="118"/>
+    </mc:Choice>
+    <mc:Fallback>
+      <c:style val="18"/>
+    </mc:Fallback>
+  </mc:AlternateContent>
+  <c:chart>
+    <c:autoTitleDeleted val="1"/>
+    <c:plotArea>
+      <c:layout/>
+      <c:bubbleChart>
+        <c:varyColors val="0"/>
+        <c:ser>
+          <c:idx val="0"/>
+          <c:order val="0"/>
+          <c:tx>
+            <c:strRef>
+              <c:f>Sheet1!$B$1</c:f>
+              <c:strCache>
+                <c:ptCount val="1"/>
+                <c:pt idx="0">
+                  <c:v>Y-Value 1</c:v>
+                </c:pt>
+              </c:strCache>
+            </c:strRef>
+          </c:tx>
+          <c:invertIfNegative val="0"/>
+          <c:xVal>
+            <c:numRef>
+              <c:f>Sheet1!$A$2:$A$4</c:f>
+              <c:numCache>
+                <c:formatCode>General</c:formatCode>
+                <c:ptCount val="3"/>
+                <c:pt idx="0">
+                  <c:v>0.7</c:v>
+                </c:pt>
+                <c:pt idx="1">
+                  <c:v>1.8</c:v>
+                </c:pt>
+                <c:pt idx="2">
+                  <c:v>2.6</c:v>
+                </c:pt>
+              </c:numCache>
+            </c:numRef>
+          </c:xVal>
+          <c:yVal>
+            <c:numRef>
+              <c:f>Sheet1!$B$2:$B$4</c:f>
+              <c:numCache>
+                <c:formatCode>General</c:formatCode>
+                <c:ptCount val="3"/>
+                <c:pt idx="0">
+                  <c:v>2.7</c:v>
+                </c:pt>
+                <c:pt idx="1">
+                  <c:v>3.2</c:v>
+                </c:pt>
+                <c:pt idx="2">
+                  <c:v>0.8</c:v>
+                </c:pt>
+              </c:numCache>
+            </c:numRef>
+          </c:yVal>
+          <c:bubbleSize>
+            <c:numRef>
+              <c:f>Sheet1!$C$2:$C$4</c:f>
+              <c:numCache>
+                <c:formatCode>General</c:formatCode>
+                <c:ptCount val="3"/>
+                <c:pt idx="0">
+                  <c:v>10.0</c:v>
+                </c:pt>
+                <c:pt idx="1">
+                  <c:v>4.0</c:v>
+                </c:pt>
+                <c:pt idx="2">
+                  <c:v>8.0</c:v>
+                </c:pt>
+              </c:numCache>
+            </c:numRef>
+          </c:bubbleSize>
+          <c:bubble3D val="1"/>
+        </c:ser>
+        <c:dLbls>
+          <c:showLegendKey val="0"/>
+          <c:showVal val="0"/>
+          <c:showCatName val="0"/>
+          <c:showSerName val="0"/>
+          <c:showPercent val="0"/>
+          <c:showBubbleSize val="0"/>
+        </c:dLbls>
+        <c:bubbleScale val="100"/>
+        <c:showNegBubbles val="0"/>
+        <c:axId val="-2046379432"/>
+        <c:axId val="-2119074152"/>
+      </c:bubbleChart>
+      <c:valAx>
+        <c:axId val="-2046379432"/>
+        <c:scaling>
+          <c:orientation val="minMax"/>
+        </c:scaling>
+        <c:delete val="0"/>
+        <c:axPos val="b"/>
+        <c:numFmt formatCode="General" sourceLinked="1"/>
+        <c:majorTickMark val="out"/>
+        <c:minorTickMark val="none"/>
+        <c:tickLblPos val="nextTo"/>
+        <c:crossAx val="-2119074152"/>
+        <c:crosses val="autoZero"/>
+        <c:crossBetween val="midCat"/>
+      </c:valAx>
+      <c:valAx>
+        <c:axId val="-2119074152"/>
+        <c:scaling>
+          <c:orientation val="minMax"/>
+        </c:scaling>
+        <c:delete val="0"/>
+        <c:axPos val="l"/>
+        <c:majorGridlines/>
+        <c:numFmt formatCode="General" sourceLinked="1"/>
+        <c:majorTickMark val="out"/>
+        <c:minorTickMark val="none"/>
+        <c:tickLblPos val="nextTo"/>
+        <c:crossAx val="-2046379432"/>
+        <c:crosses val="autoZero"/>
+        <c:crossBetween val="midCat"/>
+      </c:valAx>
+    </c:plotArea>
+    <c:plotVisOnly val="1"/>
+    <c:dispBlanksAs val="gap"/>
+    <c:showDLblsOverMax val="0"/>
+  </c:chart>
+  <c:txPr>
+    <a:bodyPr/>
+    <a:lstStyle/>
+    <a:p>
+      <a:pPr>
+        <a:defRPr sz="1800"/>
+      </a:pPr>
+      <a:endParaRPr lang="en-US"/>
+    </a:p>
+  </c:txPr>
+  <c:externalData r:id="rId1">
+    <c:autoUpdate val="0"/>
+  </c:externalData>
+</c:chartSpace>
+</file>
+
 <file path=ppt/charts/chart3.xml><?xml version="1.0" encoding="utf-8"?>
 <c:chartSpace xmlns:c="http://schemas.openxmlformats.org/drawingml/2006/chart" xmlns:a="http://schemas.openxmlformats.org/drawingml/2006/main" xmlns:r="http://schemas.openxmlformats.org/officeDocument/2006/relationships">
   <c:date1904 val="0"/>
@@ -3260,11 +4258,11 @@
           <c:showPercent val="0"/>
           <c:showBubbleSize val="0"/>
         </c:dLbls>
-        <c:axId val="-2067187720"/>
-        <c:axId val="-2067646872"/>
+        <c:axId val="-2083089736"/>
+        <c:axId val="-2083086696"/>
       </c:areaChart>
       <c:dateAx>
-        <c:axId val="-2067187720"/>
+        <c:axId val="-2083089736"/>
         <c:scaling>
           <c:orientation val="minMax"/>
         </c:scaling>
@@ -3274,14 +4272,14 @@
         <c:majorTickMark val="none"/>
         <c:minorTickMark val="none"/>
         <c:tickLblPos val="none"/>
-        <c:crossAx val="-2067646872"/>
+        <c:crossAx val="-2083086696"/>
         <c:crosses val="autoZero"/>
         <c:auto val="1"/>
         <c:lblOffset val="100"/>
         <c:baseTimeUnit val="days"/>
       </c:dateAx>
       <c:valAx>
-        <c:axId val="-2067646872"/>
+        <c:axId val="-2083086696"/>
         <c:scaling>
           <c:orientation val="minMax"/>
         </c:scaling>
@@ -3292,7 +4290,7 @@
         <c:majorTickMark val="out"/>
         <c:minorTickMark val="none"/>
         <c:tickLblPos val="nextTo"/>
-        <c:crossAx val="-2067187720"/>
+        <c:crossAx val="-2083089736"/>
         <c:crosses val="autoZero"/>
         <c:crossBetween val="midCat"/>
       </c:valAx>
@@ -3486,12 +4484,12 @@
           <c:showPercent val="0"/>
           <c:showBubbleSize val="0"/>
         </c:dLbls>
-        <c:axId val="-2066953880"/>
-        <c:axId val="-2064266120"/>
-        <c:axId val="-2054488456"/>
+        <c:axId val="-2083061624"/>
+        <c:axId val="-2083058584"/>
+        <c:axId val="-2083055544"/>
       </c:area3DChart>
       <c:dateAx>
-        <c:axId val="-2066953880"/>
+        <c:axId val="-2083061624"/>
         <c:scaling>
           <c:orientation val="minMax"/>
         </c:scaling>
@@ -3501,14 +4499,14 @@
         <c:majorTickMark val="none"/>
         <c:minorTickMark val="none"/>
         <c:tickLblPos val="none"/>
-        <c:crossAx val="-2064266120"/>
+        <c:crossAx val="-2083058584"/>
         <c:crosses val="autoZero"/>
         <c:auto val="1"/>
         <c:lblOffset val="100"/>
         <c:baseTimeUnit val="days"/>
       </c:dateAx>
       <c:valAx>
-        <c:axId val="-2064266120"/>
+        <c:axId val="-2083058584"/>
         <c:scaling>
           <c:orientation val="minMax"/>
         </c:scaling>
@@ -3519,12 +4517,12 @@
         <c:majorTickMark val="out"/>
         <c:minorTickMark val="none"/>
         <c:tickLblPos val="nextTo"/>
-        <c:crossAx val="-2066953880"/>
+        <c:crossAx val="-2083061624"/>
         <c:crosses val="autoZero"/>
         <c:crossBetween val="midCat"/>
       </c:valAx>
       <c:serAx>
-        <c:axId val="-2054488456"/>
+        <c:axId val="-2083055544"/>
         <c:scaling>
           <c:orientation val="minMax"/>
         </c:scaling>
@@ -3533,7 +4531,7 @@
         <c:majorTickMark val="none"/>
         <c:minorTickMark val="none"/>
         <c:tickLblPos val="none"/>
-        <c:crossAx val="-2064266120"/>
+        <c:crossAx val="-2083058584"/>
         <c:crosses val="autoZero"/>
       </c:serAx>
     </c:plotArea>
@@ -3726,12 +4724,12 @@
           <c:showPercent val="0"/>
           <c:showBubbleSize val="0"/>
         </c:dLbls>
-        <c:axId val="-2071976248"/>
-        <c:axId val="-2068114376"/>
+        <c:axId val="-2083031368"/>
+        <c:axId val="-2083028328"/>
         <c:axId val="0"/>
       </c:area3DChart>
       <c:dateAx>
-        <c:axId val="-2071976248"/>
+        <c:axId val="-2083031368"/>
         <c:scaling>
           <c:orientation val="minMax"/>
         </c:scaling>
@@ -3741,14 +4739,14 @@
         <c:majorTickMark val="none"/>
         <c:minorTickMark val="none"/>
         <c:tickLblPos val="none"/>
-        <c:crossAx val="-2068114376"/>
+        <c:crossAx val="-2083028328"/>
         <c:crosses val="autoZero"/>
         <c:auto val="1"/>
         <c:lblOffset val="100"/>
         <c:baseTimeUnit val="days"/>
       </c:dateAx>
       <c:valAx>
-        <c:axId val="-2068114376"/>
+        <c:axId val="-2083028328"/>
         <c:scaling>
           <c:orientation val="minMax"/>
         </c:scaling>
@@ -3759,7 +4757,7 @@
         <c:majorTickMark val="out"/>
         <c:minorTickMark val="none"/>
         <c:tickLblPos val="nextTo"/>
-        <c:crossAx val="-2071976248"/>
+        <c:crossAx val="-2083031368"/>
         <c:crosses val="autoZero"/>
         <c:crossBetween val="midCat"/>
       </c:valAx>
@@ -3953,12 +4951,12 @@
           <c:showPercent val="0"/>
           <c:showBubbleSize val="0"/>
         </c:dLbls>
-        <c:axId val="-2144026952"/>
-        <c:axId val="-2069932152"/>
+        <c:axId val="-2083003080"/>
+        <c:axId val="-2083000040"/>
         <c:axId val="0"/>
       </c:area3DChart>
       <c:dateAx>
-        <c:axId val="-2144026952"/>
+        <c:axId val="-2083003080"/>
         <c:scaling>
           <c:orientation val="minMax"/>
         </c:scaling>
@@ -3968,14 +4966,14 @@
         <c:majorTickMark val="none"/>
         <c:minorTickMark val="none"/>
         <c:tickLblPos val="none"/>
-        <c:crossAx val="-2069932152"/>
+        <c:crossAx val="-2083000040"/>
         <c:crosses val="autoZero"/>
         <c:auto val="1"/>
         <c:lblOffset val="100"/>
         <c:baseTimeUnit val="days"/>
       </c:dateAx>
       <c:valAx>
-        <c:axId val="-2069932152"/>
+        <c:axId val="-2083000040"/>
         <c:scaling>
           <c:orientation val="minMax"/>
         </c:scaling>
@@ -3986,7 +4984,7 @@
         <c:majorTickMark val="out"/>
         <c:minorTickMark val="none"/>
         <c:tickLblPos val="nextTo"/>
-        <c:crossAx val="-2144026952"/>
+        <c:crossAx val="-2083003080"/>
         <c:crosses val="autoZero"/>
         <c:crossBetween val="midCat"/>
       </c:valAx>
@@ -4212,11 +5210,11 @@
           <c:showBubbleSize val="0"/>
         </c:dLbls>
         <c:gapWidth val="150"/>
-        <c:axId val="-2130016488"/>
-        <c:axId val="-2067475064"/>
+        <c:axId val="2082913560"/>
+        <c:axId val="-2118953320"/>
       </c:barChart>
       <c:catAx>
-        <c:axId val="-2130016488"/>
+        <c:axId val="2082913560"/>
         <c:scaling>
           <c:orientation val="minMax"/>
         </c:scaling>
@@ -4225,7 +5223,7 @@
         <c:majorTickMark val="none"/>
         <c:minorTickMark val="none"/>
         <c:tickLblPos val="none"/>
-        <c:crossAx val="-2067475064"/>
+        <c:crossAx val="-2118953320"/>
         <c:crosses val="autoZero"/>
         <c:auto val="1"/>
         <c:lblAlgn val="ctr"/>
@@ -4233,7 +5231,7 @@
         <c:noMultiLvlLbl val="0"/>
       </c:catAx>
       <c:valAx>
-        <c:axId val="-2067475064"/>
+        <c:axId val="-2118953320"/>
         <c:scaling>
           <c:orientation val="minMax"/>
         </c:scaling>
@@ -4244,7 +5242,7 @@
         <c:majorTickMark val="out"/>
         <c:minorTickMark val="none"/>
         <c:tickLblPos val="nextTo"/>
-        <c:crossAx val="-2130016488"/>
+        <c:crossAx val="2082913560"/>
         <c:crosses val="autoZero"/>
         <c:crossBetween val="between"/>
       </c:valAx>
@@ -4471,11 +5469,11 @@
         </c:dLbls>
         <c:gapWidth val="150"/>
         <c:overlap val="100"/>
-        <c:axId val="-2066153896"/>
-        <c:axId val="-2065454808"/>
+        <c:axId val="2082610408"/>
+        <c:axId val="2083429016"/>
       </c:barChart>
       <c:catAx>
-        <c:axId val="-2066153896"/>
+        <c:axId val="2082610408"/>
         <c:scaling>
           <c:orientation val="minMax"/>
         </c:scaling>
@@ -4484,7 +5482,7 @@
         <c:majorTickMark val="none"/>
         <c:minorTickMark val="none"/>
         <c:tickLblPos val="none"/>
-        <c:crossAx val="-2065454808"/>
+        <c:crossAx val="2083429016"/>
         <c:crosses val="autoZero"/>
         <c:auto val="1"/>
         <c:lblAlgn val="ctr"/>
@@ -4492,7 +5490,7 @@
         <c:noMultiLvlLbl val="0"/>
       </c:catAx>
       <c:valAx>
-        <c:axId val="-2065454808"/>
+        <c:axId val="2083429016"/>
         <c:scaling>
           <c:orientation val="minMax"/>
         </c:scaling>
@@ -4503,7 +5501,7 @@
         <c:majorTickMark val="out"/>
         <c:minorTickMark val="none"/>
         <c:tickLblPos val="nextTo"/>
-        <c:crossAx val="-2066153896"/>
+        <c:crossAx val="2082610408"/>
         <c:crosses val="autoZero"/>
         <c:crossBetween val="between"/>
       </c:valAx>
@@ -4730,11 +5728,11 @@
         </c:dLbls>
         <c:gapWidth val="150"/>
         <c:overlap val="100"/>
-        <c:axId val="-2130300488"/>
-        <c:axId val="-2064180088"/>
+        <c:axId val="-2118690536"/>
+        <c:axId val="-2118687560"/>
       </c:barChart>
       <c:catAx>
-        <c:axId val="-2130300488"/>
+        <c:axId val="-2118690536"/>
         <c:scaling>
           <c:orientation val="minMax"/>
         </c:scaling>
@@ -4743,7 +5741,7 @@
         <c:majorTickMark val="none"/>
         <c:minorTickMark val="none"/>
         <c:tickLblPos val="none"/>
-        <c:crossAx val="-2064180088"/>
+        <c:crossAx val="-2118687560"/>
         <c:crosses val="autoZero"/>
         <c:auto val="1"/>
         <c:lblAlgn val="ctr"/>
@@ -4751,7 +5749,7 @@
         <c:noMultiLvlLbl val="0"/>
       </c:catAx>
       <c:valAx>
-        <c:axId val="-2064180088"/>
+        <c:axId val="-2118687560"/>
         <c:scaling>
           <c:orientation val="minMax"/>
         </c:scaling>
@@ -4762,7 +5760,7 @@
         <c:majorTickMark val="out"/>
         <c:minorTickMark val="none"/>
         <c:tickLblPos val="nextTo"/>
-        <c:crossAx val="-2130300488"/>
+        <c:crossAx val="-2118690536"/>
         <c:crosses val="autoZero"/>
         <c:crossBetween val="between"/>
       </c:valAx>
@@ -5653,6 +6651,220 @@
 </p:sld>
 </file>
 
+<file path=ppt/slides/slide5.xml><?xml version="1.0" encoding="utf-8"?>
+<p:sld xmlns:a="http://schemas.openxmlformats.org/drawingml/2006/main" xmlns:r="http://schemas.openxmlformats.org/officeDocument/2006/relationships" xmlns:p="http://schemas.openxmlformats.org/presentationml/2006/main">
+  <p:cSld>
+    <p:spTree>
+      <p:nvGrpSpPr>
+        <p:cNvPr id="1" name=""/>
+        <p:cNvGrpSpPr/>
+        <p:nvPr/>
+      </p:nvGrpSpPr>
+      <p:grpSpPr>
+        <a:xfrm>
+          <a:off x="0" y="0"/>
+          <a:ext cx="0" cy="0"/>
+          <a:chOff x="0" y="0"/>
+          <a:chExt cx="0" cy="0"/>
+        </a:xfrm>
+      </p:grpSpPr>
+      <p:graphicFrame>
+        <p:nvGraphicFramePr>
+          <p:cNvPr id="2" name="Chart 1"/>
+          <p:cNvGraphicFramePr/>
+          <p:nvPr>
+            <p:extLst>
+              <p:ext uri="{D42A27DB-BD31-4B8C-83A1-F6EECF244321}">
+                <p14:modId xmlns:p14="http://schemas.microsoft.com/office/powerpoint/2010/main" val="1875934574"/>
+              </p:ext>
+            </p:extLst>
+          </p:nvPr>
+        </p:nvGraphicFramePr>
+        <p:xfrm>
+          <a:off x="323528" y="692696"/>
+          <a:ext cx="2736304" cy="1872208"/>
+        </p:xfrm>
+        <a:graphic>
+          <a:graphicData uri="http://schemas.openxmlformats.org/drawingml/2006/chart">
+            <c:chart xmlns:c="http://schemas.openxmlformats.org/drawingml/2006/chart" xmlns:r="http://schemas.openxmlformats.org/officeDocument/2006/relationships" r:id="rId2"/>
+          </a:graphicData>
+        </a:graphic>
+      </p:graphicFrame>
+      <p:graphicFrame>
+        <p:nvGraphicFramePr>
+          <p:cNvPr id="4" name="Chart 3"/>
+          <p:cNvGraphicFramePr/>
+          <p:nvPr>
+            <p:extLst>
+              <p:ext uri="{D42A27DB-BD31-4B8C-83A1-F6EECF244321}">
+                <p14:modId xmlns:p14="http://schemas.microsoft.com/office/powerpoint/2010/main" val="509942335"/>
+              </p:ext>
+            </p:extLst>
+          </p:nvPr>
+        </p:nvGraphicFramePr>
+        <p:xfrm>
+          <a:off x="3203848" y="692696"/>
+          <a:ext cx="2736304" cy="1872208"/>
+        </p:xfrm>
+        <a:graphic>
+          <a:graphicData uri="http://schemas.openxmlformats.org/drawingml/2006/chart">
+            <c:chart xmlns:c="http://schemas.openxmlformats.org/drawingml/2006/chart" xmlns:r="http://schemas.openxmlformats.org/officeDocument/2006/relationships" r:id="rId3"/>
+          </a:graphicData>
+        </a:graphic>
+      </p:graphicFrame>
+      <p:graphicFrame>
+        <p:nvGraphicFramePr>
+          <p:cNvPr id="5" name="Chart 4"/>
+          <p:cNvGraphicFramePr/>
+          <p:nvPr>
+            <p:extLst>
+              <p:ext uri="{D42A27DB-BD31-4B8C-83A1-F6EECF244321}">
+                <p14:modId xmlns:p14="http://schemas.microsoft.com/office/powerpoint/2010/main" val="484908692"/>
+              </p:ext>
+            </p:extLst>
+          </p:nvPr>
+        </p:nvGraphicFramePr>
+        <p:xfrm>
+          <a:off x="6156176" y="692696"/>
+          <a:ext cx="2736304" cy="1872208"/>
+        </p:xfrm>
+        <a:graphic>
+          <a:graphicData uri="http://schemas.openxmlformats.org/drawingml/2006/chart">
+            <c:chart xmlns:c="http://schemas.openxmlformats.org/drawingml/2006/chart" xmlns:r="http://schemas.openxmlformats.org/officeDocument/2006/relationships" r:id="rId4"/>
+          </a:graphicData>
+        </a:graphic>
+      </p:graphicFrame>
+      <p:graphicFrame>
+        <p:nvGraphicFramePr>
+          <p:cNvPr id="6" name="Chart 5"/>
+          <p:cNvGraphicFramePr/>
+          <p:nvPr>
+            <p:extLst>
+              <p:ext uri="{D42A27DB-BD31-4B8C-83A1-F6EECF244321}">
+                <p14:modId xmlns:p14="http://schemas.microsoft.com/office/powerpoint/2010/main" val="784898619"/>
+              </p:ext>
+            </p:extLst>
+          </p:nvPr>
+        </p:nvGraphicFramePr>
+        <p:xfrm>
+          <a:off x="323528" y="4005064"/>
+          <a:ext cx="2736304" cy="1872208"/>
+        </p:xfrm>
+        <a:graphic>
+          <a:graphicData uri="http://schemas.openxmlformats.org/drawingml/2006/chart">
+            <c:chart xmlns:c="http://schemas.openxmlformats.org/drawingml/2006/chart" xmlns:r="http://schemas.openxmlformats.org/officeDocument/2006/relationships" r:id="rId5"/>
+          </a:graphicData>
+        </a:graphic>
+      </p:graphicFrame>
+      <p:graphicFrame>
+        <p:nvGraphicFramePr>
+          <p:cNvPr id="7" name="Chart 6"/>
+          <p:cNvGraphicFramePr/>
+          <p:nvPr>
+            <p:extLst>
+              <p:ext uri="{D42A27DB-BD31-4B8C-83A1-F6EECF244321}">
+                <p14:modId xmlns:p14="http://schemas.microsoft.com/office/powerpoint/2010/main" val="3839461024"/>
+              </p:ext>
+            </p:extLst>
+          </p:nvPr>
+        </p:nvGraphicFramePr>
+        <p:xfrm>
+          <a:off x="3203848" y="4005064"/>
+          <a:ext cx="2736304" cy="1872208"/>
+        </p:xfrm>
+        <a:graphic>
+          <a:graphicData uri="http://schemas.openxmlformats.org/drawingml/2006/chart">
+            <c:chart xmlns:c="http://schemas.openxmlformats.org/drawingml/2006/chart" xmlns:r="http://schemas.openxmlformats.org/officeDocument/2006/relationships" r:id="rId6"/>
+          </a:graphicData>
+        </a:graphic>
+      </p:graphicFrame>
+    </p:spTree>
+    <p:extLst>
+      <p:ext uri="{BB962C8B-B14F-4D97-AF65-F5344CB8AC3E}">
+        <p14:creationId xmlns:p14="http://schemas.microsoft.com/office/powerpoint/2010/main" val="2213797998"/>
+      </p:ext>
+    </p:extLst>
+  </p:cSld>
+  <p:clrMapOvr>
+    <a:masterClrMapping/>
+  </p:clrMapOvr>
+</p:sld>
+</file>
+
+<file path=ppt/slides/slide6.xml><?xml version="1.0" encoding="utf-8"?>
+<p:sld xmlns:a="http://schemas.openxmlformats.org/drawingml/2006/main" xmlns:r="http://schemas.openxmlformats.org/officeDocument/2006/relationships" xmlns:p="http://schemas.openxmlformats.org/presentationml/2006/main">
+  <p:cSld>
+    <p:spTree>
+      <p:nvGrpSpPr>
+        <p:cNvPr id="1" name=""/>
+        <p:cNvGrpSpPr/>
+        <p:nvPr/>
+      </p:nvGrpSpPr>
+      <p:grpSpPr>
+        <a:xfrm>
+          <a:off x="0" y="0"/>
+          <a:ext cx="0" cy="0"/>
+          <a:chOff x="0" y="0"/>
+          <a:chExt cx="0" cy="0"/>
+        </a:xfrm>
+      </p:grpSpPr>
+      <p:graphicFrame>
+        <p:nvGraphicFramePr>
+          <p:cNvPr id="2" name="Chart 1"/>
+          <p:cNvGraphicFramePr/>
+          <p:nvPr>
+            <p:extLst>
+              <p:ext uri="{D42A27DB-BD31-4B8C-83A1-F6EECF244321}">
+                <p14:modId xmlns:p14="http://schemas.microsoft.com/office/powerpoint/2010/main" val="1831334781"/>
+              </p:ext>
+            </p:extLst>
+          </p:nvPr>
+        </p:nvGraphicFramePr>
+        <p:xfrm>
+          <a:off x="323528" y="332656"/>
+          <a:ext cx="4032448" cy="2880320"/>
+        </p:xfrm>
+        <a:graphic>
+          <a:graphicData uri="http://schemas.openxmlformats.org/drawingml/2006/chart">
+            <c:chart xmlns:c="http://schemas.openxmlformats.org/drawingml/2006/chart" xmlns:r="http://schemas.openxmlformats.org/officeDocument/2006/relationships" r:id="rId2"/>
+          </a:graphicData>
+        </a:graphic>
+      </p:graphicFrame>
+      <p:graphicFrame>
+        <p:nvGraphicFramePr>
+          <p:cNvPr id="3" name="Chart 2"/>
+          <p:cNvGraphicFramePr/>
+          <p:nvPr>
+            <p:extLst>
+              <p:ext uri="{D42A27DB-BD31-4B8C-83A1-F6EECF244321}">
+                <p14:modId xmlns:p14="http://schemas.microsoft.com/office/powerpoint/2010/main" val="643023677"/>
+              </p:ext>
+            </p:extLst>
+          </p:nvPr>
+        </p:nvGraphicFramePr>
+        <p:xfrm>
+          <a:off x="4788024" y="3645024"/>
+          <a:ext cx="3863752" cy="2767856"/>
+        </p:xfrm>
+        <a:graphic>
+          <a:graphicData uri="http://schemas.openxmlformats.org/drawingml/2006/chart">
+            <c:chart xmlns:c="http://schemas.openxmlformats.org/drawingml/2006/chart" xmlns:r="http://schemas.openxmlformats.org/officeDocument/2006/relationships" r:id="rId3"/>
+          </a:graphicData>
+        </a:graphic>
+      </p:graphicFrame>
+    </p:spTree>
+    <p:extLst>
+      <p:ext uri="{BB962C8B-B14F-4D97-AF65-F5344CB8AC3E}">
+        <p14:creationId xmlns:p14="http://schemas.microsoft.com/office/powerpoint/2010/main" val="4093086419"/>
+      </p:ext>
+    </p:extLst>
+  </p:cSld>
+  <p:clrMapOvr>
+    <a:masterClrMapping/>
+  </p:clrMapOvr>
+</p:sld>
+</file>
+
 <file path=ppt/theme/theme1.xml><?xml version="1.0" encoding="utf-8"?>
 <a:theme xmlns:a="http://schemas.openxmlformats.org/drawingml/2006/main" name="Office Theme">
   <a:themeElements>

</xml_diff>

<commit_message>
acpt: add Radar scenarios for Chart.chart_type
</commit_message>
<xml_diff>
--- a/features/steps/test_files/cht-chart-type.pptx
+++ b/features/steps/test_files/cht-chart-type.pptx
@@ -11,6 +11,7 @@
     <p:sldId id="259" r:id="rId5"/>
     <p:sldId id="260" r:id="rId6"/>
     <p:sldId id="261" r:id="rId7"/>
+    <p:sldId id="262" r:id="rId8"/>
   </p:sldIdLst>
   <p:sldSz cx="9144000" cy="6858000" type="screen4x3"/>
   <p:notesSz cx="6858000" cy="9144000"/>
@@ -266,11 +267,11 @@
           <c:showPercent val="0"/>
           <c:showBubbleSize val="0"/>
         </c:dLbls>
-        <c:axId val="-2083145160"/>
-        <c:axId val="-2083142120"/>
+        <c:axId val="-2113209256"/>
+        <c:axId val="-2110637832"/>
       </c:areaChart>
       <c:dateAx>
-        <c:axId val="-2083145160"/>
+        <c:axId val="-2113209256"/>
         <c:scaling>
           <c:orientation val="minMax"/>
         </c:scaling>
@@ -280,14 +281,14 @@
         <c:majorTickMark val="none"/>
         <c:minorTickMark val="none"/>
         <c:tickLblPos val="none"/>
-        <c:crossAx val="-2083142120"/>
+        <c:crossAx val="-2110637832"/>
         <c:crosses val="autoZero"/>
         <c:auto val="1"/>
         <c:lblOffset val="100"/>
         <c:baseTimeUnit val="days"/>
       </c:dateAx>
       <c:valAx>
-        <c:axId val="-2083142120"/>
+        <c:axId val="-2110637832"/>
         <c:scaling>
           <c:orientation val="minMax"/>
         </c:scaling>
@@ -298,7 +299,7 @@
         <c:majorTickMark val="out"/>
         <c:minorTickMark val="none"/>
         <c:tickLblPos val="nextTo"/>
-        <c:crossAx val="-2083145160"/>
+        <c:crossAx val="-2113209256"/>
         <c:crosses val="autoZero"/>
         <c:crossBetween val="midCat"/>
       </c:valAx>
@@ -524,11 +525,11 @@
           <c:showBubbleSize val="0"/>
         </c:dLbls>
         <c:gapWidth val="150"/>
-        <c:axId val="-2083451784"/>
-        <c:axId val="-2083448808"/>
+        <c:axId val="-2095484872"/>
+        <c:axId val="-2108009592"/>
       </c:barChart>
       <c:catAx>
-        <c:axId val="-2083451784"/>
+        <c:axId val="-2095484872"/>
         <c:scaling>
           <c:orientation val="minMax"/>
         </c:scaling>
@@ -537,7 +538,7 @@
         <c:majorTickMark val="none"/>
         <c:minorTickMark val="none"/>
         <c:tickLblPos val="none"/>
-        <c:crossAx val="-2083448808"/>
+        <c:crossAx val="-2108009592"/>
         <c:crosses val="autoZero"/>
         <c:auto val="1"/>
         <c:lblAlgn val="ctr"/>
@@ -545,7 +546,7 @@
         <c:noMultiLvlLbl val="0"/>
       </c:catAx>
       <c:valAx>
-        <c:axId val="-2083448808"/>
+        <c:axId val="-2108009592"/>
         <c:scaling>
           <c:orientation val="minMax"/>
         </c:scaling>
@@ -556,7 +557,7 @@
         <c:majorTickMark val="out"/>
         <c:minorTickMark val="none"/>
         <c:tickLblPos val="nextTo"/>
-        <c:crossAx val="-2083451784"/>
+        <c:crossAx val="-2095484872"/>
         <c:crosses val="autoZero"/>
         <c:crossBetween val="between"/>
       </c:valAx>
@@ -783,11 +784,11 @@
         </c:dLbls>
         <c:gapWidth val="150"/>
         <c:overlap val="100"/>
-        <c:axId val="-2083420888"/>
-        <c:axId val="-2083417912"/>
+        <c:axId val="-2108160488"/>
+        <c:axId val="-2096878824"/>
       </c:barChart>
       <c:catAx>
-        <c:axId val="-2083420888"/>
+        <c:axId val="-2108160488"/>
         <c:scaling>
           <c:orientation val="minMax"/>
         </c:scaling>
@@ -796,7 +797,7 @@
         <c:majorTickMark val="none"/>
         <c:minorTickMark val="none"/>
         <c:tickLblPos val="none"/>
-        <c:crossAx val="-2083417912"/>
+        <c:crossAx val="-2096878824"/>
         <c:crosses val="autoZero"/>
         <c:auto val="1"/>
         <c:lblAlgn val="ctr"/>
@@ -804,7 +805,7 @@
         <c:noMultiLvlLbl val="0"/>
       </c:catAx>
       <c:valAx>
-        <c:axId val="-2083417912"/>
+        <c:axId val="-2096878824"/>
         <c:scaling>
           <c:orientation val="minMax"/>
         </c:scaling>
@@ -815,7 +816,7 @@
         <c:majorTickMark val="out"/>
         <c:minorTickMark val="none"/>
         <c:tickLblPos val="nextTo"/>
-        <c:crossAx val="-2083420888"/>
+        <c:crossAx val="-2108160488"/>
         <c:crosses val="autoZero"/>
         <c:crossBetween val="between"/>
       </c:valAx>
@@ -1042,11 +1043,11 @@
         </c:dLbls>
         <c:gapWidth val="150"/>
         <c:overlap val="100"/>
-        <c:axId val="-2082512136"/>
-        <c:axId val="-2082509160"/>
+        <c:axId val="-2108116856"/>
+        <c:axId val="-2107712984"/>
       </c:barChart>
       <c:catAx>
-        <c:axId val="-2082512136"/>
+        <c:axId val="-2108116856"/>
         <c:scaling>
           <c:orientation val="minMax"/>
         </c:scaling>
@@ -1055,7 +1056,7 @@
         <c:majorTickMark val="none"/>
         <c:minorTickMark val="none"/>
         <c:tickLblPos val="none"/>
-        <c:crossAx val="-2082509160"/>
+        <c:crossAx val="-2107712984"/>
         <c:crosses val="autoZero"/>
         <c:auto val="1"/>
         <c:lblAlgn val="ctr"/>
@@ -1063,7 +1064,7 @@
         <c:noMultiLvlLbl val="0"/>
       </c:catAx>
       <c:valAx>
-        <c:axId val="-2082509160"/>
+        <c:axId val="-2107712984"/>
         <c:scaling>
           <c:orientation val="minMax"/>
         </c:scaling>
@@ -1074,7 +1075,7 @@
         <c:majorTickMark val="out"/>
         <c:minorTickMark val="none"/>
         <c:tickLblPos val="nextTo"/>
-        <c:crossAx val="-2082512136"/>
+        <c:crossAx val="-2108116856"/>
         <c:crosses val="autoZero"/>
         <c:crossBetween val="between"/>
       </c:valAx>
@@ -1309,11 +1310,11 @@
         </c:dLbls>
         <c:marker val="1"/>
         <c:smooth val="0"/>
-        <c:axId val="-2082651656"/>
-        <c:axId val="-2082648680"/>
+        <c:axId val="-2096957416"/>
+        <c:axId val="-2090571848"/>
       </c:lineChart>
       <c:catAx>
-        <c:axId val="-2082651656"/>
+        <c:axId val="-2096957416"/>
         <c:scaling>
           <c:orientation val="minMax"/>
         </c:scaling>
@@ -1322,7 +1323,7 @@
         <c:majorTickMark val="none"/>
         <c:minorTickMark val="none"/>
         <c:tickLblPos val="none"/>
-        <c:crossAx val="-2082648680"/>
+        <c:crossAx val="-2090571848"/>
         <c:crosses val="autoZero"/>
         <c:auto val="1"/>
         <c:lblAlgn val="ctr"/>
@@ -1330,7 +1331,7 @@
         <c:noMultiLvlLbl val="0"/>
       </c:catAx>
       <c:valAx>
-        <c:axId val="-2082648680"/>
+        <c:axId val="-2090571848"/>
         <c:scaling>
           <c:orientation val="minMax"/>
         </c:scaling>
@@ -1341,7 +1342,7 @@
         <c:majorTickMark val="out"/>
         <c:minorTickMark val="none"/>
         <c:tickLblPos val="nextTo"/>
-        <c:crossAx val="-2082651656"/>
+        <c:crossAx val="-2096957416"/>
         <c:crosses val="autoZero"/>
         <c:crossBetween val="between"/>
       </c:valAx>
@@ -1576,11 +1577,11 @@
         </c:dLbls>
         <c:marker val="1"/>
         <c:smooth val="0"/>
-        <c:axId val="-2082620376"/>
-        <c:axId val="-2082617400"/>
+        <c:axId val="-2095143816"/>
+        <c:axId val="-2108354408"/>
       </c:lineChart>
       <c:catAx>
-        <c:axId val="-2082620376"/>
+        <c:axId val="-2095143816"/>
         <c:scaling>
           <c:orientation val="minMax"/>
         </c:scaling>
@@ -1589,7 +1590,7 @@
         <c:majorTickMark val="none"/>
         <c:minorTickMark val="none"/>
         <c:tickLblPos val="none"/>
-        <c:crossAx val="-2082617400"/>
+        <c:crossAx val="-2108354408"/>
         <c:crosses val="autoZero"/>
         <c:auto val="1"/>
         <c:lblAlgn val="ctr"/>
@@ -1597,7 +1598,7 @@
         <c:noMultiLvlLbl val="0"/>
       </c:catAx>
       <c:valAx>
-        <c:axId val="-2082617400"/>
+        <c:axId val="-2108354408"/>
         <c:scaling>
           <c:orientation val="minMax"/>
         </c:scaling>
@@ -1608,7 +1609,7 @@
         <c:majorTickMark val="out"/>
         <c:minorTickMark val="none"/>
         <c:tickLblPos val="nextTo"/>
-        <c:crossAx val="-2082620376"/>
+        <c:crossAx val="-2095143816"/>
         <c:crosses val="autoZero"/>
         <c:crossBetween val="between"/>
       </c:valAx>
@@ -1843,11 +1844,11 @@
         </c:dLbls>
         <c:marker val="1"/>
         <c:smooth val="0"/>
-        <c:axId val="-2082589112"/>
-        <c:axId val="-2082586136"/>
+        <c:axId val="-2090559640"/>
+        <c:axId val="-2095552952"/>
       </c:lineChart>
       <c:catAx>
-        <c:axId val="-2082589112"/>
+        <c:axId val="-2090559640"/>
         <c:scaling>
           <c:orientation val="minMax"/>
         </c:scaling>
@@ -1856,7 +1857,7 @@
         <c:majorTickMark val="none"/>
         <c:minorTickMark val="none"/>
         <c:tickLblPos val="none"/>
-        <c:crossAx val="-2082586136"/>
+        <c:crossAx val="-2095552952"/>
         <c:crosses val="autoZero"/>
         <c:auto val="1"/>
         <c:lblAlgn val="ctr"/>
@@ -1864,7 +1865,7 @@
         <c:noMultiLvlLbl val="0"/>
       </c:catAx>
       <c:valAx>
-        <c:axId val="-2082586136"/>
+        <c:axId val="-2095552952"/>
         <c:scaling>
           <c:orientation val="minMax"/>
         </c:scaling>
@@ -1875,7 +1876,7 @@
         <c:majorTickMark val="out"/>
         <c:minorTickMark val="none"/>
         <c:tickLblPos val="nextTo"/>
-        <c:crossAx val="-2082589112"/>
+        <c:crossAx val="-2090559640"/>
         <c:crosses val="autoZero"/>
         <c:crossBetween val="between"/>
       </c:valAx>
@@ -2101,11 +2102,11 @@
         </c:dLbls>
         <c:marker val="1"/>
         <c:smooth val="0"/>
-        <c:axId val="-2082557400"/>
-        <c:axId val="-2082554424"/>
+        <c:axId val="-2090317400"/>
+        <c:axId val="-2090493608"/>
       </c:lineChart>
       <c:catAx>
-        <c:axId val="-2082557400"/>
+        <c:axId val="-2090317400"/>
         <c:scaling>
           <c:orientation val="minMax"/>
         </c:scaling>
@@ -2114,7 +2115,7 @@
         <c:majorTickMark val="none"/>
         <c:minorTickMark val="none"/>
         <c:tickLblPos val="none"/>
-        <c:crossAx val="-2082554424"/>
+        <c:crossAx val="-2090493608"/>
         <c:crosses val="autoZero"/>
         <c:auto val="1"/>
         <c:lblAlgn val="ctr"/>
@@ -2122,7 +2123,7 @@
         <c:noMultiLvlLbl val="0"/>
       </c:catAx>
       <c:valAx>
-        <c:axId val="-2082554424"/>
+        <c:axId val="-2090493608"/>
         <c:scaling>
           <c:orientation val="minMax"/>
         </c:scaling>
@@ -2133,7 +2134,7 @@
         <c:majorTickMark val="out"/>
         <c:minorTickMark val="none"/>
         <c:tickLblPos val="nextTo"/>
-        <c:crossAx val="-2082557400"/>
+        <c:crossAx val="-2090317400"/>
         <c:crosses val="autoZero"/>
         <c:crossBetween val="between"/>
       </c:valAx>
@@ -2359,11 +2360,11 @@
         </c:dLbls>
         <c:marker val="1"/>
         <c:smooth val="0"/>
-        <c:axId val="-2118721944"/>
-        <c:axId val="-2118718968"/>
+        <c:axId val="-2090589176"/>
+        <c:axId val="-2095536456"/>
       </c:lineChart>
       <c:catAx>
-        <c:axId val="-2118721944"/>
+        <c:axId val="-2090589176"/>
         <c:scaling>
           <c:orientation val="minMax"/>
         </c:scaling>
@@ -2372,7 +2373,7 @@
         <c:majorTickMark val="none"/>
         <c:minorTickMark val="none"/>
         <c:tickLblPos val="none"/>
-        <c:crossAx val="-2118718968"/>
+        <c:crossAx val="-2095536456"/>
         <c:crosses val="autoZero"/>
         <c:auto val="1"/>
         <c:lblAlgn val="ctr"/>
@@ -2380,7 +2381,7 @@
         <c:noMultiLvlLbl val="0"/>
       </c:catAx>
       <c:valAx>
-        <c:axId val="-2118718968"/>
+        <c:axId val="-2095536456"/>
         <c:scaling>
           <c:orientation val="minMax"/>
         </c:scaling>
@@ -2391,7 +2392,7 @@
         <c:majorTickMark val="out"/>
         <c:minorTickMark val="none"/>
         <c:tickLblPos val="nextTo"/>
-        <c:crossAx val="-2118721944"/>
+        <c:crossAx val="-2090589176"/>
         <c:crosses val="autoZero"/>
         <c:crossBetween val="between"/>
       </c:valAx>
@@ -2617,11 +2618,11 @@
         </c:dLbls>
         <c:marker val="1"/>
         <c:smooth val="0"/>
-        <c:axId val="-2118530232"/>
-        <c:axId val="-2118178488"/>
+        <c:axId val="-2108479272"/>
+        <c:axId val="-2108487336"/>
       </c:lineChart>
       <c:catAx>
-        <c:axId val="-2118530232"/>
+        <c:axId val="-2108479272"/>
         <c:scaling>
           <c:orientation val="minMax"/>
         </c:scaling>
@@ -2630,7 +2631,7 @@
         <c:majorTickMark val="none"/>
         <c:minorTickMark val="none"/>
         <c:tickLblPos val="none"/>
-        <c:crossAx val="-2118178488"/>
+        <c:crossAx val="-2108487336"/>
         <c:crosses val="autoZero"/>
         <c:auto val="1"/>
         <c:lblAlgn val="ctr"/>
@@ -2638,7 +2639,7 @@
         <c:noMultiLvlLbl val="0"/>
       </c:catAx>
       <c:valAx>
-        <c:axId val="-2118178488"/>
+        <c:axId val="-2108487336"/>
         <c:scaling>
           <c:orientation val="minMax"/>
         </c:scaling>
@@ -2649,7 +2650,7 @@
         <c:majorTickMark val="out"/>
         <c:minorTickMark val="none"/>
         <c:tickLblPos val="nextTo"/>
-        <c:crossAx val="-2118530232"/>
+        <c:crossAx val="-2108479272"/>
         <c:crosses val="autoZero"/>
         <c:crossBetween val="between"/>
       </c:valAx>
@@ -2939,11 +2940,11 @@
           <c:showPercent val="0"/>
           <c:showBubbleSize val="0"/>
         </c:dLbls>
-        <c:axId val="-2083118120"/>
-        <c:axId val="-2083115080"/>
+        <c:axId val="-2053515704"/>
+        <c:axId val="-2054271576"/>
       </c:areaChart>
       <c:dateAx>
-        <c:axId val="-2083118120"/>
+        <c:axId val="-2053515704"/>
         <c:scaling>
           <c:orientation val="minMax"/>
         </c:scaling>
@@ -2953,14 +2954,14 @@
         <c:majorTickMark val="none"/>
         <c:minorTickMark val="none"/>
         <c:tickLblPos val="none"/>
-        <c:crossAx val="-2083115080"/>
+        <c:crossAx val="-2054271576"/>
         <c:crosses val="autoZero"/>
         <c:auto val="1"/>
         <c:lblOffset val="100"/>
         <c:baseTimeUnit val="days"/>
       </c:dateAx>
       <c:valAx>
-        <c:axId val="-2083115080"/>
+        <c:axId val="-2054271576"/>
         <c:scaling>
           <c:orientation val="minMax"/>
         </c:scaling>
@@ -2971,7 +2972,7 @@
         <c:majorTickMark val="out"/>
         <c:minorTickMark val="none"/>
         <c:tickLblPos val="nextTo"/>
-        <c:crossAx val="-2083118120"/>
+        <c:crossAx val="-2053515704"/>
         <c:crosses val="autoZero"/>
         <c:crossBetween val="midCat"/>
       </c:valAx>
@@ -3193,11 +3194,11 @@
           <c:showPercent val="0"/>
           <c:showBubbleSize val="0"/>
         </c:dLbls>
-        <c:axId val="-2118780904"/>
-        <c:axId val="-2118898856"/>
+        <c:axId val="-2096890200"/>
+        <c:axId val="-2090456104"/>
       </c:scatterChart>
       <c:valAx>
-        <c:axId val="-2118780904"/>
+        <c:axId val="-2096890200"/>
         <c:scaling>
           <c:orientation val="minMax"/>
         </c:scaling>
@@ -3207,12 +3208,12 @@
         <c:majorTickMark val="out"/>
         <c:minorTickMark val="none"/>
         <c:tickLblPos val="nextTo"/>
-        <c:crossAx val="-2118898856"/>
+        <c:crossAx val="-2090456104"/>
         <c:crosses val="autoZero"/>
         <c:crossBetween val="midCat"/>
       </c:valAx>
       <c:valAx>
-        <c:axId val="-2118898856"/>
+        <c:axId val="-2090456104"/>
         <c:scaling>
           <c:orientation val="minMax"/>
         </c:scaling>
@@ -3223,7 +3224,7 @@
         <c:majorTickMark val="out"/>
         <c:minorTickMark val="none"/>
         <c:tickLblPos val="nextTo"/>
-        <c:crossAx val="-2118780904"/>
+        <c:crossAx val="-2096890200"/>
         <c:crosses val="autoZero"/>
         <c:crossBetween val="midCat"/>
       </c:valAx>
@@ -3328,11 +3329,11 @@
           <c:showPercent val="0"/>
           <c:showBubbleSize val="0"/>
         </c:dLbls>
-        <c:axId val="-2088184280"/>
-        <c:axId val="-2087797768"/>
+        <c:axId val="-2108085608"/>
+        <c:axId val="2053161768"/>
       </c:scatterChart>
       <c:valAx>
-        <c:axId val="-2088184280"/>
+        <c:axId val="-2108085608"/>
         <c:scaling>
           <c:orientation val="minMax"/>
         </c:scaling>
@@ -3342,12 +3343,12 @@
         <c:majorTickMark val="out"/>
         <c:minorTickMark val="none"/>
         <c:tickLblPos val="nextTo"/>
-        <c:crossAx val="-2087797768"/>
+        <c:crossAx val="2053161768"/>
         <c:crosses val="autoZero"/>
         <c:crossBetween val="midCat"/>
       </c:valAx>
       <c:valAx>
-        <c:axId val="-2087797768"/>
+        <c:axId val="2053161768"/>
         <c:scaling>
           <c:orientation val="minMax"/>
         </c:scaling>
@@ -3358,7 +3359,7 @@
         <c:majorTickMark val="out"/>
         <c:minorTickMark val="none"/>
         <c:tickLblPos val="nextTo"/>
-        <c:crossAx val="-2088184280"/>
+        <c:crossAx val="-2108085608"/>
         <c:crosses val="autoZero"/>
         <c:crossBetween val="midCat"/>
       </c:valAx>
@@ -3466,11 +3467,11 @@
           <c:showPercent val="0"/>
           <c:showBubbleSize val="0"/>
         </c:dLbls>
-        <c:axId val="-2081686136"/>
-        <c:axId val="-2081492104"/>
+        <c:axId val="-2108543800"/>
+        <c:axId val="-2049180872"/>
       </c:scatterChart>
       <c:valAx>
-        <c:axId val="-2081686136"/>
+        <c:axId val="-2108543800"/>
         <c:scaling>
           <c:orientation val="minMax"/>
         </c:scaling>
@@ -3480,12 +3481,12 @@
         <c:majorTickMark val="out"/>
         <c:minorTickMark val="none"/>
         <c:tickLblPos val="nextTo"/>
-        <c:crossAx val="-2081492104"/>
+        <c:crossAx val="-2049180872"/>
         <c:crosses val="autoZero"/>
         <c:crossBetween val="midCat"/>
       </c:valAx>
       <c:valAx>
-        <c:axId val="-2081492104"/>
+        <c:axId val="-2049180872"/>
         <c:scaling>
           <c:orientation val="minMax"/>
         </c:scaling>
@@ -3496,7 +3497,7 @@
         <c:majorTickMark val="out"/>
         <c:minorTickMark val="none"/>
         <c:tickLblPos val="nextTo"/>
-        <c:crossAx val="-2081686136"/>
+        <c:crossAx val="-2108543800"/>
         <c:crosses val="autoZero"/>
         <c:crossBetween val="midCat"/>
       </c:valAx>
@@ -3601,11 +3602,11 @@
           <c:showPercent val="0"/>
           <c:showBubbleSize val="0"/>
         </c:dLbls>
-        <c:axId val="-2120219480"/>
-        <c:axId val="-2088014888"/>
+        <c:axId val="-2049159880"/>
+        <c:axId val="-2049156856"/>
       </c:scatterChart>
       <c:valAx>
-        <c:axId val="-2120219480"/>
+        <c:axId val="-2049159880"/>
         <c:scaling>
           <c:orientation val="minMax"/>
         </c:scaling>
@@ -3615,12 +3616,12 @@
         <c:majorTickMark val="out"/>
         <c:minorTickMark val="none"/>
         <c:tickLblPos val="nextTo"/>
-        <c:crossAx val="-2088014888"/>
+        <c:crossAx val="-2049156856"/>
         <c:crosses val="autoZero"/>
         <c:crossBetween val="midCat"/>
       </c:valAx>
       <c:valAx>
-        <c:axId val="-2088014888"/>
+        <c:axId val="-2049156856"/>
         <c:scaling>
           <c:orientation val="minMax"/>
         </c:scaling>
@@ -3631,7 +3632,7 @@
         <c:majorTickMark val="out"/>
         <c:minorTickMark val="none"/>
         <c:tickLblPos val="nextTo"/>
-        <c:crossAx val="-2120219480"/>
+        <c:crossAx val="-2049159880"/>
         <c:crosses val="autoZero"/>
         <c:crossBetween val="midCat"/>
       </c:valAx>
@@ -3739,11 +3740,11 @@
           <c:showPercent val="0"/>
           <c:showBubbleSize val="0"/>
         </c:dLbls>
-        <c:axId val="-2088323224"/>
-        <c:axId val="-2119955512"/>
+        <c:axId val="-2049134296"/>
+        <c:axId val="-2049131272"/>
       </c:scatterChart>
       <c:valAx>
-        <c:axId val="-2088323224"/>
+        <c:axId val="-2049134296"/>
         <c:scaling>
           <c:orientation val="minMax"/>
         </c:scaling>
@@ -3753,12 +3754,12 @@
         <c:majorTickMark val="out"/>
         <c:minorTickMark val="none"/>
         <c:tickLblPos val="nextTo"/>
-        <c:crossAx val="-2119955512"/>
+        <c:crossAx val="-2049131272"/>
         <c:crosses val="autoZero"/>
         <c:crossBetween val="midCat"/>
       </c:valAx>
       <c:valAx>
-        <c:axId val="-2119955512"/>
+        <c:axId val="-2049131272"/>
         <c:scaling>
           <c:orientation val="minMax"/>
         </c:scaling>
@@ -3769,7 +3770,7 @@
         <c:majorTickMark val="out"/>
         <c:minorTickMark val="none"/>
         <c:tickLblPos val="nextTo"/>
-        <c:crossAx val="-2088323224"/>
+        <c:crossAx val="-2049134296"/>
         <c:crosses val="autoZero"/>
         <c:crossBetween val="midCat"/>
       </c:valAx>
@@ -3894,11 +3895,11 @@
         </c:dLbls>
         <c:bubbleScale val="100"/>
         <c:showNegBubbles val="0"/>
-        <c:axId val="-2117441288"/>
-        <c:axId val="-2117422024"/>
+        <c:axId val="-2049100728"/>
+        <c:axId val="-2049097704"/>
       </c:bubbleChart>
       <c:valAx>
-        <c:axId val="-2117441288"/>
+        <c:axId val="-2049100728"/>
         <c:scaling>
           <c:orientation val="minMax"/>
         </c:scaling>
@@ -3908,12 +3909,12 @@
         <c:majorTickMark val="out"/>
         <c:minorTickMark val="none"/>
         <c:tickLblPos val="nextTo"/>
-        <c:crossAx val="-2117422024"/>
+        <c:crossAx val="-2049097704"/>
         <c:crosses val="autoZero"/>
         <c:crossBetween val="midCat"/>
       </c:valAx>
       <c:valAx>
-        <c:axId val="-2117422024"/>
+        <c:axId val="-2049097704"/>
         <c:scaling>
           <c:orientation val="minMax"/>
         </c:scaling>
@@ -3924,7 +3925,7 @@
         <c:majorTickMark val="out"/>
         <c:minorTickMark val="none"/>
         <c:tickLblPos val="nextTo"/>
-        <c:crossAx val="-2117441288"/>
+        <c:crossAx val="-2049100728"/>
         <c:crosses val="autoZero"/>
         <c:crossBetween val="midCat"/>
       </c:valAx>
@@ -4049,11 +4050,11 @@
         </c:dLbls>
         <c:bubbleScale val="100"/>
         <c:showNegBubbles val="0"/>
-        <c:axId val="-2046379432"/>
-        <c:axId val="-2119074152"/>
+        <c:axId val="-2049074424"/>
+        <c:axId val="-2049071400"/>
       </c:bubbleChart>
       <c:valAx>
-        <c:axId val="-2046379432"/>
+        <c:axId val="-2049074424"/>
         <c:scaling>
           <c:orientation val="minMax"/>
         </c:scaling>
@@ -4063,12 +4064,12 @@
         <c:majorTickMark val="out"/>
         <c:minorTickMark val="none"/>
         <c:tickLblPos val="nextTo"/>
-        <c:crossAx val="-2119074152"/>
+        <c:crossAx val="-2049071400"/>
         <c:crosses val="autoZero"/>
         <c:crossBetween val="midCat"/>
       </c:valAx>
       <c:valAx>
-        <c:axId val="-2119074152"/>
+        <c:axId val="-2049071400"/>
         <c:scaling>
           <c:orientation val="minMax"/>
         </c:scaling>
@@ -4079,9 +4080,441 @@
         <c:majorTickMark val="out"/>
         <c:minorTickMark val="none"/>
         <c:tickLblPos val="nextTo"/>
-        <c:crossAx val="-2046379432"/>
+        <c:crossAx val="-2049074424"/>
         <c:crosses val="autoZero"/>
         <c:crossBetween val="midCat"/>
+      </c:valAx>
+    </c:plotArea>
+    <c:plotVisOnly val="1"/>
+    <c:dispBlanksAs val="gap"/>
+    <c:showDLblsOverMax val="0"/>
+  </c:chart>
+  <c:txPr>
+    <a:bodyPr/>
+    <a:lstStyle/>
+    <a:p>
+      <a:pPr>
+        <a:defRPr sz="1800"/>
+      </a:pPr>
+      <a:endParaRPr lang="en-US"/>
+    </a:p>
+  </c:txPr>
+  <c:externalData r:id="rId1">
+    <c:autoUpdate val="0"/>
+  </c:externalData>
+</c:chartSpace>
+</file>
+
+<file path=ppt/charts/chart28.xml><?xml version="1.0" encoding="utf-8"?>
+<c:chartSpace xmlns:c="http://schemas.openxmlformats.org/drawingml/2006/chart" xmlns:a="http://schemas.openxmlformats.org/drawingml/2006/main" xmlns:r="http://schemas.openxmlformats.org/officeDocument/2006/relationships">
+  <c:date1904 val="0"/>
+  <c:lang val="en-US"/>
+  <c:roundedCorners val="0"/>
+  <mc:AlternateContent xmlns:mc="http://schemas.openxmlformats.org/markup-compatibility/2006">
+    <mc:Choice xmlns:c14="http://schemas.microsoft.com/office/drawing/2007/8/2/chart" Requires="c14">
+      <c14:style val="118"/>
+    </mc:Choice>
+    <mc:Fallback>
+      <c:style val="18"/>
+    </mc:Fallback>
+  </mc:AlternateContent>
+  <c:chart>
+    <c:autoTitleDeleted val="0"/>
+    <c:plotArea>
+      <c:layout/>
+      <c:radarChart>
+        <c:radarStyle val="marker"/>
+        <c:varyColors val="0"/>
+        <c:ser>
+          <c:idx val="0"/>
+          <c:order val="0"/>
+          <c:tx>
+            <c:strRef>
+              <c:f>Sheet1!$B$1</c:f>
+              <c:strCache>
+                <c:ptCount val="1"/>
+                <c:pt idx="0">
+                  <c:v>Series 1</c:v>
+                </c:pt>
+              </c:strCache>
+            </c:strRef>
+          </c:tx>
+          <c:marker>
+            <c:symbol val="none"/>
+          </c:marker>
+          <c:cat>
+            <c:numRef>
+              <c:f>Sheet1!$A$2:$A$6</c:f>
+              <c:numCache>
+                <c:formatCode>m/d/yy</c:formatCode>
+                <c:ptCount val="5"/>
+                <c:pt idx="0">
+                  <c:v>37261.0</c:v>
+                </c:pt>
+                <c:pt idx="1">
+                  <c:v>37262.0</c:v>
+                </c:pt>
+                <c:pt idx="2">
+                  <c:v>37263.0</c:v>
+                </c:pt>
+                <c:pt idx="3">
+                  <c:v>37264.0</c:v>
+                </c:pt>
+                <c:pt idx="4">
+                  <c:v>37265.0</c:v>
+                </c:pt>
+              </c:numCache>
+            </c:numRef>
+          </c:cat>
+          <c:val>
+            <c:numRef>
+              <c:f>Sheet1!$B$2:$B$6</c:f>
+              <c:numCache>
+                <c:formatCode>General</c:formatCode>
+                <c:ptCount val="5"/>
+                <c:pt idx="0">
+                  <c:v>32.0</c:v>
+                </c:pt>
+                <c:pt idx="1">
+                  <c:v>32.0</c:v>
+                </c:pt>
+                <c:pt idx="2">
+                  <c:v>28.0</c:v>
+                </c:pt>
+                <c:pt idx="3">
+                  <c:v>12.0</c:v>
+                </c:pt>
+                <c:pt idx="4">
+                  <c:v>15.0</c:v>
+                </c:pt>
+              </c:numCache>
+            </c:numRef>
+          </c:val>
+        </c:ser>
+        <c:ser>
+          <c:idx val="1"/>
+          <c:order val="1"/>
+          <c:tx>
+            <c:strRef>
+              <c:f>Sheet1!$C$1</c:f>
+              <c:strCache>
+                <c:ptCount val="1"/>
+                <c:pt idx="0">
+                  <c:v>Series 2</c:v>
+                </c:pt>
+              </c:strCache>
+            </c:strRef>
+          </c:tx>
+          <c:marker>
+            <c:symbol val="none"/>
+          </c:marker>
+          <c:cat>
+            <c:numRef>
+              <c:f>Sheet1!$A$2:$A$6</c:f>
+              <c:numCache>
+                <c:formatCode>m/d/yy</c:formatCode>
+                <c:ptCount val="5"/>
+                <c:pt idx="0">
+                  <c:v>37261.0</c:v>
+                </c:pt>
+                <c:pt idx="1">
+                  <c:v>37262.0</c:v>
+                </c:pt>
+                <c:pt idx="2">
+                  <c:v>37263.0</c:v>
+                </c:pt>
+                <c:pt idx="3">
+                  <c:v>37264.0</c:v>
+                </c:pt>
+                <c:pt idx="4">
+                  <c:v>37265.0</c:v>
+                </c:pt>
+              </c:numCache>
+            </c:numRef>
+          </c:cat>
+          <c:val>
+            <c:numRef>
+              <c:f>Sheet1!$C$2:$C$6</c:f>
+              <c:numCache>
+                <c:formatCode>General</c:formatCode>
+                <c:ptCount val="5"/>
+                <c:pt idx="0">
+                  <c:v>12.0</c:v>
+                </c:pt>
+                <c:pt idx="1">
+                  <c:v>12.0</c:v>
+                </c:pt>
+                <c:pt idx="2">
+                  <c:v>12.0</c:v>
+                </c:pt>
+                <c:pt idx="3">
+                  <c:v>21.0</c:v>
+                </c:pt>
+                <c:pt idx="4">
+                  <c:v>28.0</c:v>
+                </c:pt>
+              </c:numCache>
+            </c:numRef>
+          </c:val>
+        </c:ser>
+        <c:dLbls>
+          <c:showLegendKey val="0"/>
+          <c:showVal val="0"/>
+          <c:showCatName val="0"/>
+          <c:showSerName val="0"/>
+          <c:showPercent val="0"/>
+          <c:showBubbleSize val="0"/>
+        </c:dLbls>
+        <c:axId val="-2050880136"/>
+        <c:axId val="-2037790936"/>
+      </c:radarChart>
+      <c:catAx>
+        <c:axId val="-2050880136"/>
+        <c:scaling>
+          <c:orientation val="minMax"/>
+        </c:scaling>
+        <c:delete val="0"/>
+        <c:axPos val="b"/>
+        <c:majorGridlines/>
+        <c:numFmt formatCode="m/d/yy" sourceLinked="1"/>
+        <c:majorTickMark val="out"/>
+        <c:minorTickMark val="none"/>
+        <c:tickLblPos val="nextTo"/>
+        <c:crossAx val="-2037790936"/>
+        <c:crosses val="autoZero"/>
+        <c:auto val="1"/>
+        <c:lblAlgn val="ctr"/>
+        <c:lblOffset val="100"/>
+        <c:noMultiLvlLbl val="0"/>
+      </c:catAx>
+      <c:valAx>
+        <c:axId val="-2037790936"/>
+        <c:scaling>
+          <c:orientation val="minMax"/>
+        </c:scaling>
+        <c:delete val="0"/>
+        <c:axPos val="l"/>
+        <c:majorGridlines/>
+        <c:numFmt formatCode="General" sourceLinked="1"/>
+        <c:majorTickMark val="cross"/>
+        <c:minorTickMark val="none"/>
+        <c:tickLblPos val="nextTo"/>
+        <c:crossAx val="-2050880136"/>
+        <c:crosses val="autoZero"/>
+        <c:crossBetween val="between"/>
+      </c:valAx>
+    </c:plotArea>
+    <c:plotVisOnly val="1"/>
+    <c:dispBlanksAs val="gap"/>
+    <c:showDLblsOverMax val="0"/>
+  </c:chart>
+  <c:txPr>
+    <a:bodyPr/>
+    <a:lstStyle/>
+    <a:p>
+      <a:pPr>
+        <a:defRPr sz="1800"/>
+      </a:pPr>
+      <a:endParaRPr lang="en-US"/>
+    </a:p>
+  </c:txPr>
+  <c:externalData r:id="rId1">
+    <c:autoUpdate val="0"/>
+  </c:externalData>
+</c:chartSpace>
+</file>
+
+<file path=ppt/charts/chart29.xml><?xml version="1.0" encoding="utf-8"?>
+<c:chartSpace xmlns:c="http://schemas.openxmlformats.org/drawingml/2006/chart" xmlns:a="http://schemas.openxmlformats.org/drawingml/2006/main" xmlns:r="http://schemas.openxmlformats.org/officeDocument/2006/relationships">
+  <c:date1904 val="0"/>
+  <c:lang val="en-US"/>
+  <c:roundedCorners val="0"/>
+  <mc:AlternateContent xmlns:mc="http://schemas.openxmlformats.org/markup-compatibility/2006">
+    <mc:Choice xmlns:c14="http://schemas.microsoft.com/office/drawing/2007/8/2/chart" Requires="c14">
+      <c14:style val="118"/>
+    </mc:Choice>
+    <mc:Fallback>
+      <c:style val="18"/>
+    </mc:Fallback>
+  </mc:AlternateContent>
+  <c:chart>
+    <c:autoTitleDeleted val="0"/>
+    <c:plotArea>
+      <c:layout/>
+      <c:radarChart>
+        <c:radarStyle val="marker"/>
+        <c:varyColors val="0"/>
+        <c:ser>
+          <c:idx val="0"/>
+          <c:order val="0"/>
+          <c:tx>
+            <c:strRef>
+              <c:f>Sheet1!$B$1</c:f>
+              <c:strCache>
+                <c:ptCount val="1"/>
+                <c:pt idx="0">
+                  <c:v>Series 1</c:v>
+                </c:pt>
+              </c:strCache>
+            </c:strRef>
+          </c:tx>
+          <c:cat>
+            <c:numRef>
+              <c:f>Sheet1!$A$2:$A$6</c:f>
+              <c:numCache>
+                <c:formatCode>m/d/yy</c:formatCode>
+                <c:ptCount val="5"/>
+                <c:pt idx="0">
+                  <c:v>37261.0</c:v>
+                </c:pt>
+                <c:pt idx="1">
+                  <c:v>37262.0</c:v>
+                </c:pt>
+                <c:pt idx="2">
+                  <c:v>37263.0</c:v>
+                </c:pt>
+                <c:pt idx="3">
+                  <c:v>37264.0</c:v>
+                </c:pt>
+                <c:pt idx="4">
+                  <c:v>37265.0</c:v>
+                </c:pt>
+              </c:numCache>
+            </c:numRef>
+          </c:cat>
+          <c:val>
+            <c:numRef>
+              <c:f>Sheet1!$B$2:$B$6</c:f>
+              <c:numCache>
+                <c:formatCode>General</c:formatCode>
+                <c:ptCount val="5"/>
+                <c:pt idx="0">
+                  <c:v>32.0</c:v>
+                </c:pt>
+                <c:pt idx="1">
+                  <c:v>32.0</c:v>
+                </c:pt>
+                <c:pt idx="2">
+                  <c:v>28.0</c:v>
+                </c:pt>
+                <c:pt idx="3">
+                  <c:v>12.0</c:v>
+                </c:pt>
+                <c:pt idx="4">
+                  <c:v>15.0</c:v>
+                </c:pt>
+              </c:numCache>
+            </c:numRef>
+          </c:val>
+        </c:ser>
+        <c:ser>
+          <c:idx val="1"/>
+          <c:order val="1"/>
+          <c:tx>
+            <c:strRef>
+              <c:f>Sheet1!$C$1</c:f>
+              <c:strCache>
+                <c:ptCount val="1"/>
+                <c:pt idx="0">
+                  <c:v>Series 2</c:v>
+                </c:pt>
+              </c:strCache>
+            </c:strRef>
+          </c:tx>
+          <c:cat>
+            <c:numRef>
+              <c:f>Sheet1!$A$2:$A$6</c:f>
+              <c:numCache>
+                <c:formatCode>m/d/yy</c:formatCode>
+                <c:ptCount val="5"/>
+                <c:pt idx="0">
+                  <c:v>37261.0</c:v>
+                </c:pt>
+                <c:pt idx="1">
+                  <c:v>37262.0</c:v>
+                </c:pt>
+                <c:pt idx="2">
+                  <c:v>37263.0</c:v>
+                </c:pt>
+                <c:pt idx="3">
+                  <c:v>37264.0</c:v>
+                </c:pt>
+                <c:pt idx="4">
+                  <c:v>37265.0</c:v>
+                </c:pt>
+              </c:numCache>
+            </c:numRef>
+          </c:cat>
+          <c:val>
+            <c:numRef>
+              <c:f>Sheet1!$C$2:$C$6</c:f>
+              <c:numCache>
+                <c:formatCode>General</c:formatCode>
+                <c:ptCount val="5"/>
+                <c:pt idx="0">
+                  <c:v>12.0</c:v>
+                </c:pt>
+                <c:pt idx="1">
+                  <c:v>12.0</c:v>
+                </c:pt>
+                <c:pt idx="2">
+                  <c:v>12.0</c:v>
+                </c:pt>
+                <c:pt idx="3">
+                  <c:v>21.0</c:v>
+                </c:pt>
+                <c:pt idx="4">
+                  <c:v>28.0</c:v>
+                </c:pt>
+              </c:numCache>
+            </c:numRef>
+          </c:val>
+        </c:ser>
+        <c:dLbls>
+          <c:showLegendKey val="0"/>
+          <c:showVal val="0"/>
+          <c:showCatName val="0"/>
+          <c:showSerName val="0"/>
+          <c:showPercent val="0"/>
+          <c:showBubbleSize val="0"/>
+        </c:dLbls>
+        <c:axId val="-2054355432"/>
+        <c:axId val="-2053831848"/>
+      </c:radarChart>
+      <c:catAx>
+        <c:axId val="-2054355432"/>
+        <c:scaling>
+          <c:orientation val="minMax"/>
+        </c:scaling>
+        <c:delete val="0"/>
+        <c:axPos val="b"/>
+        <c:majorGridlines/>
+        <c:numFmt formatCode="m/d/yy" sourceLinked="1"/>
+        <c:majorTickMark val="out"/>
+        <c:minorTickMark val="none"/>
+        <c:tickLblPos val="nextTo"/>
+        <c:crossAx val="-2053831848"/>
+        <c:crosses val="autoZero"/>
+        <c:auto val="1"/>
+        <c:lblAlgn val="ctr"/>
+        <c:lblOffset val="100"/>
+        <c:noMultiLvlLbl val="0"/>
+      </c:catAx>
+      <c:valAx>
+        <c:axId val="-2053831848"/>
+        <c:scaling>
+          <c:orientation val="minMax"/>
+        </c:scaling>
+        <c:delete val="0"/>
+        <c:axPos val="l"/>
+        <c:majorGridlines/>
+        <c:numFmt formatCode="General" sourceLinked="1"/>
+        <c:majorTickMark val="cross"/>
+        <c:minorTickMark val="none"/>
+        <c:tickLblPos val="nextTo"/>
+        <c:crossAx val="-2054355432"/>
+        <c:crosses val="autoZero"/>
+        <c:crossBetween val="between"/>
       </c:valAx>
     </c:plotArea>
     <c:plotVisOnly val="1"/>
@@ -4258,11 +4691,11 @@
           <c:showPercent val="0"/>
           <c:showBubbleSize val="0"/>
         </c:dLbls>
-        <c:axId val="-2083089736"/>
-        <c:axId val="-2083086696"/>
+        <c:axId val="-2105955592"/>
+        <c:axId val="-2053417688"/>
       </c:areaChart>
       <c:dateAx>
-        <c:axId val="-2083089736"/>
+        <c:axId val="-2105955592"/>
         <c:scaling>
           <c:orientation val="minMax"/>
         </c:scaling>
@@ -4272,14 +4705,14 @@
         <c:majorTickMark val="none"/>
         <c:minorTickMark val="none"/>
         <c:tickLblPos val="none"/>
-        <c:crossAx val="-2083086696"/>
+        <c:crossAx val="-2053417688"/>
         <c:crosses val="autoZero"/>
         <c:auto val="1"/>
         <c:lblOffset val="100"/>
         <c:baseTimeUnit val="days"/>
       </c:dateAx>
       <c:valAx>
-        <c:axId val="-2083086696"/>
+        <c:axId val="-2053417688"/>
         <c:scaling>
           <c:orientation val="minMax"/>
         </c:scaling>
@@ -4290,13 +4723,226 @@
         <c:majorTickMark val="out"/>
         <c:minorTickMark val="none"/>
         <c:tickLblPos val="nextTo"/>
-        <c:crossAx val="-2083089736"/>
+        <c:crossAx val="-2105955592"/>
         <c:crosses val="autoZero"/>
         <c:crossBetween val="midCat"/>
       </c:valAx>
     </c:plotArea>
     <c:plotVisOnly val="1"/>
     <c:dispBlanksAs val="zero"/>
+    <c:showDLblsOverMax val="0"/>
+  </c:chart>
+  <c:txPr>
+    <a:bodyPr/>
+    <a:lstStyle/>
+    <a:p>
+      <a:pPr>
+        <a:defRPr sz="1800"/>
+      </a:pPr>
+      <a:endParaRPr lang="en-US"/>
+    </a:p>
+  </c:txPr>
+  <c:externalData r:id="rId1">
+    <c:autoUpdate val="0"/>
+  </c:externalData>
+</c:chartSpace>
+</file>
+
+<file path=ppt/charts/chart30.xml><?xml version="1.0" encoding="utf-8"?>
+<c:chartSpace xmlns:c="http://schemas.openxmlformats.org/drawingml/2006/chart" xmlns:a="http://schemas.openxmlformats.org/drawingml/2006/main" xmlns:r="http://schemas.openxmlformats.org/officeDocument/2006/relationships">
+  <c:date1904 val="0"/>
+  <c:lang val="en-US"/>
+  <c:roundedCorners val="0"/>
+  <mc:AlternateContent xmlns:mc="http://schemas.openxmlformats.org/markup-compatibility/2006">
+    <mc:Choice xmlns:c14="http://schemas.microsoft.com/office/drawing/2007/8/2/chart" Requires="c14">
+      <c14:style val="118"/>
+    </mc:Choice>
+    <mc:Fallback>
+      <c:style val="18"/>
+    </mc:Fallback>
+  </mc:AlternateContent>
+  <c:chart>
+    <c:autoTitleDeleted val="0"/>
+    <c:plotArea>
+      <c:layout/>
+      <c:radarChart>
+        <c:radarStyle val="filled"/>
+        <c:varyColors val="0"/>
+        <c:ser>
+          <c:idx val="0"/>
+          <c:order val="0"/>
+          <c:tx>
+            <c:strRef>
+              <c:f>Sheet1!$B$1</c:f>
+              <c:strCache>
+                <c:ptCount val="1"/>
+                <c:pt idx="0">
+                  <c:v>Series 1</c:v>
+                </c:pt>
+              </c:strCache>
+            </c:strRef>
+          </c:tx>
+          <c:cat>
+            <c:numRef>
+              <c:f>Sheet1!$A$2:$A$6</c:f>
+              <c:numCache>
+                <c:formatCode>m/d/yy</c:formatCode>
+                <c:ptCount val="5"/>
+                <c:pt idx="0">
+                  <c:v>37261.0</c:v>
+                </c:pt>
+                <c:pt idx="1">
+                  <c:v>37262.0</c:v>
+                </c:pt>
+                <c:pt idx="2">
+                  <c:v>37263.0</c:v>
+                </c:pt>
+                <c:pt idx="3">
+                  <c:v>37264.0</c:v>
+                </c:pt>
+                <c:pt idx="4">
+                  <c:v>37265.0</c:v>
+                </c:pt>
+              </c:numCache>
+            </c:numRef>
+          </c:cat>
+          <c:val>
+            <c:numRef>
+              <c:f>Sheet1!$B$2:$B$6</c:f>
+              <c:numCache>
+                <c:formatCode>General</c:formatCode>
+                <c:ptCount val="5"/>
+                <c:pt idx="0">
+                  <c:v>32.0</c:v>
+                </c:pt>
+                <c:pt idx="1">
+                  <c:v>32.0</c:v>
+                </c:pt>
+                <c:pt idx="2">
+                  <c:v>28.0</c:v>
+                </c:pt>
+                <c:pt idx="3">
+                  <c:v>12.0</c:v>
+                </c:pt>
+                <c:pt idx="4">
+                  <c:v>15.0</c:v>
+                </c:pt>
+              </c:numCache>
+            </c:numRef>
+          </c:val>
+        </c:ser>
+        <c:ser>
+          <c:idx val="1"/>
+          <c:order val="1"/>
+          <c:tx>
+            <c:strRef>
+              <c:f>Sheet1!$C$1</c:f>
+              <c:strCache>
+                <c:ptCount val="1"/>
+                <c:pt idx="0">
+                  <c:v>Series 2</c:v>
+                </c:pt>
+              </c:strCache>
+            </c:strRef>
+          </c:tx>
+          <c:cat>
+            <c:numRef>
+              <c:f>Sheet1!$A$2:$A$6</c:f>
+              <c:numCache>
+                <c:formatCode>m/d/yy</c:formatCode>
+                <c:ptCount val="5"/>
+                <c:pt idx="0">
+                  <c:v>37261.0</c:v>
+                </c:pt>
+                <c:pt idx="1">
+                  <c:v>37262.0</c:v>
+                </c:pt>
+                <c:pt idx="2">
+                  <c:v>37263.0</c:v>
+                </c:pt>
+                <c:pt idx="3">
+                  <c:v>37264.0</c:v>
+                </c:pt>
+                <c:pt idx="4">
+                  <c:v>37265.0</c:v>
+                </c:pt>
+              </c:numCache>
+            </c:numRef>
+          </c:cat>
+          <c:val>
+            <c:numRef>
+              <c:f>Sheet1!$C$2:$C$6</c:f>
+              <c:numCache>
+                <c:formatCode>General</c:formatCode>
+                <c:ptCount val="5"/>
+                <c:pt idx="0">
+                  <c:v>12.0</c:v>
+                </c:pt>
+                <c:pt idx="1">
+                  <c:v>12.0</c:v>
+                </c:pt>
+                <c:pt idx="2">
+                  <c:v>12.0</c:v>
+                </c:pt>
+                <c:pt idx="3">
+                  <c:v>21.0</c:v>
+                </c:pt>
+                <c:pt idx="4">
+                  <c:v>28.0</c:v>
+                </c:pt>
+              </c:numCache>
+            </c:numRef>
+          </c:val>
+        </c:ser>
+        <c:dLbls>
+          <c:showLegendKey val="0"/>
+          <c:showVal val="0"/>
+          <c:showCatName val="0"/>
+          <c:showSerName val="0"/>
+          <c:showPercent val="0"/>
+          <c:showBubbleSize val="0"/>
+        </c:dLbls>
+        <c:axId val="-2049954888"/>
+        <c:axId val="-2049956472"/>
+      </c:radarChart>
+      <c:catAx>
+        <c:axId val="-2049954888"/>
+        <c:scaling>
+          <c:orientation val="minMax"/>
+        </c:scaling>
+        <c:delete val="0"/>
+        <c:axPos val="b"/>
+        <c:majorGridlines/>
+        <c:numFmt formatCode="m/d/yy" sourceLinked="1"/>
+        <c:majorTickMark val="out"/>
+        <c:minorTickMark val="none"/>
+        <c:tickLblPos val="nextTo"/>
+        <c:crossAx val="-2049956472"/>
+        <c:crosses val="autoZero"/>
+        <c:auto val="1"/>
+        <c:lblAlgn val="ctr"/>
+        <c:lblOffset val="100"/>
+        <c:noMultiLvlLbl val="0"/>
+      </c:catAx>
+      <c:valAx>
+        <c:axId val="-2049956472"/>
+        <c:scaling>
+          <c:orientation val="minMax"/>
+        </c:scaling>
+        <c:delete val="0"/>
+        <c:axPos val="l"/>
+        <c:majorGridlines/>
+        <c:numFmt formatCode="General" sourceLinked="1"/>
+        <c:majorTickMark val="cross"/>
+        <c:minorTickMark val="none"/>
+        <c:tickLblPos val="nextTo"/>
+        <c:crossAx val="-2049954888"/>
+        <c:crosses val="autoZero"/>
+        <c:crossBetween val="between"/>
+      </c:valAx>
+    </c:plotArea>
+    <c:plotVisOnly val="1"/>
+    <c:dispBlanksAs val="gap"/>
     <c:showDLblsOverMax val="0"/>
   </c:chart>
   <c:txPr>
@@ -4484,12 +5130,12 @@
           <c:showPercent val="0"/>
           <c:showBubbleSize val="0"/>
         </c:dLbls>
-        <c:axId val="-2083061624"/>
-        <c:axId val="-2083058584"/>
-        <c:axId val="-2083055544"/>
+        <c:axId val="-2110385576"/>
+        <c:axId val="-2053784088"/>
+        <c:axId val="-2054263688"/>
       </c:area3DChart>
       <c:dateAx>
-        <c:axId val="-2083061624"/>
+        <c:axId val="-2110385576"/>
         <c:scaling>
           <c:orientation val="minMax"/>
         </c:scaling>
@@ -4499,14 +5145,14 @@
         <c:majorTickMark val="none"/>
         <c:minorTickMark val="none"/>
         <c:tickLblPos val="none"/>
-        <c:crossAx val="-2083058584"/>
+        <c:crossAx val="-2053784088"/>
         <c:crosses val="autoZero"/>
         <c:auto val="1"/>
         <c:lblOffset val="100"/>
         <c:baseTimeUnit val="days"/>
       </c:dateAx>
       <c:valAx>
-        <c:axId val="-2083058584"/>
+        <c:axId val="-2053784088"/>
         <c:scaling>
           <c:orientation val="minMax"/>
         </c:scaling>
@@ -4517,12 +5163,12 @@
         <c:majorTickMark val="out"/>
         <c:minorTickMark val="none"/>
         <c:tickLblPos val="nextTo"/>
-        <c:crossAx val="-2083061624"/>
+        <c:crossAx val="-2110385576"/>
         <c:crosses val="autoZero"/>
         <c:crossBetween val="midCat"/>
       </c:valAx>
       <c:serAx>
-        <c:axId val="-2083055544"/>
+        <c:axId val="-2054263688"/>
         <c:scaling>
           <c:orientation val="minMax"/>
         </c:scaling>
@@ -4531,7 +5177,7 @@
         <c:majorTickMark val="none"/>
         <c:minorTickMark val="none"/>
         <c:tickLblPos val="none"/>
-        <c:crossAx val="-2083058584"/>
+        <c:crossAx val="-2053784088"/>
         <c:crosses val="autoZero"/>
       </c:serAx>
     </c:plotArea>
@@ -4724,12 +5370,12 @@
           <c:showPercent val="0"/>
           <c:showBubbleSize val="0"/>
         </c:dLbls>
-        <c:axId val="-2083031368"/>
-        <c:axId val="-2083028328"/>
+        <c:axId val="-2055028168"/>
+        <c:axId val="-2110305496"/>
         <c:axId val="0"/>
       </c:area3DChart>
       <c:dateAx>
-        <c:axId val="-2083031368"/>
+        <c:axId val="-2055028168"/>
         <c:scaling>
           <c:orientation val="minMax"/>
         </c:scaling>
@@ -4739,14 +5385,14 @@
         <c:majorTickMark val="none"/>
         <c:minorTickMark val="none"/>
         <c:tickLblPos val="none"/>
-        <c:crossAx val="-2083028328"/>
+        <c:crossAx val="-2110305496"/>
         <c:crosses val="autoZero"/>
         <c:auto val="1"/>
         <c:lblOffset val="100"/>
         <c:baseTimeUnit val="days"/>
       </c:dateAx>
       <c:valAx>
-        <c:axId val="-2083028328"/>
+        <c:axId val="-2110305496"/>
         <c:scaling>
           <c:orientation val="minMax"/>
         </c:scaling>
@@ -4757,7 +5403,7 @@
         <c:majorTickMark val="out"/>
         <c:minorTickMark val="none"/>
         <c:tickLblPos val="nextTo"/>
-        <c:crossAx val="-2083031368"/>
+        <c:crossAx val="-2055028168"/>
         <c:crosses val="autoZero"/>
         <c:crossBetween val="midCat"/>
       </c:valAx>
@@ -4951,12 +5597,12 @@
           <c:showPercent val="0"/>
           <c:showBubbleSize val="0"/>
         </c:dLbls>
-        <c:axId val="-2083003080"/>
-        <c:axId val="-2083000040"/>
+        <c:axId val="-2113810632"/>
+        <c:axId val="-2054358904"/>
         <c:axId val="0"/>
       </c:area3DChart>
       <c:dateAx>
-        <c:axId val="-2083003080"/>
+        <c:axId val="-2113810632"/>
         <c:scaling>
           <c:orientation val="minMax"/>
         </c:scaling>
@@ -4966,14 +5612,14 @@
         <c:majorTickMark val="none"/>
         <c:minorTickMark val="none"/>
         <c:tickLblPos val="none"/>
-        <c:crossAx val="-2083000040"/>
+        <c:crossAx val="-2054358904"/>
         <c:crosses val="autoZero"/>
         <c:auto val="1"/>
         <c:lblOffset val="100"/>
         <c:baseTimeUnit val="days"/>
       </c:dateAx>
       <c:valAx>
-        <c:axId val="-2083000040"/>
+        <c:axId val="-2054358904"/>
         <c:scaling>
           <c:orientation val="minMax"/>
         </c:scaling>
@@ -4984,7 +5630,7 @@
         <c:majorTickMark val="out"/>
         <c:minorTickMark val="none"/>
         <c:tickLblPos val="nextTo"/>
-        <c:crossAx val="-2083003080"/>
+        <c:crossAx val="-2113810632"/>
         <c:crosses val="autoZero"/>
         <c:crossBetween val="midCat"/>
       </c:valAx>
@@ -5210,11 +5856,11 @@
           <c:showBubbleSize val="0"/>
         </c:dLbls>
         <c:gapWidth val="150"/>
-        <c:axId val="2082913560"/>
-        <c:axId val="-2118953320"/>
+        <c:axId val="-2096488456"/>
+        <c:axId val="-2095605912"/>
       </c:barChart>
       <c:catAx>
-        <c:axId val="2082913560"/>
+        <c:axId val="-2096488456"/>
         <c:scaling>
           <c:orientation val="minMax"/>
         </c:scaling>
@@ -5223,7 +5869,7 @@
         <c:majorTickMark val="none"/>
         <c:minorTickMark val="none"/>
         <c:tickLblPos val="none"/>
-        <c:crossAx val="-2118953320"/>
+        <c:crossAx val="-2095605912"/>
         <c:crosses val="autoZero"/>
         <c:auto val="1"/>
         <c:lblAlgn val="ctr"/>
@@ -5231,7 +5877,7 @@
         <c:noMultiLvlLbl val="0"/>
       </c:catAx>
       <c:valAx>
-        <c:axId val="-2118953320"/>
+        <c:axId val="-2095605912"/>
         <c:scaling>
           <c:orientation val="minMax"/>
         </c:scaling>
@@ -5242,7 +5888,7 @@
         <c:majorTickMark val="out"/>
         <c:minorTickMark val="none"/>
         <c:tickLblPos val="nextTo"/>
-        <c:crossAx val="2082913560"/>
+        <c:crossAx val="-2096488456"/>
         <c:crosses val="autoZero"/>
         <c:crossBetween val="between"/>
       </c:valAx>
@@ -5469,11 +6115,11 @@
         </c:dLbls>
         <c:gapWidth val="150"/>
         <c:overlap val="100"/>
-        <c:axId val="2082610408"/>
-        <c:axId val="2083429016"/>
+        <c:axId val="-2096683672"/>
+        <c:axId val="-2090219928"/>
       </c:barChart>
       <c:catAx>
-        <c:axId val="2082610408"/>
+        <c:axId val="-2096683672"/>
         <c:scaling>
           <c:orientation val="minMax"/>
         </c:scaling>
@@ -5482,7 +6128,7 @@
         <c:majorTickMark val="none"/>
         <c:minorTickMark val="none"/>
         <c:tickLblPos val="none"/>
-        <c:crossAx val="2083429016"/>
+        <c:crossAx val="-2090219928"/>
         <c:crosses val="autoZero"/>
         <c:auto val="1"/>
         <c:lblAlgn val="ctr"/>
@@ -5490,7 +6136,7 @@
         <c:noMultiLvlLbl val="0"/>
       </c:catAx>
       <c:valAx>
-        <c:axId val="2083429016"/>
+        <c:axId val="-2090219928"/>
         <c:scaling>
           <c:orientation val="minMax"/>
         </c:scaling>
@@ -5501,7 +6147,7 @@
         <c:majorTickMark val="out"/>
         <c:minorTickMark val="none"/>
         <c:tickLblPos val="nextTo"/>
-        <c:crossAx val="2082610408"/>
+        <c:crossAx val="-2096683672"/>
         <c:crosses val="autoZero"/>
         <c:crossBetween val="between"/>
       </c:valAx>
@@ -5728,11 +6374,11 @@
         </c:dLbls>
         <c:gapWidth val="150"/>
         <c:overlap val="100"/>
-        <c:axId val="-2118690536"/>
-        <c:axId val="-2118687560"/>
+        <c:axId val="-2107984248"/>
+        <c:axId val="-2096143720"/>
       </c:barChart>
       <c:catAx>
-        <c:axId val="-2118690536"/>
+        <c:axId val="-2107984248"/>
         <c:scaling>
           <c:orientation val="minMax"/>
         </c:scaling>
@@ -5741,7 +6387,7 @@
         <c:majorTickMark val="none"/>
         <c:minorTickMark val="none"/>
         <c:tickLblPos val="none"/>
-        <c:crossAx val="-2118687560"/>
+        <c:crossAx val="-2096143720"/>
         <c:crosses val="autoZero"/>
         <c:auto val="1"/>
         <c:lblAlgn val="ctr"/>
@@ -5749,7 +6395,7 @@
         <c:noMultiLvlLbl val="0"/>
       </c:catAx>
       <c:valAx>
-        <c:axId val="-2118687560"/>
+        <c:axId val="-2096143720"/>
         <c:scaling>
           <c:orientation val="minMax"/>
         </c:scaling>
@@ -5760,7 +6406,7 @@
         <c:majorTickMark val="out"/>
         <c:minorTickMark val="none"/>
         <c:tickLblPos val="nextTo"/>
-        <c:crossAx val="-2118690536"/>
+        <c:crossAx val="-2107984248"/>
         <c:crosses val="autoZero"/>
         <c:crossBetween val="between"/>
       </c:valAx>
@@ -6865,6 +7511,102 @@
 </p:sld>
 </file>
 
+<file path=ppt/slides/slide7.xml><?xml version="1.0" encoding="utf-8"?>
+<p:sld xmlns:a="http://schemas.openxmlformats.org/drawingml/2006/main" xmlns:r="http://schemas.openxmlformats.org/officeDocument/2006/relationships" xmlns:p="http://schemas.openxmlformats.org/presentationml/2006/main">
+  <p:cSld>
+    <p:spTree>
+      <p:nvGrpSpPr>
+        <p:cNvPr id="1" name=""/>
+        <p:cNvGrpSpPr/>
+        <p:nvPr/>
+      </p:nvGrpSpPr>
+      <p:grpSpPr>
+        <a:xfrm>
+          <a:off x="0" y="0"/>
+          <a:ext cx="0" cy="0"/>
+          <a:chOff x="0" y="0"/>
+          <a:chExt cx="0" cy="0"/>
+        </a:xfrm>
+      </p:grpSpPr>
+      <p:graphicFrame>
+        <p:nvGraphicFramePr>
+          <p:cNvPr id="2" name="Chart 1"/>
+          <p:cNvGraphicFramePr/>
+          <p:nvPr>
+            <p:extLst>
+              <p:ext uri="{D42A27DB-BD31-4B8C-83A1-F6EECF244321}">
+                <p14:modId xmlns:p14="http://schemas.microsoft.com/office/powerpoint/2010/main" val="3240267053"/>
+              </p:ext>
+            </p:extLst>
+          </p:nvPr>
+        </p:nvGraphicFramePr>
+        <p:xfrm>
+          <a:off x="228600" y="228600"/>
+          <a:ext cx="4271392" cy="3056384"/>
+        </p:xfrm>
+        <a:graphic>
+          <a:graphicData uri="http://schemas.openxmlformats.org/drawingml/2006/chart">
+            <c:chart xmlns:c="http://schemas.openxmlformats.org/drawingml/2006/chart" xmlns:r="http://schemas.openxmlformats.org/officeDocument/2006/relationships" r:id="rId2"/>
+          </a:graphicData>
+        </a:graphic>
+      </p:graphicFrame>
+      <p:graphicFrame>
+        <p:nvGraphicFramePr>
+          <p:cNvPr id="3" name="Chart 2"/>
+          <p:cNvGraphicFramePr/>
+          <p:nvPr>
+            <p:extLst>
+              <p:ext uri="{D42A27DB-BD31-4B8C-83A1-F6EECF244321}">
+                <p14:modId xmlns:p14="http://schemas.microsoft.com/office/powerpoint/2010/main" val="2519581462"/>
+              </p:ext>
+            </p:extLst>
+          </p:nvPr>
+        </p:nvGraphicFramePr>
+        <p:xfrm>
+          <a:off x="4690872" y="228600"/>
+          <a:ext cx="4201608" cy="3056384"/>
+        </p:xfrm>
+        <a:graphic>
+          <a:graphicData uri="http://schemas.openxmlformats.org/drawingml/2006/chart">
+            <c:chart xmlns:c="http://schemas.openxmlformats.org/drawingml/2006/chart" xmlns:r="http://schemas.openxmlformats.org/officeDocument/2006/relationships" r:id="rId3"/>
+          </a:graphicData>
+        </a:graphic>
+      </p:graphicFrame>
+      <p:graphicFrame>
+        <p:nvGraphicFramePr>
+          <p:cNvPr id="4" name="Chart 3"/>
+          <p:cNvGraphicFramePr/>
+          <p:nvPr>
+            <p:extLst>
+              <p:ext uri="{D42A27DB-BD31-4B8C-83A1-F6EECF244321}">
+                <p14:modId xmlns:p14="http://schemas.microsoft.com/office/powerpoint/2010/main" val="2514545027"/>
+              </p:ext>
+            </p:extLst>
+          </p:nvPr>
+        </p:nvGraphicFramePr>
+        <p:xfrm>
+          <a:off x="251520" y="3573016"/>
+          <a:ext cx="4248472" cy="3024336"/>
+        </p:xfrm>
+        <a:graphic>
+          <a:graphicData uri="http://schemas.openxmlformats.org/drawingml/2006/chart">
+            <c:chart xmlns:c="http://schemas.openxmlformats.org/drawingml/2006/chart" xmlns:r="http://schemas.openxmlformats.org/officeDocument/2006/relationships" r:id="rId4"/>
+          </a:graphicData>
+        </a:graphic>
+      </p:graphicFrame>
+    </p:spTree>
+    <p:extLst>
+      <p:ext uri="{BB962C8B-B14F-4D97-AF65-F5344CB8AC3E}">
+        <p14:creationId xmlns:p14="http://schemas.microsoft.com/office/powerpoint/2010/main" val="2615519147"/>
+      </p:ext>
+    </p:extLst>
+  </p:cSld>
+  <p:clrMapOvr>
+    <a:masterClrMapping/>
+  </p:clrMapOvr>
+</p:sld>
+</file>
+
 <file path=ppt/theme/theme1.xml><?xml version="1.0" encoding="utf-8"?>
 <a:theme xmlns:a="http://schemas.openxmlformats.org/drawingml/2006/main" name="Office Theme">
   <a:themeElements>

</xml_diff>

<commit_message>
acpt: add scenario for Chart.category_axis
... for the case where the category axis is a date axis.
</commit_message>
<xml_diff>
--- a/features/steps/test_files/cht-chart-type.pptx
+++ b/features/steps/test_files/cht-chart-type.pptx
@@ -12,6 +12,7 @@
     <p:sldId id="260" r:id="rId6"/>
     <p:sldId id="261" r:id="rId7"/>
     <p:sldId id="262" r:id="rId8"/>
+    <p:sldId id="263" r:id="rId9"/>
   </p:sldIdLst>
   <p:sldSz cx="9144000" cy="6858000" type="screen4x3"/>
   <p:notesSz cx="6858000" cy="9144000"/>
@@ -267,11 +268,11 @@
           <c:showPercent val="0"/>
           <c:showBubbleSize val="0"/>
         </c:dLbls>
-        <c:axId val="-2113209256"/>
-        <c:axId val="-2110637832"/>
+        <c:axId val="-2147343064"/>
+        <c:axId val="-2147340056"/>
       </c:areaChart>
       <c:dateAx>
-        <c:axId val="-2113209256"/>
+        <c:axId val="-2147343064"/>
         <c:scaling>
           <c:orientation val="minMax"/>
         </c:scaling>
@@ -281,14 +282,14 @@
         <c:majorTickMark val="none"/>
         <c:minorTickMark val="none"/>
         <c:tickLblPos val="none"/>
-        <c:crossAx val="-2110637832"/>
+        <c:crossAx val="-2147340056"/>
         <c:crosses val="autoZero"/>
         <c:auto val="1"/>
         <c:lblOffset val="100"/>
         <c:baseTimeUnit val="days"/>
       </c:dateAx>
       <c:valAx>
-        <c:axId val="-2110637832"/>
+        <c:axId val="-2147340056"/>
         <c:scaling>
           <c:orientation val="minMax"/>
         </c:scaling>
@@ -299,7 +300,7 @@
         <c:majorTickMark val="out"/>
         <c:minorTickMark val="none"/>
         <c:tickLblPos val="nextTo"/>
-        <c:crossAx val="-2113209256"/>
+        <c:crossAx val="-2147343064"/>
         <c:crosses val="autoZero"/>
         <c:crossBetween val="midCat"/>
       </c:valAx>
@@ -525,11 +526,11 @@
           <c:showBubbleSize val="0"/>
         </c:dLbls>
         <c:gapWidth val="150"/>
-        <c:axId val="-2095484872"/>
-        <c:axId val="-2108009592"/>
+        <c:axId val="-2141911272"/>
+        <c:axId val="-2141908296"/>
       </c:barChart>
       <c:catAx>
-        <c:axId val="-2095484872"/>
+        <c:axId val="-2141911272"/>
         <c:scaling>
           <c:orientation val="minMax"/>
         </c:scaling>
@@ -538,7 +539,7 @@
         <c:majorTickMark val="none"/>
         <c:minorTickMark val="none"/>
         <c:tickLblPos val="none"/>
-        <c:crossAx val="-2108009592"/>
+        <c:crossAx val="-2141908296"/>
         <c:crosses val="autoZero"/>
         <c:auto val="1"/>
         <c:lblAlgn val="ctr"/>
@@ -546,7 +547,7 @@
         <c:noMultiLvlLbl val="0"/>
       </c:catAx>
       <c:valAx>
-        <c:axId val="-2108009592"/>
+        <c:axId val="-2141908296"/>
         <c:scaling>
           <c:orientation val="minMax"/>
         </c:scaling>
@@ -557,7 +558,7 @@
         <c:majorTickMark val="out"/>
         <c:minorTickMark val="none"/>
         <c:tickLblPos val="nextTo"/>
-        <c:crossAx val="-2095484872"/>
+        <c:crossAx val="-2141911272"/>
         <c:crosses val="autoZero"/>
         <c:crossBetween val="between"/>
       </c:valAx>
@@ -784,11 +785,11 @@
         </c:dLbls>
         <c:gapWidth val="150"/>
         <c:overlap val="100"/>
-        <c:axId val="-2108160488"/>
-        <c:axId val="-2096878824"/>
+        <c:axId val="-2142136536"/>
+        <c:axId val="-2142133560"/>
       </c:barChart>
       <c:catAx>
-        <c:axId val="-2108160488"/>
+        <c:axId val="-2142136536"/>
         <c:scaling>
           <c:orientation val="minMax"/>
         </c:scaling>
@@ -797,7 +798,7 @@
         <c:majorTickMark val="none"/>
         <c:minorTickMark val="none"/>
         <c:tickLblPos val="none"/>
-        <c:crossAx val="-2096878824"/>
+        <c:crossAx val="-2142133560"/>
         <c:crosses val="autoZero"/>
         <c:auto val="1"/>
         <c:lblAlgn val="ctr"/>
@@ -805,7 +806,7 @@
         <c:noMultiLvlLbl val="0"/>
       </c:catAx>
       <c:valAx>
-        <c:axId val="-2096878824"/>
+        <c:axId val="-2142133560"/>
         <c:scaling>
           <c:orientation val="minMax"/>
         </c:scaling>
@@ -816,7 +817,7 @@
         <c:majorTickMark val="out"/>
         <c:minorTickMark val="none"/>
         <c:tickLblPos val="nextTo"/>
-        <c:crossAx val="-2108160488"/>
+        <c:crossAx val="-2142136536"/>
         <c:crosses val="autoZero"/>
         <c:crossBetween val="between"/>
       </c:valAx>
@@ -1043,11 +1044,11 @@
         </c:dLbls>
         <c:gapWidth val="150"/>
         <c:overlap val="100"/>
-        <c:axId val="-2108116856"/>
-        <c:axId val="-2107712984"/>
+        <c:axId val="-2142169624"/>
+        <c:axId val="-2142166648"/>
       </c:barChart>
       <c:catAx>
-        <c:axId val="-2108116856"/>
+        <c:axId val="-2142169624"/>
         <c:scaling>
           <c:orientation val="minMax"/>
         </c:scaling>
@@ -1056,7 +1057,7 @@
         <c:majorTickMark val="none"/>
         <c:minorTickMark val="none"/>
         <c:tickLblPos val="none"/>
-        <c:crossAx val="-2107712984"/>
+        <c:crossAx val="-2142166648"/>
         <c:crosses val="autoZero"/>
         <c:auto val="1"/>
         <c:lblAlgn val="ctr"/>
@@ -1064,7 +1065,7 @@
         <c:noMultiLvlLbl val="0"/>
       </c:catAx>
       <c:valAx>
-        <c:axId val="-2107712984"/>
+        <c:axId val="-2142166648"/>
         <c:scaling>
           <c:orientation val="minMax"/>
         </c:scaling>
@@ -1075,7 +1076,7 @@
         <c:majorTickMark val="out"/>
         <c:minorTickMark val="none"/>
         <c:tickLblPos val="nextTo"/>
-        <c:crossAx val="-2108116856"/>
+        <c:crossAx val="-2142169624"/>
         <c:crosses val="autoZero"/>
         <c:crossBetween val="between"/>
       </c:valAx>
@@ -1310,11 +1311,11 @@
         </c:dLbls>
         <c:marker val="1"/>
         <c:smooth val="0"/>
-        <c:axId val="-2096957416"/>
-        <c:axId val="-2090571848"/>
+        <c:axId val="-2142211176"/>
+        <c:axId val="-2142208200"/>
       </c:lineChart>
       <c:catAx>
-        <c:axId val="-2096957416"/>
+        <c:axId val="-2142211176"/>
         <c:scaling>
           <c:orientation val="minMax"/>
         </c:scaling>
@@ -1323,7 +1324,7 @@
         <c:majorTickMark val="none"/>
         <c:minorTickMark val="none"/>
         <c:tickLblPos val="none"/>
-        <c:crossAx val="-2090571848"/>
+        <c:crossAx val="-2142208200"/>
         <c:crosses val="autoZero"/>
         <c:auto val="1"/>
         <c:lblAlgn val="ctr"/>
@@ -1331,7 +1332,7 @@
         <c:noMultiLvlLbl val="0"/>
       </c:catAx>
       <c:valAx>
-        <c:axId val="-2090571848"/>
+        <c:axId val="-2142208200"/>
         <c:scaling>
           <c:orientation val="minMax"/>
         </c:scaling>
@@ -1342,7 +1343,7 @@
         <c:majorTickMark val="out"/>
         <c:minorTickMark val="none"/>
         <c:tickLblPos val="nextTo"/>
-        <c:crossAx val="-2096957416"/>
+        <c:crossAx val="-2142211176"/>
         <c:crosses val="autoZero"/>
         <c:crossBetween val="between"/>
       </c:valAx>
@@ -1577,11 +1578,11 @@
         </c:dLbls>
         <c:marker val="1"/>
         <c:smooth val="0"/>
-        <c:axId val="-2095143816"/>
-        <c:axId val="-2108354408"/>
+        <c:axId val="-2142237016"/>
+        <c:axId val="-2105358440"/>
       </c:lineChart>
       <c:catAx>
-        <c:axId val="-2095143816"/>
+        <c:axId val="-2142237016"/>
         <c:scaling>
           <c:orientation val="minMax"/>
         </c:scaling>
@@ -1590,7 +1591,7 @@
         <c:majorTickMark val="none"/>
         <c:minorTickMark val="none"/>
         <c:tickLblPos val="none"/>
-        <c:crossAx val="-2108354408"/>
+        <c:crossAx val="-2105358440"/>
         <c:crosses val="autoZero"/>
         <c:auto val="1"/>
         <c:lblAlgn val="ctr"/>
@@ -1598,7 +1599,7 @@
         <c:noMultiLvlLbl val="0"/>
       </c:catAx>
       <c:valAx>
-        <c:axId val="-2108354408"/>
+        <c:axId val="-2105358440"/>
         <c:scaling>
           <c:orientation val="minMax"/>
         </c:scaling>
@@ -1609,7 +1610,7 @@
         <c:majorTickMark val="out"/>
         <c:minorTickMark val="none"/>
         <c:tickLblPos val="nextTo"/>
-        <c:crossAx val="-2095143816"/>
+        <c:crossAx val="-2142237016"/>
         <c:crosses val="autoZero"/>
         <c:crossBetween val="between"/>
       </c:valAx>
@@ -1844,11 +1845,11 @@
         </c:dLbls>
         <c:marker val="1"/>
         <c:smooth val="0"/>
-        <c:axId val="-2090559640"/>
-        <c:axId val="-2095552952"/>
+        <c:axId val="-2104527368"/>
+        <c:axId val="-2104524392"/>
       </c:lineChart>
       <c:catAx>
-        <c:axId val="-2090559640"/>
+        <c:axId val="-2104527368"/>
         <c:scaling>
           <c:orientation val="minMax"/>
         </c:scaling>
@@ -1857,7 +1858,7 @@
         <c:majorTickMark val="none"/>
         <c:minorTickMark val="none"/>
         <c:tickLblPos val="none"/>
-        <c:crossAx val="-2095552952"/>
+        <c:crossAx val="-2104524392"/>
         <c:crosses val="autoZero"/>
         <c:auto val="1"/>
         <c:lblAlgn val="ctr"/>
@@ -1865,7 +1866,7 @@
         <c:noMultiLvlLbl val="0"/>
       </c:catAx>
       <c:valAx>
-        <c:axId val="-2095552952"/>
+        <c:axId val="-2104524392"/>
         <c:scaling>
           <c:orientation val="minMax"/>
         </c:scaling>
@@ -1876,7 +1877,7 @@
         <c:majorTickMark val="out"/>
         <c:minorTickMark val="none"/>
         <c:tickLblPos val="nextTo"/>
-        <c:crossAx val="-2090559640"/>
+        <c:crossAx val="-2104527368"/>
         <c:crosses val="autoZero"/>
         <c:crossBetween val="between"/>
       </c:valAx>
@@ -2102,11 +2103,11 @@
         </c:dLbls>
         <c:marker val="1"/>
         <c:smooth val="0"/>
-        <c:axId val="-2090317400"/>
-        <c:axId val="-2090493608"/>
+        <c:axId val="-2104559800"/>
+        <c:axId val="-2104556824"/>
       </c:lineChart>
       <c:catAx>
-        <c:axId val="-2090317400"/>
+        <c:axId val="-2104559800"/>
         <c:scaling>
           <c:orientation val="minMax"/>
         </c:scaling>
@@ -2115,7 +2116,7 @@
         <c:majorTickMark val="none"/>
         <c:minorTickMark val="none"/>
         <c:tickLblPos val="none"/>
-        <c:crossAx val="-2090493608"/>
+        <c:crossAx val="-2104556824"/>
         <c:crosses val="autoZero"/>
         <c:auto val="1"/>
         <c:lblAlgn val="ctr"/>
@@ -2123,7 +2124,7 @@
         <c:noMultiLvlLbl val="0"/>
       </c:catAx>
       <c:valAx>
-        <c:axId val="-2090493608"/>
+        <c:axId val="-2104556824"/>
         <c:scaling>
           <c:orientation val="minMax"/>
         </c:scaling>
@@ -2134,7 +2135,7 @@
         <c:majorTickMark val="out"/>
         <c:minorTickMark val="none"/>
         <c:tickLblPos val="nextTo"/>
-        <c:crossAx val="-2090317400"/>
+        <c:crossAx val="-2104559800"/>
         <c:crosses val="autoZero"/>
         <c:crossBetween val="between"/>
       </c:valAx>
@@ -2360,11 +2361,11 @@
         </c:dLbls>
         <c:marker val="1"/>
         <c:smooth val="0"/>
-        <c:axId val="-2090589176"/>
-        <c:axId val="-2095536456"/>
+        <c:axId val="-2104577352"/>
+        <c:axId val="-2104574376"/>
       </c:lineChart>
       <c:catAx>
-        <c:axId val="-2090589176"/>
+        <c:axId val="-2104577352"/>
         <c:scaling>
           <c:orientation val="minMax"/>
         </c:scaling>
@@ -2373,7 +2374,7 @@
         <c:majorTickMark val="none"/>
         <c:minorTickMark val="none"/>
         <c:tickLblPos val="none"/>
-        <c:crossAx val="-2095536456"/>
+        <c:crossAx val="-2104574376"/>
         <c:crosses val="autoZero"/>
         <c:auto val="1"/>
         <c:lblAlgn val="ctr"/>
@@ -2381,7 +2382,7 @@
         <c:noMultiLvlLbl val="0"/>
       </c:catAx>
       <c:valAx>
-        <c:axId val="-2095536456"/>
+        <c:axId val="-2104574376"/>
         <c:scaling>
           <c:orientation val="minMax"/>
         </c:scaling>
@@ -2392,7 +2393,7 @@
         <c:majorTickMark val="out"/>
         <c:minorTickMark val="none"/>
         <c:tickLblPos val="nextTo"/>
-        <c:crossAx val="-2090589176"/>
+        <c:crossAx val="-2104577352"/>
         <c:crosses val="autoZero"/>
         <c:crossBetween val="between"/>
       </c:valAx>
@@ -2618,11 +2619,11 @@
         </c:dLbls>
         <c:marker val="1"/>
         <c:smooth val="0"/>
-        <c:axId val="-2108479272"/>
-        <c:axId val="-2108487336"/>
+        <c:axId val="-2104613928"/>
+        <c:axId val="-2104610952"/>
       </c:lineChart>
       <c:catAx>
-        <c:axId val="-2108479272"/>
+        <c:axId val="-2104613928"/>
         <c:scaling>
           <c:orientation val="minMax"/>
         </c:scaling>
@@ -2631,7 +2632,7 @@
         <c:majorTickMark val="none"/>
         <c:minorTickMark val="none"/>
         <c:tickLblPos val="none"/>
-        <c:crossAx val="-2108487336"/>
+        <c:crossAx val="-2104610952"/>
         <c:crosses val="autoZero"/>
         <c:auto val="1"/>
         <c:lblAlgn val="ctr"/>
@@ -2639,7 +2640,7 @@
         <c:noMultiLvlLbl val="0"/>
       </c:catAx>
       <c:valAx>
-        <c:axId val="-2108487336"/>
+        <c:axId val="-2104610952"/>
         <c:scaling>
           <c:orientation val="minMax"/>
         </c:scaling>
@@ -2650,7 +2651,7 @@
         <c:majorTickMark val="out"/>
         <c:minorTickMark val="none"/>
         <c:tickLblPos val="nextTo"/>
-        <c:crossAx val="-2108479272"/>
+        <c:crossAx val="-2104613928"/>
         <c:crosses val="autoZero"/>
         <c:crossBetween val="between"/>
       </c:valAx>
@@ -2940,11 +2941,11 @@
           <c:showPercent val="0"/>
           <c:showBubbleSize val="0"/>
         </c:dLbls>
-        <c:axId val="-2053515704"/>
-        <c:axId val="-2054271576"/>
+        <c:axId val="-2147272360"/>
+        <c:axId val="-2147269320"/>
       </c:areaChart>
       <c:dateAx>
-        <c:axId val="-2053515704"/>
+        <c:axId val="-2147272360"/>
         <c:scaling>
           <c:orientation val="minMax"/>
         </c:scaling>
@@ -2954,14 +2955,14 @@
         <c:majorTickMark val="none"/>
         <c:minorTickMark val="none"/>
         <c:tickLblPos val="none"/>
-        <c:crossAx val="-2054271576"/>
+        <c:crossAx val="-2147269320"/>
         <c:crosses val="autoZero"/>
         <c:auto val="1"/>
         <c:lblOffset val="100"/>
         <c:baseTimeUnit val="days"/>
       </c:dateAx>
       <c:valAx>
-        <c:axId val="-2054271576"/>
+        <c:axId val="-2147269320"/>
         <c:scaling>
           <c:orientation val="minMax"/>
         </c:scaling>
@@ -2972,7 +2973,7 @@
         <c:majorTickMark val="out"/>
         <c:minorTickMark val="none"/>
         <c:tickLblPos val="nextTo"/>
-        <c:crossAx val="-2053515704"/>
+        <c:crossAx val="-2147272360"/>
         <c:crosses val="autoZero"/>
         <c:crossBetween val="midCat"/>
       </c:valAx>
@@ -3194,11 +3195,11 @@
           <c:showPercent val="0"/>
           <c:showBubbleSize val="0"/>
         </c:dLbls>
-        <c:axId val="-2096890200"/>
-        <c:axId val="-2090456104"/>
+        <c:axId val="-2104690088"/>
+        <c:axId val="-2104687064"/>
       </c:scatterChart>
       <c:valAx>
-        <c:axId val="-2096890200"/>
+        <c:axId val="-2104690088"/>
         <c:scaling>
           <c:orientation val="minMax"/>
         </c:scaling>
@@ -3208,12 +3209,12 @@
         <c:majorTickMark val="out"/>
         <c:minorTickMark val="none"/>
         <c:tickLblPos val="nextTo"/>
-        <c:crossAx val="-2090456104"/>
+        <c:crossAx val="-2104687064"/>
         <c:crosses val="autoZero"/>
         <c:crossBetween val="midCat"/>
       </c:valAx>
       <c:valAx>
-        <c:axId val="-2090456104"/>
+        <c:axId val="-2104687064"/>
         <c:scaling>
           <c:orientation val="minMax"/>
         </c:scaling>
@@ -3224,7 +3225,7 @@
         <c:majorTickMark val="out"/>
         <c:minorTickMark val="none"/>
         <c:tickLblPos val="nextTo"/>
-        <c:crossAx val="-2096890200"/>
+        <c:crossAx val="-2104690088"/>
         <c:crosses val="autoZero"/>
         <c:crossBetween val="midCat"/>
       </c:valAx>
@@ -3329,11 +3330,11 @@
           <c:showPercent val="0"/>
           <c:showBubbleSize val="0"/>
         </c:dLbls>
-        <c:axId val="-2108085608"/>
-        <c:axId val="2053161768"/>
+        <c:axId val="-2104703096"/>
+        <c:axId val="-2104700072"/>
       </c:scatterChart>
       <c:valAx>
-        <c:axId val="-2108085608"/>
+        <c:axId val="-2104703096"/>
         <c:scaling>
           <c:orientation val="minMax"/>
         </c:scaling>
@@ -3343,12 +3344,12 @@
         <c:majorTickMark val="out"/>
         <c:minorTickMark val="none"/>
         <c:tickLblPos val="nextTo"/>
-        <c:crossAx val="2053161768"/>
+        <c:crossAx val="-2104700072"/>
         <c:crosses val="autoZero"/>
         <c:crossBetween val="midCat"/>
       </c:valAx>
       <c:valAx>
-        <c:axId val="2053161768"/>
+        <c:axId val="-2104700072"/>
         <c:scaling>
           <c:orientation val="minMax"/>
         </c:scaling>
@@ -3359,7 +3360,7 @@
         <c:majorTickMark val="out"/>
         <c:minorTickMark val="none"/>
         <c:tickLblPos val="nextTo"/>
-        <c:crossAx val="-2108085608"/>
+        <c:crossAx val="-2104703096"/>
         <c:crosses val="autoZero"/>
         <c:crossBetween val="midCat"/>
       </c:valAx>
@@ -3467,11 +3468,11 @@
           <c:showPercent val="0"/>
           <c:showBubbleSize val="0"/>
         </c:dLbls>
-        <c:axId val="-2108543800"/>
-        <c:axId val="-2049180872"/>
+        <c:axId val="-2104730632"/>
+        <c:axId val="-2104743000"/>
       </c:scatterChart>
       <c:valAx>
-        <c:axId val="-2108543800"/>
+        <c:axId val="-2104730632"/>
         <c:scaling>
           <c:orientation val="minMax"/>
         </c:scaling>
@@ -3481,12 +3482,12 @@
         <c:majorTickMark val="out"/>
         <c:minorTickMark val="none"/>
         <c:tickLblPos val="nextTo"/>
-        <c:crossAx val="-2049180872"/>
+        <c:crossAx val="-2104743000"/>
         <c:crosses val="autoZero"/>
         <c:crossBetween val="midCat"/>
       </c:valAx>
       <c:valAx>
-        <c:axId val="-2049180872"/>
+        <c:axId val="-2104743000"/>
         <c:scaling>
           <c:orientation val="minMax"/>
         </c:scaling>
@@ -3497,7 +3498,7 @@
         <c:majorTickMark val="out"/>
         <c:minorTickMark val="none"/>
         <c:tickLblPos val="nextTo"/>
-        <c:crossAx val="-2108543800"/>
+        <c:crossAx val="-2104730632"/>
         <c:crosses val="autoZero"/>
         <c:crossBetween val="midCat"/>
       </c:valAx>
@@ -3602,11 +3603,11 @@
           <c:showPercent val="0"/>
           <c:showBubbleSize val="0"/>
         </c:dLbls>
-        <c:axId val="-2049159880"/>
-        <c:axId val="-2049156856"/>
+        <c:axId val="-2104791416"/>
+        <c:axId val="-2104788392"/>
       </c:scatterChart>
       <c:valAx>
-        <c:axId val="-2049159880"/>
+        <c:axId val="-2104791416"/>
         <c:scaling>
           <c:orientation val="minMax"/>
         </c:scaling>
@@ -3616,12 +3617,12 @@
         <c:majorTickMark val="out"/>
         <c:minorTickMark val="none"/>
         <c:tickLblPos val="nextTo"/>
-        <c:crossAx val="-2049156856"/>
+        <c:crossAx val="-2104788392"/>
         <c:crosses val="autoZero"/>
         <c:crossBetween val="midCat"/>
       </c:valAx>
       <c:valAx>
-        <c:axId val="-2049156856"/>
+        <c:axId val="-2104788392"/>
         <c:scaling>
           <c:orientation val="minMax"/>
         </c:scaling>
@@ -3632,7 +3633,7 @@
         <c:majorTickMark val="out"/>
         <c:minorTickMark val="none"/>
         <c:tickLblPos val="nextTo"/>
-        <c:crossAx val="-2049159880"/>
+        <c:crossAx val="-2104791416"/>
         <c:crosses val="autoZero"/>
         <c:crossBetween val="midCat"/>
       </c:valAx>
@@ -3740,11 +3741,11 @@
           <c:showPercent val="0"/>
           <c:showBubbleSize val="0"/>
         </c:dLbls>
-        <c:axId val="-2049134296"/>
-        <c:axId val="-2049131272"/>
+        <c:axId val="-2104765688"/>
+        <c:axId val="-2104762664"/>
       </c:scatterChart>
       <c:valAx>
-        <c:axId val="-2049134296"/>
+        <c:axId val="-2104765688"/>
         <c:scaling>
           <c:orientation val="minMax"/>
         </c:scaling>
@@ -3754,12 +3755,12 @@
         <c:majorTickMark val="out"/>
         <c:minorTickMark val="none"/>
         <c:tickLblPos val="nextTo"/>
-        <c:crossAx val="-2049131272"/>
+        <c:crossAx val="-2104762664"/>
         <c:crosses val="autoZero"/>
         <c:crossBetween val="midCat"/>
       </c:valAx>
       <c:valAx>
-        <c:axId val="-2049131272"/>
+        <c:axId val="-2104762664"/>
         <c:scaling>
           <c:orientation val="minMax"/>
         </c:scaling>
@@ -3770,7 +3771,7 @@
         <c:majorTickMark val="out"/>
         <c:minorTickMark val="none"/>
         <c:tickLblPos val="nextTo"/>
-        <c:crossAx val="-2049134296"/>
+        <c:crossAx val="-2104765688"/>
         <c:crosses val="autoZero"/>
         <c:crossBetween val="midCat"/>
       </c:valAx>
@@ -3895,11 +3896,11 @@
         </c:dLbls>
         <c:bubbleScale val="100"/>
         <c:showNegBubbles val="0"/>
-        <c:axId val="-2049100728"/>
-        <c:axId val="-2049097704"/>
+        <c:axId val="-2104836392"/>
+        <c:axId val="-2104841688"/>
       </c:bubbleChart>
       <c:valAx>
-        <c:axId val="-2049100728"/>
+        <c:axId val="-2104836392"/>
         <c:scaling>
           <c:orientation val="minMax"/>
         </c:scaling>
@@ -3909,12 +3910,12 @@
         <c:majorTickMark val="out"/>
         <c:minorTickMark val="none"/>
         <c:tickLblPos val="nextTo"/>
-        <c:crossAx val="-2049097704"/>
+        <c:crossAx val="-2104841688"/>
         <c:crosses val="autoZero"/>
         <c:crossBetween val="midCat"/>
       </c:valAx>
       <c:valAx>
-        <c:axId val="-2049097704"/>
+        <c:axId val="-2104841688"/>
         <c:scaling>
           <c:orientation val="minMax"/>
         </c:scaling>
@@ -3925,7 +3926,7 @@
         <c:majorTickMark val="out"/>
         <c:minorTickMark val="none"/>
         <c:tickLblPos val="nextTo"/>
-        <c:crossAx val="-2049100728"/>
+        <c:crossAx val="-2104836392"/>
         <c:crosses val="autoZero"/>
         <c:crossBetween val="midCat"/>
       </c:valAx>
@@ -4050,11 +4051,11 @@
         </c:dLbls>
         <c:bubbleScale val="100"/>
         <c:showNegBubbles val="0"/>
-        <c:axId val="-2049074424"/>
-        <c:axId val="-2049071400"/>
+        <c:axId val="-2104889672"/>
+        <c:axId val="-2104886648"/>
       </c:bubbleChart>
       <c:valAx>
-        <c:axId val="-2049074424"/>
+        <c:axId val="-2104889672"/>
         <c:scaling>
           <c:orientation val="minMax"/>
         </c:scaling>
@@ -4064,12 +4065,12 @@
         <c:majorTickMark val="out"/>
         <c:minorTickMark val="none"/>
         <c:tickLblPos val="nextTo"/>
-        <c:crossAx val="-2049071400"/>
+        <c:crossAx val="-2104886648"/>
         <c:crosses val="autoZero"/>
         <c:crossBetween val="midCat"/>
       </c:valAx>
       <c:valAx>
-        <c:axId val="-2049071400"/>
+        <c:axId val="-2104886648"/>
         <c:scaling>
           <c:orientation val="minMax"/>
         </c:scaling>
@@ -4080,7 +4081,7 @@
         <c:majorTickMark val="out"/>
         <c:minorTickMark val="none"/>
         <c:tickLblPos val="nextTo"/>
-        <c:crossAx val="-2049074424"/>
+        <c:crossAx val="-2104889672"/>
         <c:crosses val="autoZero"/>
         <c:crossBetween val="midCat"/>
       </c:valAx>
@@ -4265,11 +4266,11 @@
           <c:showPercent val="0"/>
           <c:showBubbleSize val="0"/>
         </c:dLbls>
-        <c:axId val="-2050880136"/>
-        <c:axId val="-2037790936"/>
+        <c:axId val="-2104906520"/>
+        <c:axId val="-2104910520"/>
       </c:radarChart>
       <c:catAx>
-        <c:axId val="-2050880136"/>
+        <c:axId val="-2104906520"/>
         <c:scaling>
           <c:orientation val="minMax"/>
         </c:scaling>
@@ -4280,7 +4281,7 @@
         <c:majorTickMark val="out"/>
         <c:minorTickMark val="none"/>
         <c:tickLblPos val="nextTo"/>
-        <c:crossAx val="-2037790936"/>
+        <c:crossAx val="-2104910520"/>
         <c:crosses val="autoZero"/>
         <c:auto val="1"/>
         <c:lblAlgn val="ctr"/>
@@ -4288,7 +4289,7 @@
         <c:noMultiLvlLbl val="0"/>
       </c:catAx>
       <c:valAx>
-        <c:axId val="-2037790936"/>
+        <c:axId val="-2104910520"/>
         <c:scaling>
           <c:orientation val="minMax"/>
         </c:scaling>
@@ -4299,7 +4300,7 @@
         <c:majorTickMark val="cross"/>
         <c:minorTickMark val="none"/>
         <c:tickLblPos val="nextTo"/>
-        <c:crossAx val="-2050880136"/>
+        <c:crossAx val="-2104906520"/>
         <c:crosses val="autoZero"/>
         <c:crossBetween val="between"/>
       </c:valAx>
@@ -4478,11 +4479,11 @@
           <c:showPercent val="0"/>
           <c:showBubbleSize val="0"/>
         </c:dLbls>
-        <c:axId val="-2054355432"/>
-        <c:axId val="-2053831848"/>
+        <c:axId val="-2104940376"/>
+        <c:axId val="-2104937336"/>
       </c:radarChart>
       <c:catAx>
-        <c:axId val="-2054355432"/>
+        <c:axId val="-2104940376"/>
         <c:scaling>
           <c:orientation val="minMax"/>
         </c:scaling>
@@ -4493,7 +4494,7 @@
         <c:majorTickMark val="out"/>
         <c:minorTickMark val="none"/>
         <c:tickLblPos val="nextTo"/>
-        <c:crossAx val="-2053831848"/>
+        <c:crossAx val="-2104937336"/>
         <c:crosses val="autoZero"/>
         <c:auto val="1"/>
         <c:lblAlgn val="ctr"/>
@@ -4501,7 +4502,7 @@
         <c:noMultiLvlLbl val="0"/>
       </c:catAx>
       <c:valAx>
-        <c:axId val="-2053831848"/>
+        <c:axId val="-2104937336"/>
         <c:scaling>
           <c:orientation val="minMax"/>
         </c:scaling>
@@ -4512,7 +4513,7 @@
         <c:majorTickMark val="cross"/>
         <c:minorTickMark val="none"/>
         <c:tickLblPos val="nextTo"/>
-        <c:crossAx val="-2054355432"/>
+        <c:crossAx val="-2104940376"/>
         <c:crosses val="autoZero"/>
         <c:crossBetween val="between"/>
       </c:valAx>
@@ -4691,11 +4692,11 @@
           <c:showPercent val="0"/>
           <c:showBubbleSize val="0"/>
         </c:dLbls>
-        <c:axId val="-2105955592"/>
-        <c:axId val="-2053417688"/>
+        <c:axId val="-2147245384"/>
+        <c:axId val="-2147242344"/>
       </c:areaChart>
       <c:dateAx>
-        <c:axId val="-2105955592"/>
+        <c:axId val="-2147245384"/>
         <c:scaling>
           <c:orientation val="minMax"/>
         </c:scaling>
@@ -4705,14 +4706,14 @@
         <c:majorTickMark val="none"/>
         <c:minorTickMark val="none"/>
         <c:tickLblPos val="none"/>
-        <c:crossAx val="-2053417688"/>
+        <c:crossAx val="-2147242344"/>
         <c:crosses val="autoZero"/>
         <c:auto val="1"/>
         <c:lblOffset val="100"/>
         <c:baseTimeUnit val="days"/>
       </c:dateAx>
       <c:valAx>
-        <c:axId val="-2053417688"/>
+        <c:axId val="-2147242344"/>
         <c:scaling>
           <c:orientation val="minMax"/>
         </c:scaling>
@@ -4723,7 +4724,7 @@
         <c:majorTickMark val="out"/>
         <c:minorTickMark val="none"/>
         <c:tickLblPos val="nextTo"/>
-        <c:crossAx val="-2105955592"/>
+        <c:crossAx val="-2147245384"/>
         <c:crosses val="autoZero"/>
         <c:crossBetween val="midCat"/>
       </c:valAx>
@@ -4902,11 +4903,11 @@
           <c:showPercent val="0"/>
           <c:showBubbleSize val="0"/>
         </c:dLbls>
-        <c:axId val="-2049954888"/>
-        <c:axId val="-2049956472"/>
+        <c:axId val="-2104958472"/>
+        <c:axId val="-2104955432"/>
       </c:radarChart>
       <c:catAx>
-        <c:axId val="-2049954888"/>
+        <c:axId val="-2104958472"/>
         <c:scaling>
           <c:orientation val="minMax"/>
         </c:scaling>
@@ -4917,7 +4918,7 @@
         <c:majorTickMark val="out"/>
         <c:minorTickMark val="none"/>
         <c:tickLblPos val="nextTo"/>
-        <c:crossAx val="-2049956472"/>
+        <c:crossAx val="-2104955432"/>
         <c:crosses val="autoZero"/>
         <c:auto val="1"/>
         <c:lblAlgn val="ctr"/>
@@ -4925,7 +4926,7 @@
         <c:noMultiLvlLbl val="0"/>
       </c:catAx>
       <c:valAx>
-        <c:axId val="-2049956472"/>
+        <c:axId val="-2104955432"/>
         <c:scaling>
           <c:orientation val="minMax"/>
         </c:scaling>
@@ -4936,11 +4937,186 @@
         <c:majorTickMark val="cross"/>
         <c:minorTickMark val="none"/>
         <c:tickLblPos val="nextTo"/>
-        <c:crossAx val="-2049954888"/>
+        <c:crossAx val="-2104958472"/>
         <c:crosses val="autoZero"/>
         <c:crossBetween val="between"/>
       </c:valAx>
     </c:plotArea>
+    <c:plotVisOnly val="1"/>
+    <c:dispBlanksAs val="gap"/>
+    <c:showDLblsOverMax val="0"/>
+  </c:chart>
+  <c:txPr>
+    <a:bodyPr/>
+    <a:lstStyle/>
+    <a:p>
+      <a:pPr>
+        <a:defRPr sz="1800"/>
+      </a:pPr>
+      <a:endParaRPr lang="en-US"/>
+    </a:p>
+  </c:txPr>
+  <c:externalData r:id="rId1">
+    <c:autoUpdate val="0"/>
+  </c:externalData>
+</c:chartSpace>
+</file>
+
+<file path=ppt/charts/chart31.xml><?xml version="1.0" encoding="utf-8"?>
+<c:chartSpace xmlns:c="http://schemas.openxmlformats.org/drawingml/2006/chart" xmlns:a="http://schemas.openxmlformats.org/drawingml/2006/main" xmlns:r="http://schemas.openxmlformats.org/officeDocument/2006/relationships">
+  <c:date1904 val="0"/>
+  <c:lang val="en-US"/>
+  <c:roundedCorners val="0"/>
+  <mc:AlternateContent xmlns:mc="http://schemas.openxmlformats.org/markup-compatibility/2006">
+    <mc:Choice xmlns:c14="http://schemas.microsoft.com/office/drawing/2007/8/2/chart" Requires="c14">
+      <c14:style val="118"/>
+    </mc:Choice>
+    <mc:Fallback>
+      <c:style val="18"/>
+    </mc:Fallback>
+  </mc:AlternateContent>
+  <c:chart>
+    <c:title>
+      <c:layout/>
+      <c:overlay val="0"/>
+    </c:title>
+    <c:autoTitleDeleted val="0"/>
+    <c:plotArea>
+      <c:layout/>
+      <c:lineChart>
+        <c:grouping val="standard"/>
+        <c:varyColors val="0"/>
+        <c:ser>
+          <c:idx val="0"/>
+          <c:order val="0"/>
+          <c:tx>
+            <c:strRef>
+              <c:f>Sheet1!$B$1</c:f>
+              <c:strCache>
+                <c:ptCount val="1"/>
+                <c:pt idx="0">
+                  <c:v>Series 1</c:v>
+                </c:pt>
+              </c:strCache>
+            </c:strRef>
+          </c:tx>
+          <c:marker>
+            <c:symbol val="none"/>
+          </c:marker>
+          <c:cat>
+            <c:numRef>
+              <c:f>Sheet1!$A$2:$A$8</c:f>
+              <c:numCache>
+                <c:formatCode>m/d/yy</c:formatCode>
+                <c:ptCount val="7"/>
+                <c:pt idx="0">
+                  <c:v>25204.0</c:v>
+                </c:pt>
+                <c:pt idx="1">
+                  <c:v>25205.0</c:v>
+                </c:pt>
+                <c:pt idx="2">
+                  <c:v>25215.0</c:v>
+                </c:pt>
+                <c:pt idx="3">
+                  <c:v>25223.0</c:v>
+                </c:pt>
+                <c:pt idx="4">
+                  <c:v>25233.0</c:v>
+                </c:pt>
+                <c:pt idx="5">
+                  <c:v>25244.0</c:v>
+                </c:pt>
+                <c:pt idx="6">
+                  <c:v>25254.0</c:v>
+                </c:pt>
+              </c:numCache>
+            </c:numRef>
+          </c:cat>
+          <c:val>
+            <c:numRef>
+              <c:f>Sheet1!$B$2:$B$8</c:f>
+              <c:numCache>
+                <c:formatCode>General</c:formatCode>
+                <c:ptCount val="7"/>
+                <c:pt idx="0">
+                  <c:v>4.3</c:v>
+                </c:pt>
+                <c:pt idx="1">
+                  <c:v>2.5</c:v>
+                </c:pt>
+                <c:pt idx="2">
+                  <c:v>3.5</c:v>
+                </c:pt>
+                <c:pt idx="3">
+                  <c:v>4.5</c:v>
+                </c:pt>
+                <c:pt idx="4">
+                  <c:v>3.6</c:v>
+                </c:pt>
+                <c:pt idx="5">
+                  <c:v>15.0</c:v>
+                </c:pt>
+                <c:pt idx="6">
+                  <c:v>17.0</c:v>
+                </c:pt>
+              </c:numCache>
+            </c:numRef>
+          </c:val>
+          <c:smooth val="0"/>
+        </c:ser>
+        <c:dLbls>
+          <c:showLegendKey val="0"/>
+          <c:showVal val="0"/>
+          <c:showCatName val="0"/>
+          <c:showSerName val="0"/>
+          <c:showPercent val="0"/>
+          <c:showBubbleSize val="0"/>
+        </c:dLbls>
+        <c:marker val="1"/>
+        <c:smooth val="0"/>
+        <c:axId val="-2141661096"/>
+        <c:axId val="-2141658968"/>
+      </c:lineChart>
+      <c:dateAx>
+        <c:axId val="-2141661096"/>
+        <c:scaling>
+          <c:orientation val="minMax"/>
+        </c:scaling>
+        <c:delete val="0"/>
+        <c:axPos val="b"/>
+        <c:numFmt formatCode="m/d/yy" sourceLinked="1"/>
+        <c:majorTickMark val="out"/>
+        <c:minorTickMark val="none"/>
+        <c:tickLblPos val="nextTo"/>
+        <c:crossAx val="-2141658968"/>
+        <c:crosses val="autoZero"/>
+        <c:auto val="1"/>
+        <c:lblOffset val="100"/>
+        <c:baseTimeUnit val="days"/>
+      </c:dateAx>
+      <c:valAx>
+        <c:axId val="-2141658968"/>
+        <c:scaling>
+          <c:orientation val="minMax"/>
+        </c:scaling>
+        <c:delete val="0"/>
+        <c:axPos val="l"/>
+        <c:majorGridlines/>
+        <c:numFmt formatCode="General" sourceLinked="1"/>
+        <c:majorTickMark val="out"/>
+        <c:minorTickMark val="none"/>
+        <c:tickLblPos val="nextTo"/>
+        <c:crossAx val="-2141661096"/>
+        <c:crosses val="autoZero"/>
+        <c:crossBetween val="between"/>
+      </c:valAx>
+    </c:plotArea>
+    <c:legend>
+      <c:legendPos val="r"/>
+      <c:layout/>
+      <c:overlay val="0"/>
+    </c:legend>
     <c:plotVisOnly val="1"/>
     <c:dispBlanksAs val="gap"/>
     <c:showDLblsOverMax val="0"/>
@@ -5130,12 +5306,12 @@
           <c:showPercent val="0"/>
           <c:showBubbleSize val="0"/>
         </c:dLbls>
-        <c:axId val="-2110385576"/>
-        <c:axId val="-2053784088"/>
-        <c:axId val="-2054263688"/>
+        <c:axId val="-2147217272"/>
+        <c:axId val="-2147214232"/>
+        <c:axId val="-2147211192"/>
       </c:area3DChart>
       <c:dateAx>
-        <c:axId val="-2110385576"/>
+        <c:axId val="-2147217272"/>
         <c:scaling>
           <c:orientation val="minMax"/>
         </c:scaling>
@@ -5145,14 +5321,14 @@
         <c:majorTickMark val="none"/>
         <c:minorTickMark val="none"/>
         <c:tickLblPos val="none"/>
-        <c:crossAx val="-2053784088"/>
+        <c:crossAx val="-2147214232"/>
         <c:crosses val="autoZero"/>
         <c:auto val="1"/>
         <c:lblOffset val="100"/>
         <c:baseTimeUnit val="days"/>
       </c:dateAx>
       <c:valAx>
-        <c:axId val="-2053784088"/>
+        <c:axId val="-2147214232"/>
         <c:scaling>
           <c:orientation val="minMax"/>
         </c:scaling>
@@ -5163,12 +5339,12 @@
         <c:majorTickMark val="out"/>
         <c:minorTickMark val="none"/>
         <c:tickLblPos val="nextTo"/>
-        <c:crossAx val="-2110385576"/>
+        <c:crossAx val="-2147217272"/>
         <c:crosses val="autoZero"/>
         <c:crossBetween val="midCat"/>
       </c:valAx>
       <c:serAx>
-        <c:axId val="-2054263688"/>
+        <c:axId val="-2147211192"/>
         <c:scaling>
           <c:orientation val="minMax"/>
         </c:scaling>
@@ -5177,7 +5353,7 @@
         <c:majorTickMark val="none"/>
         <c:minorTickMark val="none"/>
         <c:tickLblPos val="none"/>
-        <c:crossAx val="-2053784088"/>
+        <c:crossAx val="-2147214232"/>
         <c:crosses val="autoZero"/>
       </c:serAx>
     </c:plotArea>
@@ -5370,12 +5546,12 @@
           <c:showPercent val="0"/>
           <c:showBubbleSize val="0"/>
         </c:dLbls>
-        <c:axId val="-2055028168"/>
-        <c:axId val="-2110305496"/>
+        <c:axId val="-2147187064"/>
+        <c:axId val="-2147184024"/>
         <c:axId val="0"/>
       </c:area3DChart>
       <c:dateAx>
-        <c:axId val="-2055028168"/>
+        <c:axId val="-2147187064"/>
         <c:scaling>
           <c:orientation val="minMax"/>
         </c:scaling>
@@ -5385,14 +5561,14 @@
         <c:majorTickMark val="none"/>
         <c:minorTickMark val="none"/>
         <c:tickLblPos val="none"/>
-        <c:crossAx val="-2110305496"/>
+        <c:crossAx val="-2147184024"/>
         <c:crosses val="autoZero"/>
         <c:auto val="1"/>
         <c:lblOffset val="100"/>
         <c:baseTimeUnit val="days"/>
       </c:dateAx>
       <c:valAx>
-        <c:axId val="-2110305496"/>
+        <c:axId val="-2147184024"/>
         <c:scaling>
           <c:orientation val="minMax"/>
         </c:scaling>
@@ -5403,7 +5579,7 @@
         <c:majorTickMark val="out"/>
         <c:minorTickMark val="none"/>
         <c:tickLblPos val="nextTo"/>
-        <c:crossAx val="-2055028168"/>
+        <c:crossAx val="-2147187064"/>
         <c:crosses val="autoZero"/>
         <c:crossBetween val="midCat"/>
       </c:valAx>
@@ -5597,12 +5773,12 @@
           <c:showPercent val="0"/>
           <c:showBubbleSize val="0"/>
         </c:dLbls>
-        <c:axId val="-2113810632"/>
-        <c:axId val="-2054358904"/>
+        <c:axId val="-2147158760"/>
+        <c:axId val="-2147155736"/>
         <c:axId val="0"/>
       </c:area3DChart>
       <c:dateAx>
-        <c:axId val="-2113810632"/>
+        <c:axId val="-2147158760"/>
         <c:scaling>
           <c:orientation val="minMax"/>
         </c:scaling>
@@ -5612,14 +5788,14 @@
         <c:majorTickMark val="none"/>
         <c:minorTickMark val="none"/>
         <c:tickLblPos val="none"/>
-        <c:crossAx val="-2054358904"/>
+        <c:crossAx val="-2147155736"/>
         <c:crosses val="autoZero"/>
         <c:auto val="1"/>
         <c:lblOffset val="100"/>
         <c:baseTimeUnit val="days"/>
       </c:dateAx>
       <c:valAx>
-        <c:axId val="-2054358904"/>
+        <c:axId val="-2147155736"/>
         <c:scaling>
           <c:orientation val="minMax"/>
         </c:scaling>
@@ -5630,7 +5806,7 @@
         <c:majorTickMark val="out"/>
         <c:minorTickMark val="none"/>
         <c:tickLblPos val="nextTo"/>
-        <c:crossAx val="-2113810632"/>
+        <c:crossAx val="-2147158760"/>
         <c:crosses val="autoZero"/>
         <c:crossBetween val="midCat"/>
       </c:valAx>
@@ -5856,11 +6032,11 @@
           <c:showBubbleSize val="0"/>
         </c:dLbls>
         <c:gapWidth val="150"/>
-        <c:axId val="-2096488456"/>
-        <c:axId val="-2095605912"/>
+        <c:axId val="-2141947032"/>
+        <c:axId val="-2146682120"/>
       </c:barChart>
       <c:catAx>
-        <c:axId val="-2096488456"/>
+        <c:axId val="-2141947032"/>
         <c:scaling>
           <c:orientation val="minMax"/>
         </c:scaling>
@@ -5869,7 +6045,7 @@
         <c:majorTickMark val="none"/>
         <c:minorTickMark val="none"/>
         <c:tickLblPos val="none"/>
-        <c:crossAx val="-2095605912"/>
+        <c:crossAx val="-2146682120"/>
         <c:crosses val="autoZero"/>
         <c:auto val="1"/>
         <c:lblAlgn val="ctr"/>
@@ -5877,7 +6053,7 @@
         <c:noMultiLvlLbl val="0"/>
       </c:catAx>
       <c:valAx>
-        <c:axId val="-2095605912"/>
+        <c:axId val="-2146682120"/>
         <c:scaling>
           <c:orientation val="minMax"/>
         </c:scaling>
@@ -5888,7 +6064,7 @@
         <c:majorTickMark val="out"/>
         <c:minorTickMark val="none"/>
         <c:tickLblPos val="nextTo"/>
-        <c:crossAx val="-2096488456"/>
+        <c:crossAx val="-2141947032"/>
         <c:crosses val="autoZero"/>
         <c:crossBetween val="between"/>
       </c:valAx>
@@ -6115,11 +6291,11 @@
         </c:dLbls>
         <c:gapWidth val="150"/>
         <c:overlap val="100"/>
-        <c:axId val="-2096683672"/>
-        <c:axId val="-2090219928"/>
+        <c:axId val="2112784312"/>
+        <c:axId val="2112777240"/>
       </c:barChart>
       <c:catAx>
-        <c:axId val="-2096683672"/>
+        <c:axId val="2112784312"/>
         <c:scaling>
           <c:orientation val="minMax"/>
         </c:scaling>
@@ -6128,7 +6304,7 @@
         <c:majorTickMark val="none"/>
         <c:minorTickMark val="none"/>
         <c:tickLblPos val="none"/>
-        <c:crossAx val="-2090219928"/>
+        <c:crossAx val="2112777240"/>
         <c:crosses val="autoZero"/>
         <c:auto val="1"/>
         <c:lblAlgn val="ctr"/>
@@ -6136,7 +6312,7 @@
         <c:noMultiLvlLbl val="0"/>
       </c:catAx>
       <c:valAx>
-        <c:axId val="-2090219928"/>
+        <c:axId val="2112777240"/>
         <c:scaling>
           <c:orientation val="minMax"/>
         </c:scaling>
@@ -6147,7 +6323,7 @@
         <c:majorTickMark val="out"/>
         <c:minorTickMark val="none"/>
         <c:tickLblPos val="nextTo"/>
-        <c:crossAx val="-2096683672"/>
+        <c:crossAx val="2112784312"/>
         <c:crosses val="autoZero"/>
         <c:crossBetween val="between"/>
       </c:valAx>
@@ -6374,11 +6550,11 @@
         </c:dLbls>
         <c:gapWidth val="150"/>
         <c:overlap val="100"/>
-        <c:axId val="-2107984248"/>
-        <c:axId val="-2096143720"/>
+        <c:axId val="-2141942584"/>
+        <c:axId val="-2141939608"/>
       </c:barChart>
       <c:catAx>
-        <c:axId val="-2107984248"/>
+        <c:axId val="-2141942584"/>
         <c:scaling>
           <c:orientation val="minMax"/>
         </c:scaling>
@@ -6387,7 +6563,7 @@
         <c:majorTickMark val="none"/>
         <c:minorTickMark val="none"/>
         <c:tickLblPos val="none"/>
-        <c:crossAx val="-2096143720"/>
+        <c:crossAx val="-2141939608"/>
         <c:crosses val="autoZero"/>
         <c:auto val="1"/>
         <c:lblAlgn val="ctr"/>
@@ -6395,7 +6571,7 @@
         <c:noMultiLvlLbl val="0"/>
       </c:catAx>
       <c:valAx>
-        <c:axId val="-2096143720"/>
+        <c:axId val="-2141939608"/>
         <c:scaling>
           <c:orientation val="minMax"/>
         </c:scaling>
@@ -6406,7 +6582,7 @@
         <c:majorTickMark val="out"/>
         <c:minorTickMark val="none"/>
         <c:tickLblPos val="nextTo"/>
-        <c:crossAx val="-2107984248"/>
+        <c:crossAx val="-2141942584"/>
         <c:crosses val="autoZero"/>
         <c:crossBetween val="between"/>
       </c:valAx>
@@ -7607,6 +7783,58 @@
 </p:sld>
 </file>
 
+<file path=ppt/slides/slide8.xml><?xml version="1.0" encoding="utf-8"?>
+<p:sld xmlns:a="http://schemas.openxmlformats.org/drawingml/2006/main" xmlns:r="http://schemas.openxmlformats.org/officeDocument/2006/relationships" xmlns:p="http://schemas.openxmlformats.org/presentationml/2006/main">
+  <p:cSld>
+    <p:spTree>
+      <p:nvGrpSpPr>
+        <p:cNvPr id="1" name=""/>
+        <p:cNvGrpSpPr/>
+        <p:nvPr/>
+      </p:nvGrpSpPr>
+      <p:grpSpPr>
+        <a:xfrm>
+          <a:off x="0" y="0"/>
+          <a:ext cx="0" cy="0"/>
+          <a:chOff x="0" y="0"/>
+          <a:chExt cx="0" cy="0"/>
+        </a:xfrm>
+      </p:grpSpPr>
+      <p:graphicFrame>
+        <p:nvGraphicFramePr>
+          <p:cNvPr id="2" name="Chart 1"/>
+          <p:cNvGraphicFramePr/>
+          <p:nvPr>
+            <p:extLst>
+              <p:ext uri="{D42A27DB-BD31-4B8C-83A1-F6EECF244321}">
+                <p14:modId xmlns:p14="http://schemas.microsoft.com/office/powerpoint/2010/main" val="1857584482"/>
+              </p:ext>
+            </p:extLst>
+          </p:nvPr>
+        </p:nvGraphicFramePr>
+        <p:xfrm>
+          <a:off x="323528" y="332656"/>
+          <a:ext cx="4176464" cy="2952328"/>
+        </p:xfrm>
+        <a:graphic>
+          <a:graphicData uri="http://schemas.openxmlformats.org/drawingml/2006/chart">
+            <c:chart xmlns:c="http://schemas.openxmlformats.org/drawingml/2006/chart" xmlns:r="http://schemas.openxmlformats.org/officeDocument/2006/relationships" r:id="rId2"/>
+          </a:graphicData>
+        </a:graphic>
+      </p:graphicFrame>
+    </p:spTree>
+    <p:extLst>
+      <p:ext uri="{BB962C8B-B14F-4D97-AF65-F5344CB8AC3E}">
+        <p14:creationId xmlns:p14="http://schemas.microsoft.com/office/powerpoint/2010/main" val="1720917344"/>
+      </p:ext>
+    </p:extLst>
+  </p:cSld>
+  <p:clrMapOvr>
+    <a:masterClrMapping/>
+  </p:clrMapOvr>
+</p:sld>
+</file>
+
 <file path=ppt/theme/theme1.xml><?xml version="1.0" encoding="utf-8"?>
 <a:theme xmlns:a="http://schemas.openxmlformats.org/drawingml/2006/main" name="Office Theme">
   <a:themeElements>

</xml_diff>